<commit_message>
Updated sequence diagram in powerpoint.
</commit_message>
<xml_diff>
--- a/00_General/Presentation/MS 3/Presentation_Milestone_iii_Master.pptx
+++ b/00_General/Presentation/MS 3/Presentation_Milestone_iii_Master.pptx
@@ -520,7 +520,7 @@
           <a:p>
             <a:pPr/>
             <a:r>
-              <a:t>Mastertitelformat bearbeiten</a:t>
+              <a:t>Titeltext</a:t>
             </a:r>
           </a:p>
         </p:txBody>
@@ -551,11 +551,59 @@
               <a:buNone/>
               <a:defRPr sz="2400"/>
             </a:lvl1pPr>
+            <a:lvl2pPr marL="0" indent="457200" algn="ctr">
+              <a:buSzTx/>
+              <a:buFontTx/>
+              <a:buNone/>
+              <a:defRPr sz="2400"/>
+            </a:lvl2pPr>
+            <a:lvl3pPr marL="0" indent="914400" algn="ctr">
+              <a:buSzTx/>
+              <a:buFontTx/>
+              <a:buNone/>
+              <a:defRPr sz="2400"/>
+            </a:lvl3pPr>
+            <a:lvl4pPr marL="0" indent="1371600" algn="ctr">
+              <a:buSzTx/>
+              <a:buFontTx/>
+              <a:buNone/>
+              <a:defRPr sz="2400"/>
+            </a:lvl4pPr>
+            <a:lvl5pPr marL="0" indent="1828800" algn="ctr">
+              <a:buSzTx/>
+              <a:buFontTx/>
+              <a:buNone/>
+              <a:defRPr sz="2400"/>
+            </a:lvl5pPr>
           </a:lstStyle>
           <a:p>
             <a:pPr/>
             <a:r>
-              <a:t>Master-Untertitelformat bearbeiten</a:t>
+              <a:t>Textebene 1</a:t>
+            </a:r>
+          </a:p>
+          <a:p>
+            <a:pPr lvl="1"/>
+            <a:r>
+              <a:t>Textebene 2</a:t>
+            </a:r>
+          </a:p>
+          <a:p>
+            <a:pPr lvl="2"/>
+            <a:r>
+              <a:t>Textebene 3</a:t>
+            </a:r>
+          </a:p>
+          <a:p>
+            <a:pPr lvl="3"/>
+            <a:r>
+              <a:t>Textebene 4</a:t>
+            </a:r>
+          </a:p>
+          <a:p>
+            <a:pPr lvl="4"/>
+            <a:r>
+              <a:t>Textebene 5</a:t>
             </a:r>
           </a:p>
         </p:txBody>
@@ -941,7 +989,7 @@
           <a:p>
             <a:pPr/>
             <a:r>
-              <a:t>Mastertitelformat bearbeiten</a:t>
+              <a:t>Titeltext</a:t>
             </a:r>
           </a:p>
         </p:txBody>
@@ -969,31 +1017,31 @@
           <a:p>
             <a:pPr/>
             <a:r>
-              <a:t>Mastertextformat bearbeiten</a:t>
+              <a:t>Textebene 1</a:t>
             </a:r>
           </a:p>
           <a:p>
             <a:pPr lvl="1"/>
             <a:r>
-              <a:t>Zweite Ebene</a:t>
+              <a:t>Textebene 2</a:t>
             </a:r>
           </a:p>
           <a:p>
             <a:pPr lvl="2"/>
             <a:r>
-              <a:t>Dritte Ebene</a:t>
+              <a:t>Textebene 3</a:t>
             </a:r>
           </a:p>
           <a:p>
             <a:pPr lvl="3"/>
             <a:r>
-              <a:t>Vierte Ebene</a:t>
+              <a:t>Textebene 4</a:t>
             </a:r>
           </a:p>
           <a:p>
             <a:pPr lvl="4"/>
             <a:r>
-              <a:t>Fünfte Ebene</a:t>
+              <a:t>Textebene 5</a:t>
             </a:r>
           </a:p>
         </p:txBody>
@@ -1319,7 +1367,7 @@
           <a:p>
             <a:pPr/>
             <a:r>
-              <a:t>Mastertitelformat bearbeiten</a:t>
+              <a:t>Titeltext</a:t>
             </a:r>
           </a:p>
         </p:txBody>
@@ -1343,31 +1391,31 @@
           <a:p>
             <a:pPr/>
             <a:r>
-              <a:t>Mastertextformat bearbeiten</a:t>
+              <a:t>Textebene 1</a:t>
             </a:r>
           </a:p>
           <a:p>
             <a:pPr lvl="1"/>
             <a:r>
-              <a:t>Zweite Ebene</a:t>
+              <a:t>Textebene 2</a:t>
             </a:r>
           </a:p>
           <a:p>
             <a:pPr lvl="2"/>
             <a:r>
-              <a:t>Dritte Ebene</a:t>
+              <a:t>Textebene 3</a:t>
             </a:r>
           </a:p>
           <a:p>
             <a:pPr lvl="3"/>
             <a:r>
-              <a:t>Vierte Ebene</a:t>
+              <a:t>Textebene 4</a:t>
             </a:r>
           </a:p>
           <a:p>
             <a:pPr lvl="4"/>
             <a:r>
-              <a:t>Fünfte Ebene</a:t>
+              <a:t>Textebene 5</a:t>
             </a:r>
           </a:p>
         </p:txBody>
@@ -1622,7 +1670,7 @@
           <a:p>
             <a:pPr/>
             <a:r>
-              <a:t>Mastertitelformat bearbeiten</a:t>
+              <a:t>Titeltext</a:t>
             </a:r>
           </a:p>
         </p:txBody>
@@ -1650,31 +1698,31 @@
           <a:p>
             <a:pPr/>
             <a:r>
-              <a:t>Mastertextformat bearbeiten</a:t>
+              <a:t>Textebene 1</a:t>
             </a:r>
           </a:p>
           <a:p>
             <a:pPr lvl="1"/>
             <a:r>
-              <a:t>Zweite Ebene</a:t>
+              <a:t>Textebene 2</a:t>
             </a:r>
           </a:p>
           <a:p>
             <a:pPr lvl="2"/>
             <a:r>
-              <a:t>Dritte Ebene</a:t>
+              <a:t>Textebene 3</a:t>
             </a:r>
           </a:p>
           <a:p>
             <a:pPr lvl="3"/>
             <a:r>
-              <a:t>Vierte Ebene</a:t>
+              <a:t>Textebene 4</a:t>
             </a:r>
           </a:p>
           <a:p>
             <a:pPr lvl="4"/>
             <a:r>
-              <a:t>Fünfte Ebene</a:t>
+              <a:t>Textebene 5</a:t>
             </a:r>
           </a:p>
         </p:txBody>
@@ -1750,7 +1798,7 @@
           <a:p>
             <a:pPr/>
             <a:r>
-              <a:t>Mastertitelformat bearbeiten</a:t>
+              <a:t>Titeltext</a:t>
             </a:r>
           </a:p>
         </p:txBody>
@@ -1781,11 +1829,59 @@
               <a:buNone/>
               <a:defRPr b="1" sz="2400"/>
             </a:lvl1pPr>
+            <a:lvl2pPr marL="0" indent="457200">
+              <a:buSzTx/>
+              <a:buFontTx/>
+              <a:buNone/>
+              <a:defRPr b="1" sz="2400"/>
+            </a:lvl2pPr>
+            <a:lvl3pPr marL="0" indent="914400">
+              <a:buSzTx/>
+              <a:buFontTx/>
+              <a:buNone/>
+              <a:defRPr b="1" sz="2400"/>
+            </a:lvl3pPr>
+            <a:lvl4pPr marL="0" indent="1371600">
+              <a:buSzTx/>
+              <a:buFontTx/>
+              <a:buNone/>
+              <a:defRPr b="1" sz="2400"/>
+            </a:lvl4pPr>
+            <a:lvl5pPr marL="0" indent="1828800">
+              <a:buSzTx/>
+              <a:buFontTx/>
+              <a:buNone/>
+              <a:defRPr b="1" sz="2400"/>
+            </a:lvl5pPr>
           </a:lstStyle>
           <a:p>
             <a:pPr/>
             <a:r>
-              <a:t>Mastertextformat bearbeiten</a:t>
+              <a:t>Textebene 1</a:t>
+            </a:r>
+          </a:p>
+          <a:p>
+            <a:pPr lvl="1"/>
+            <a:r>
+              <a:t>Textebene 2</a:t>
+            </a:r>
+          </a:p>
+          <a:p>
+            <a:pPr lvl="2"/>
+            <a:r>
+              <a:t>Textebene 3</a:t>
+            </a:r>
+          </a:p>
+          <a:p>
+            <a:pPr lvl="3"/>
+            <a:r>
+              <a:t>Textebene 4</a:t>
+            </a:r>
+          </a:p>
+          <a:p>
+            <a:pPr lvl="4"/>
+            <a:r>
+              <a:t>Textebene 5</a:t>
             </a:r>
           </a:p>
         </p:txBody>
@@ -3478,7 +3574,7 @@
           </a:stretch>
         </p:blipFill>
         <p:spPr>
-          <a:xfrm rot="517975">
+          <a:xfrm rot="517974">
             <a:off x="7881139" y="2164971"/>
             <a:ext cx="4099167" cy="2828195"/>
           </a:xfrm>
@@ -6993,8 +7089,8 @@
         </p:blipFill>
         <p:spPr>
           <a:xfrm>
-            <a:off x="336813" y="940176"/>
-            <a:ext cx="11518374" cy="5236693"/>
+            <a:off x="488095" y="992499"/>
+            <a:ext cx="11215810" cy="5132047"/>
           </a:xfrm>
           <a:prstGeom prst="rect">
             <a:avLst/>
@@ -7653,7 +7749,7 @@
         <p:spPr>
           <a:xfrm>
             <a:off x="425999" y="1150598"/>
-            <a:ext cx="5306161" cy="3688081"/>
+            <a:ext cx="5306161" cy="3688082"/>
           </a:xfrm>
           <a:prstGeom prst="rect">
             <a:avLst/>

</xml_diff>

<commit_message>
inserted picture of game into PowerPoint
</commit_message>
<xml_diff>
--- a/00_General/Presentation/MS 3/Presentation_Milestone_iii_Master.pptx
+++ b/00_General/Presentation/MS 3/Presentation_Milestone_iii_Master.pptx
@@ -5,22 +5,23 @@
     <p:sldMasterId id="2147483648" r:id="rId1"/>
   </p:sldMasterIdLst>
   <p:notesMasterIdLst>
-    <p:notesMasterId r:id="rId15"/>
+    <p:notesMasterId r:id="rId16"/>
   </p:notesMasterIdLst>
   <p:sldIdLst>
     <p:sldId id="256" r:id="rId2"/>
     <p:sldId id="257" r:id="rId3"/>
     <p:sldId id="258" r:id="rId4"/>
-    <p:sldId id="259" r:id="rId5"/>
-    <p:sldId id="260" r:id="rId6"/>
-    <p:sldId id="261" r:id="rId7"/>
-    <p:sldId id="262" r:id="rId8"/>
-    <p:sldId id="263" r:id="rId9"/>
-    <p:sldId id="264" r:id="rId10"/>
-    <p:sldId id="265" r:id="rId11"/>
-    <p:sldId id="266" r:id="rId12"/>
-    <p:sldId id="267" r:id="rId13"/>
-    <p:sldId id="268" r:id="rId14"/>
+    <p:sldId id="269" r:id="rId5"/>
+    <p:sldId id="259" r:id="rId6"/>
+    <p:sldId id="260" r:id="rId7"/>
+    <p:sldId id="261" r:id="rId8"/>
+    <p:sldId id="262" r:id="rId9"/>
+    <p:sldId id="263" r:id="rId10"/>
+    <p:sldId id="264" r:id="rId11"/>
+    <p:sldId id="265" r:id="rId12"/>
+    <p:sldId id="266" r:id="rId13"/>
+    <p:sldId id="267" r:id="rId14"/>
+    <p:sldId id="268" r:id="rId15"/>
   </p:sldIdLst>
   <p:sldSz cx="12192000" cy="6858000"/>
   <p:notesSz cx="6858000" cy="9144000"/>
@@ -324,7 +325,7 @@
   </p:defaultTextStyle>
   <p:extLst>
     <p:ext uri="{EFAFB233-063F-42B5-8137-9DF3F51BA10A}">
-      <p15:sldGuideLst xmlns:p15="http://schemas.microsoft.com/office/powerpoint/2012/main">
+      <p15:sldGuideLst xmlns:p15="http://schemas.microsoft.com/office/powerpoint/2012/main" xmlns="">
         <p15:guide id="1" orient="horz" pos="2160" userDrawn="1">
           <p15:clr>
             <a:srgbClr val="A4A3A4"/>
@@ -418,6 +419,11 @@
         </p:txBody>
       </p:sp>
     </p:spTree>
+    <p:extLst>
+      <p:ext uri="{BB962C8B-B14F-4D97-AF65-F5344CB8AC3E}">
+        <p14:creationId xmlns:p14="http://schemas.microsoft.com/office/powerpoint/2010/main" val="460345341"/>
+      </p:ext>
+    </p:extLst>
   </p:cSld>
   <p:clrMap bg1="lt1" tx1="dk1" bg2="lt2" tx2="dk2" accent1="accent1" accent2="accent2" accent3="accent3" accent4="accent4" accent5="accent5" accent6="accent6" hlink="hlink" folHlink="folHlink"/>
   <p:notesStyle>
@@ -614,7 +620,7 @@
   <p:clrMapOvr>
     <a:masterClrMapping/>
   </p:clrMapOvr>
-  <p:transition spd="med"/>
+  <p:transition xmlns:p14="http://schemas.microsoft.com/office/powerpoint/2010/main" spd="med"/>
 </p:sldLayout>
 </file>
 
@@ -812,7 +818,7 @@
   <p:clrMapOvr>
     <a:masterClrMapping/>
   </p:clrMapOvr>
-  <p:transition spd="med"/>
+  <p:transition xmlns:p14="http://schemas.microsoft.com/office/powerpoint/2010/main" spd="med"/>
 </p:sldLayout>
 </file>
 
@@ -938,7 +944,7 @@
   <p:clrMapOvr>
     <a:masterClrMapping/>
   </p:clrMapOvr>
-  <p:transition spd="med"/>
+  <p:transition xmlns:p14="http://schemas.microsoft.com/office/powerpoint/2010/main" spd="med"/>
 </p:sldLayout>
 </file>
 
@@ -1072,7 +1078,7 @@
   <p:clrMapOvr>
     <a:masterClrMapping/>
   </p:clrMapOvr>
-  <p:transition spd="med"/>
+  <p:transition xmlns:p14="http://schemas.microsoft.com/office/powerpoint/2010/main" spd="med"/>
 </p:sldLayout>
 </file>
 
@@ -1206,7 +1212,7 @@
   <p:clrMapOvr>
     <a:masterClrMapping/>
   </p:clrMapOvr>
-  <p:transition spd="med"/>
+  <p:transition xmlns:p14="http://schemas.microsoft.com/office/powerpoint/2010/main" spd="med"/>
 </p:sldLayout>
 </file>
 
@@ -1332,7 +1338,7 @@
   <p:clrMapOvr>
     <a:masterClrMapping/>
   </p:clrMapOvr>
-  <p:transition spd="med"/>
+  <p:transition xmlns:p14="http://schemas.microsoft.com/office/powerpoint/2010/main" spd="med"/>
 </p:sldLayout>
 </file>
 
@@ -1466,7 +1472,7 @@
   <p:clrMapOvr>
     <a:masterClrMapping/>
   </p:clrMapOvr>
-  <p:transition spd="med"/>
+  <p:transition xmlns:p14="http://schemas.microsoft.com/office/powerpoint/2010/main" spd="med"/>
 </p:sldLayout>
 </file>
 
@@ -1655,7 +1661,7 @@
   <p:clrMapOvr>
     <a:masterClrMapping/>
   </p:clrMapOvr>
-  <p:transition spd="med"/>
+  <p:transition xmlns:p14="http://schemas.microsoft.com/office/powerpoint/2010/main" spd="med"/>
 </p:sldLayout>
 </file>
 
@@ -1785,7 +1791,7 @@
   <p:clrMapOvr>
     <a:masterClrMapping/>
   </p:clrMapOvr>
-  <p:transition spd="med"/>
+  <p:transition xmlns:p14="http://schemas.microsoft.com/office/powerpoint/2010/main" spd="med"/>
 </p:sldLayout>
 </file>
 
@@ -1929,7 +1935,7 @@
   <p:clrMapOvr>
     <a:masterClrMapping/>
   </p:clrMapOvr>
-  <p:transition spd="med"/>
+  <p:transition xmlns:p14="http://schemas.microsoft.com/office/powerpoint/2010/main" spd="med"/>
 </p:sldLayout>
 </file>
 
@@ -2006,7 +2012,7 @@
   <p:clrMapOvr>
     <a:masterClrMapping/>
   </p:clrMapOvr>
-  <p:transition spd="med"/>
+  <p:transition xmlns:p14="http://schemas.microsoft.com/office/powerpoint/2010/main" spd="med"/>
 </p:sldLayout>
 </file>
 
@@ -2058,7 +2064,7 @@
   <p:clrMapOvr>
     <a:masterClrMapping/>
   </p:clrMapOvr>
-  <p:transition spd="med"/>
+  <p:transition xmlns:p14="http://schemas.microsoft.com/office/powerpoint/2010/main" spd="med"/>
 </p:sldLayout>
 </file>
 
@@ -2239,7 +2245,7 @@
   <p:clrMapOvr>
     <a:masterClrMapping/>
   </p:clrMapOvr>
-  <p:transition spd="med"/>
+  <p:transition xmlns:p14="http://schemas.microsoft.com/office/powerpoint/2010/main" spd="med"/>
 </p:sldLayout>
 </file>
 
@@ -2291,7 +2297,7 @@
           </a:ln>
           <a:extLst>
             <a:ext uri="{C572A759-6A51-4108-AA02-DFA0A04FC94B}">
-              <ma14:wrappingTextBoxFlag xmlns:ma14="http://schemas.microsoft.com/office/mac/drawingml/2011/main" xmlns="" val="1"/>
+              <ma14:wrappingTextBoxFlag xmlns:ma14="http://schemas.microsoft.com/office/mac/drawingml/2011/main" val="1"/>
             </a:ext>
           </a:extLst>
         </p:spPr>
@@ -2330,7 +2336,7 @@
           </a:ln>
           <a:extLst>
             <a:ext uri="{C572A759-6A51-4108-AA02-DFA0A04FC94B}">
-              <ma14:wrappingTextBoxFlag xmlns:ma14="http://schemas.microsoft.com/office/mac/drawingml/2011/main" xmlns="" val="1"/>
+              <ma14:wrappingTextBoxFlag xmlns:ma14="http://schemas.microsoft.com/office/mac/drawingml/2011/main" val="1"/>
             </a:ext>
           </a:extLst>
         </p:spPr>
@@ -2431,7 +2437,7 @@
     <p:sldLayoutId id="2147483660" r:id="rId12"/>
     <p:sldLayoutId id="2147483661" r:id="rId13"/>
   </p:sldLayoutIdLst>
-  <p:transition spd="med"/>
+  <p:transition xmlns:p14="http://schemas.microsoft.com/office/powerpoint/2010/main" spd="med"/>
   <p:txStyles>
     <p:titleStyle>
       <a:lvl1pPr marL="0" marR="0" indent="0" algn="l" defTabSz="914400" rtl="0" latinLnBrk="0">
@@ -3270,7 +3276,7 @@
           </a:ln>
           <a:extLst>
             <a:ext uri="{C572A759-6A51-4108-AA02-DFA0A04FC94B}">
-              <ma14:wrappingTextBoxFlag xmlns:ma14="http://schemas.microsoft.com/office/mac/drawingml/2011/main" xmlns="" val="1"/>
+              <ma14:wrappingTextBoxFlag xmlns:ma14="http://schemas.microsoft.com/office/mac/drawingml/2011/main" val="1"/>
             </a:ext>
           </a:extLst>
         </p:spPr>
@@ -3604,7 +3610,7 @@
           </a:ln>
           <a:extLst>
             <a:ext uri="{C572A759-6A51-4108-AA02-DFA0A04FC94B}">
-              <ma14:wrappingTextBoxFlag xmlns:ma14="http://schemas.microsoft.com/office/mac/drawingml/2011/main" xmlns="" val="1"/>
+              <ma14:wrappingTextBoxFlag xmlns:ma14="http://schemas.microsoft.com/office/mac/drawingml/2011/main" val="1"/>
             </a:ext>
           </a:extLst>
         </p:spPr>
@@ -3787,7 +3793,7 @@
   <p:clrMapOvr>
     <a:masterClrMapping/>
   </p:clrMapOvr>
-  <p:transition spd="med"/>
+  <p:transition xmlns:p14="http://schemas.microsoft.com/office/powerpoint/2010/main" spd="med"/>
 </p:sld>
 </file>
 
@@ -3810,7 +3816,7 @@
       </p:grpSpPr>
       <p:sp>
         <p:nvSpPr>
-          <p:cNvPr id="214" name="Shape 214"/>
+          <p:cNvPr id="206" name="Shape 206"/>
           <p:cNvSpPr/>
           <p:nvPr/>
         </p:nvSpPr>
@@ -3827,7 +3833,7 @@
           </a:ln>
           <a:extLst>
             <a:ext uri="{C572A759-6A51-4108-AA02-DFA0A04FC94B}">
-              <ma14:wrappingTextBoxFlag xmlns:ma14="http://schemas.microsoft.com/office/mac/drawingml/2011/main" xmlns="" val="1"/>
+              <ma14:wrappingTextBoxFlag xmlns:ma14="http://schemas.microsoft.com/office/mac/drawingml/2011/main" val="1"/>
             </a:ext>
           </a:extLst>
         </p:spPr>
@@ -3853,7 +3859,7 @@
       </p:sp>
       <p:sp>
         <p:nvSpPr>
-          <p:cNvPr id="215" name="Shape 215"/>
+          <p:cNvPr id="207" name="Shape 207"/>
           <p:cNvSpPr>
             <a:spLocks noGrp="1"/>
           </p:cNvSpPr>
@@ -3884,6 +3890,280 @@
           </a:lstStyle>
           <a:p>
             <a:r>
+              <a:t>	Technische Eigenheiten</a:t>
+            </a:r>
+          </a:p>
+        </p:txBody>
+      </p:sp>
+      <p:sp>
+        <p:nvSpPr>
+          <p:cNvPr id="208" name="Shape 208"/>
+          <p:cNvSpPr>
+            <a:spLocks noGrp="1"/>
+          </p:cNvSpPr>
+          <p:nvPr>
+            <p:ph type="sldNum" sz="quarter" idx="4294967295"/>
+          </p:nvPr>
+        </p:nvSpPr>
+        <p:spPr>
+          <a:xfrm>
+            <a:off x="11169739" y="6404292"/>
+            <a:ext cx="184059" cy="269239"/>
+          </a:xfrm>
+          <a:prstGeom prst="rect">
+            <a:avLst/>
+          </a:prstGeom>
+          <a:extLst>
+            <a:ext uri="{C572A759-6A51-4108-AA02-DFA0A04FC94B}">
+              <ma14:wrappingTextBoxFlag xmlns:ma14="http://schemas.microsoft.com/office/mac/drawingml/2011/main" val="1"/>
+            </a:ext>
+          </a:extLst>
+        </p:spPr>
+        <p:txBody>
+          <a:bodyPr/>
+          <a:lstStyle/>
+          <a:p>
+            <a:fld id="{86CB4B4D-7CA3-9044-876B-883B54F8677D}" type="slidenum">
+              <a:t>10</a:t>
+            </a:fld>
+            <a:endParaRPr/>
+          </a:p>
+        </p:txBody>
+      </p:sp>
+      <p:sp>
+        <p:nvSpPr>
+          <p:cNvPr id="209" name="Shape 209"/>
+          <p:cNvSpPr/>
+          <p:nvPr/>
+        </p:nvSpPr>
+        <p:spPr>
+          <a:xfrm>
+            <a:off x="-11084" y="720436"/>
+            <a:ext cx="4584003" cy="2"/>
+          </a:xfrm>
+          <a:prstGeom prst="line">
+            <a:avLst/>
+          </a:prstGeom>
+          <a:ln w="28575">
+            <a:solidFill>
+              <a:srgbClr val="000000"/>
+            </a:solidFill>
+            <a:miter/>
+          </a:ln>
+          <a:effectLst>
+            <a:outerShdw blurRad="50800" dist="38100" dir="2700000" rotWithShape="0">
+              <a:srgbClr val="000000">
+                <a:alpha val="40000"/>
+              </a:srgbClr>
+            </a:outerShdw>
+          </a:effectLst>
+        </p:spPr>
+        <p:txBody>
+          <a:bodyPr lIns="45718" tIns="45718" rIns="45718" bIns="45718"/>
+          <a:lstStyle/>
+          <a:p>
+            <a:endParaRPr/>
+          </a:p>
+        </p:txBody>
+      </p:sp>
+      <p:pic>
+        <p:nvPicPr>
+          <p:cNvPr id="210" name="image10.png" descr="Fingerabdruck"/>
+          <p:cNvPicPr>
+            <a:picLocks noChangeAspect="1"/>
+          </p:cNvPicPr>
+          <p:nvPr/>
+        </p:nvPicPr>
+        <p:blipFill>
+          <a:blip r:embed="rId2"/>
+          <a:stretch>
+            <a:fillRect/>
+          </a:stretch>
+        </p:blipFill>
+        <p:spPr>
+          <a:xfrm>
+            <a:off x="263999" y="86303"/>
+            <a:ext cx="547828" cy="547829"/>
+          </a:xfrm>
+          <a:prstGeom prst="rect">
+            <a:avLst/>
+          </a:prstGeom>
+          <a:ln w="12700">
+            <a:miter lim="400000"/>
+          </a:ln>
+        </p:spPr>
+      </p:pic>
+      <p:sp>
+        <p:nvSpPr>
+          <p:cNvPr id="211" name="Shape 211"/>
+          <p:cNvSpPr/>
+          <p:nvPr/>
+        </p:nvSpPr>
+        <p:spPr>
+          <a:xfrm>
+            <a:off x="4401723" y="813884"/>
+            <a:ext cx="3890823" cy="383539"/>
+          </a:xfrm>
+          <a:prstGeom prst="rect">
+            <a:avLst/>
+          </a:prstGeom>
+          <a:ln w="12700">
+            <a:miter lim="400000"/>
+          </a:ln>
+          <a:extLst>
+            <a:ext uri="{C572A759-6A51-4108-AA02-DFA0A04FC94B}">
+              <ma14:wrappingTextBoxFlag xmlns:ma14="http://schemas.microsoft.com/office/mac/drawingml/2011/main" val="1"/>
+            </a:ext>
+          </a:extLst>
+        </p:spPr>
+        <p:txBody>
+          <a:bodyPr wrap="none" lIns="45718" tIns="45718" rIns="45718" bIns="45718">
+            <a:spAutoFit/>
+          </a:bodyPr>
+          <a:lstStyle>
+            <a:lvl1pPr>
+              <a:lnSpc>
+                <a:spcPct val="120000"/>
+              </a:lnSpc>
+              <a:defRPr sz="2000"/>
+            </a:lvl1pPr>
+          </a:lstStyle>
+          <a:p>
+            <a:r>
+              <a:t>log4j2.properties Datei (Beispiel)</a:t>
+            </a:r>
+          </a:p>
+        </p:txBody>
+      </p:sp>
+      <p:pic>
+        <p:nvPicPr>
+          <p:cNvPr id="212" name="image13.png"/>
+          <p:cNvPicPr>
+            <a:picLocks noChangeAspect="1"/>
+          </p:cNvPicPr>
+          <p:nvPr/>
+        </p:nvPicPr>
+        <p:blipFill>
+          <a:blip r:embed="rId3"/>
+          <a:stretch>
+            <a:fillRect/>
+          </a:stretch>
+        </p:blipFill>
+        <p:spPr>
+          <a:xfrm>
+            <a:off x="1485138" y="1289286"/>
+            <a:ext cx="9608037" cy="4963394"/>
+          </a:xfrm>
+          <a:prstGeom prst="rect">
+            <a:avLst/>
+          </a:prstGeom>
+          <a:ln w="12700">
+            <a:miter lim="400000"/>
+          </a:ln>
+        </p:spPr>
+      </p:pic>
+    </p:spTree>
+  </p:cSld>
+  <p:clrMapOvr>
+    <a:masterClrMapping/>
+  </p:clrMapOvr>
+  <p:transition xmlns:p14="http://schemas.microsoft.com/office/powerpoint/2010/main" spd="slow"/>
+</p:sld>
+</file>
+
+<file path=ppt/slides/slide11.xml><?xml version="1.0" encoding="utf-8"?>
+<p:sld xmlns:a="http://schemas.openxmlformats.org/drawingml/2006/main" xmlns:r="http://schemas.openxmlformats.org/officeDocument/2006/relationships" xmlns:p="http://schemas.openxmlformats.org/presentationml/2006/main">
+  <p:cSld>
+    <p:spTree>
+      <p:nvGrpSpPr>
+        <p:cNvPr id="1" name=""/>
+        <p:cNvGrpSpPr/>
+        <p:nvPr/>
+      </p:nvGrpSpPr>
+      <p:grpSpPr>
+        <a:xfrm>
+          <a:off x="0" y="0"/>
+          <a:ext cx="0" cy="0"/>
+          <a:chOff x="0" y="0"/>
+          <a:chExt cx="0" cy="0"/>
+        </a:xfrm>
+      </p:grpSpPr>
+      <p:sp>
+        <p:nvSpPr>
+          <p:cNvPr id="214" name="Shape 214"/>
+          <p:cNvSpPr/>
+          <p:nvPr/>
+        </p:nvSpPr>
+        <p:spPr>
+          <a:xfrm>
+            <a:off x="4038600" y="6404292"/>
+            <a:ext cx="4114800" cy="269239"/>
+          </a:xfrm>
+          <a:prstGeom prst="rect">
+            <a:avLst/>
+          </a:prstGeom>
+          <a:ln w="12700">
+            <a:miter lim="400000"/>
+          </a:ln>
+          <a:extLst>
+            <a:ext uri="{C572A759-6A51-4108-AA02-DFA0A04FC94B}">
+              <ma14:wrappingTextBoxFlag xmlns:ma14="http://schemas.microsoft.com/office/mac/drawingml/2011/main" val="1"/>
+            </a:ext>
+          </a:extLst>
+        </p:spPr>
+        <p:txBody>
+          <a:bodyPr lIns="45718" tIns="45718" rIns="45718" bIns="45718" anchor="ctr">
+            <a:spAutoFit/>
+          </a:bodyPr>
+          <a:lstStyle>
+            <a:lvl1pPr algn="ctr">
+              <a:defRPr sz="1200">
+                <a:solidFill>
+                  <a:srgbClr val="888888"/>
+                </a:solidFill>
+              </a:defRPr>
+            </a:lvl1pPr>
+          </a:lstStyle>
+          <a:p>
+            <a:r>
+              <a:t>Mlst.-Präsentation Nr. 1  /  Gruppe 15</a:t>
+            </a:r>
+          </a:p>
+        </p:txBody>
+      </p:sp>
+      <p:sp>
+        <p:nvSpPr>
+          <p:cNvPr id="215" name="Shape 215"/>
+          <p:cNvSpPr>
+            <a:spLocks noGrp="1"/>
+          </p:cNvSpPr>
+          <p:nvPr>
+            <p:ph type="title"/>
+          </p:nvPr>
+        </p:nvSpPr>
+        <p:spPr>
+          <a:xfrm>
+            <a:off x="0" y="-2"/>
+            <a:ext cx="10515600" cy="720440"/>
+          </a:xfrm>
+          <a:prstGeom prst="rect">
+            <a:avLst/>
+          </a:prstGeom>
+        </p:spPr>
+        <p:txBody>
+          <a:bodyPr/>
+          <a:lstStyle>
+            <a:lvl1pPr>
+              <a:defRPr sz="2000" b="1">
+                <a:latin typeface="Arial"/>
+                <a:ea typeface="Arial"/>
+                <a:cs typeface="Arial"/>
+                <a:sym typeface="Arial"/>
+              </a:defRPr>
+            </a:lvl1pPr>
+          </a:lstStyle>
+          <a:p>
+            <a:r>
               <a:t>	 Übersicht</a:t>
             </a:r>
           </a:p>
@@ -4032,7 +4312,7 @@
           </a:prstGeom>
           <a:extLst>
             <a:ext uri="{C572A759-6A51-4108-AA02-DFA0A04FC94B}">
-              <ma14:wrappingTextBoxFlag xmlns:ma14="http://schemas.microsoft.com/office/mac/drawingml/2011/main" xmlns="" val="1"/>
+              <ma14:wrappingTextBoxFlag xmlns:ma14="http://schemas.microsoft.com/office/mac/drawingml/2011/main" val="1"/>
             </a:ext>
           </a:extLst>
         </p:spPr>
@@ -4041,7 +4321,7 @@
           <a:lstStyle/>
           <a:p>
             <a:fld id="{86CB4B4D-7CA3-9044-876B-883B54F8677D}" type="slidenum">
-              <a:t>10</a:t>
+              <a:t>11</a:t>
             </a:fld>
             <a:endParaRPr/>
           </a:p>
@@ -4223,11 +4503,11 @@
   <p:clrMapOvr>
     <a:masterClrMapping/>
   </p:clrMapOvr>
-  <p:transition spd="slow"/>
+  <p:transition xmlns:p14="http://schemas.microsoft.com/office/powerpoint/2010/main" spd="slow"/>
 </p:sld>
 </file>
 
-<file path=ppt/slides/slide11.xml><?xml version="1.0" encoding="utf-8"?>
+<file path=ppt/slides/slide12.xml><?xml version="1.0" encoding="utf-8"?>
 <p:sld xmlns:a="http://schemas.openxmlformats.org/drawingml/2006/main" xmlns:r="http://schemas.openxmlformats.org/officeDocument/2006/relationships" xmlns:p="http://schemas.openxmlformats.org/presentationml/2006/main">
   <p:cSld>
     <p:spTree>
@@ -4290,7 +4570,7 @@
           </a:ln>
           <a:extLst>
             <a:ext uri="{C572A759-6A51-4108-AA02-DFA0A04FC94B}">
-              <ma14:wrappingTextBoxFlag xmlns:ma14="http://schemas.microsoft.com/office/mac/drawingml/2011/main" xmlns="" val="1"/>
+              <ma14:wrappingTextBoxFlag xmlns:ma14="http://schemas.microsoft.com/office/mac/drawingml/2011/main" val="1"/>
             </a:ext>
           </a:extLst>
         </p:spPr>
@@ -4372,7 +4652,7 @@
           </a:prstGeom>
           <a:extLst>
             <a:ext uri="{C572A759-6A51-4108-AA02-DFA0A04FC94B}">
-              <ma14:wrappingTextBoxFlag xmlns:ma14="http://schemas.microsoft.com/office/mac/drawingml/2011/main" xmlns="" val="1"/>
+              <ma14:wrappingTextBoxFlag xmlns:ma14="http://schemas.microsoft.com/office/mac/drawingml/2011/main" val="1"/>
             </a:ext>
           </a:extLst>
         </p:spPr>
@@ -4381,7 +4661,7 @@
           <a:lstStyle/>
           <a:p>
             <a:fld id="{86CB4B4D-7CA3-9044-876B-883B54F8677D}" type="slidenum">
-              <a:t>11</a:t>
+              <a:t>12</a:t>
             </a:fld>
             <a:endParaRPr/>
           </a:p>
@@ -4469,7 +4749,7 @@
           </a:ln>
           <a:extLst>
             <a:ext uri="{C572A759-6A51-4108-AA02-DFA0A04FC94B}">
-              <ma14:wrappingTextBoxFlag xmlns:ma14="http://schemas.microsoft.com/office/mac/drawingml/2011/main" xmlns="" val="1"/>
+              <ma14:wrappingTextBoxFlag xmlns:ma14="http://schemas.microsoft.com/office/mac/drawingml/2011/main" val="1"/>
             </a:ext>
           </a:extLst>
         </p:spPr>
@@ -4806,11 +5086,11 @@
   <p:clrMapOvr>
     <a:masterClrMapping/>
   </p:clrMapOvr>
-  <p:transition spd="slow"/>
+  <p:transition xmlns:p14="http://schemas.microsoft.com/office/powerpoint/2010/main" spd="slow"/>
 </p:sld>
 </file>
 
-<file path=ppt/slides/slide12.xml><?xml version="1.0" encoding="utf-8"?>
+<file path=ppt/slides/slide13.xml><?xml version="1.0" encoding="utf-8"?>
 <p:sld xmlns:a="http://schemas.openxmlformats.org/drawingml/2006/main" xmlns:r="http://schemas.openxmlformats.org/officeDocument/2006/relationships" xmlns:p="http://schemas.openxmlformats.org/presentationml/2006/main">
   <p:cSld>
     <p:spTree>
@@ -4846,7 +5126,7 @@
           </a:ln>
           <a:extLst>
             <a:ext uri="{C572A759-6A51-4108-AA02-DFA0A04FC94B}">
-              <ma14:wrappingTextBoxFlag xmlns:ma14="http://schemas.microsoft.com/office/mac/drawingml/2011/main" xmlns="" val="1"/>
+              <ma14:wrappingTextBoxFlag xmlns:ma14="http://schemas.microsoft.com/office/mac/drawingml/2011/main" val="1"/>
             </a:ext>
           </a:extLst>
         </p:spPr>
@@ -4928,7 +5208,7 @@
           </a:prstGeom>
           <a:extLst>
             <a:ext uri="{C572A759-6A51-4108-AA02-DFA0A04FC94B}">
-              <ma14:wrappingTextBoxFlag xmlns:ma14="http://schemas.microsoft.com/office/mac/drawingml/2011/main" xmlns="" val="1"/>
+              <ma14:wrappingTextBoxFlag xmlns:ma14="http://schemas.microsoft.com/office/mac/drawingml/2011/main" val="1"/>
             </a:ext>
           </a:extLst>
         </p:spPr>
@@ -4937,7 +5217,7 @@
           <a:lstStyle/>
           <a:p>
             <a:fld id="{86CB4B4D-7CA3-9044-876B-883B54F8677D}" type="slidenum">
-              <a:t>12</a:t>
+              <a:t>13</a:t>
             </a:fld>
             <a:endParaRPr/>
           </a:p>
@@ -5025,7 +5305,7 @@
           </a:ln>
           <a:extLst>
             <a:ext uri="{C572A759-6A51-4108-AA02-DFA0A04FC94B}">
-              <ma14:wrappingTextBoxFlag xmlns:ma14="http://schemas.microsoft.com/office/mac/drawingml/2011/main" xmlns="" val="1"/>
+              <ma14:wrappingTextBoxFlag xmlns:ma14="http://schemas.microsoft.com/office/mac/drawingml/2011/main" val="1"/>
             </a:ext>
           </a:extLst>
         </p:spPr>
@@ -5548,11 +5828,11 @@
   <p:clrMapOvr>
     <a:masterClrMapping/>
   </p:clrMapOvr>
-  <p:transition spd="slow"/>
+  <p:transition xmlns:p14="http://schemas.microsoft.com/office/powerpoint/2010/main" spd="slow"/>
 </p:sld>
 </file>
 
-<file path=ppt/slides/slide13.xml><?xml version="1.0" encoding="utf-8"?>
+<file path=ppt/slides/slide14.xml><?xml version="1.0" encoding="utf-8"?>
 <p:sld xmlns:a="http://schemas.openxmlformats.org/drawingml/2006/main" xmlns:r="http://schemas.openxmlformats.org/officeDocument/2006/relationships" xmlns:p="http://schemas.openxmlformats.org/presentationml/2006/main">
   <p:cSld>
     <p:spTree>
@@ -5588,7 +5868,7 @@
           </a:ln>
           <a:extLst>
             <a:ext uri="{C572A759-6A51-4108-AA02-DFA0A04FC94B}">
-              <ma14:wrappingTextBoxFlag xmlns:ma14="http://schemas.microsoft.com/office/mac/drawingml/2011/main" xmlns="" val="1"/>
+              <ma14:wrappingTextBoxFlag xmlns:ma14="http://schemas.microsoft.com/office/mac/drawingml/2011/main" val="1"/>
             </a:ext>
           </a:extLst>
         </p:spPr>
@@ -5670,7 +5950,7 @@
           </a:prstGeom>
           <a:extLst>
             <a:ext uri="{C572A759-6A51-4108-AA02-DFA0A04FC94B}">
-              <ma14:wrappingTextBoxFlag xmlns:ma14="http://schemas.microsoft.com/office/mac/drawingml/2011/main" xmlns="" val="1"/>
+              <ma14:wrappingTextBoxFlag xmlns:ma14="http://schemas.microsoft.com/office/mac/drawingml/2011/main" val="1"/>
             </a:ext>
           </a:extLst>
         </p:spPr>
@@ -5679,7 +5959,7 @@
           <a:lstStyle/>
           <a:p>
             <a:fld id="{86CB4B4D-7CA3-9044-876B-883B54F8677D}" type="slidenum">
-              <a:t>13</a:t>
+              <a:t>14</a:t>
             </a:fld>
             <a:endParaRPr/>
           </a:p>
@@ -5704,7 +5984,7 @@
           </a:ln>
           <a:extLst>
             <a:ext uri="{C572A759-6A51-4108-AA02-DFA0A04FC94B}">
-              <ma14:wrappingTextBoxFlag xmlns:ma14="http://schemas.microsoft.com/office/mac/drawingml/2011/main" xmlns="" val="1"/>
+              <ma14:wrappingTextBoxFlag xmlns:ma14="http://schemas.microsoft.com/office/mac/drawingml/2011/main" val="1"/>
             </a:ext>
           </a:extLst>
         </p:spPr>
@@ -5756,7 +6036,7 @@
   <p:clrMapOvr>
     <a:masterClrMapping/>
   </p:clrMapOvr>
-  <p:transition spd="slow"/>
+  <p:transition xmlns:p14="http://schemas.microsoft.com/office/powerpoint/2010/main" spd="slow"/>
 </p:sld>
 </file>
 
@@ -5796,7 +6076,7 @@
           </a:ln>
           <a:extLst>
             <a:ext uri="{C572A759-6A51-4108-AA02-DFA0A04FC94B}">
-              <ma14:wrappingTextBoxFlag xmlns:ma14="http://schemas.microsoft.com/office/mac/drawingml/2011/main" xmlns="" val="1"/>
+              <ma14:wrappingTextBoxFlag xmlns:ma14="http://schemas.microsoft.com/office/mac/drawingml/2011/main" val="1"/>
             </a:ext>
           </a:extLst>
         </p:spPr>
@@ -5963,7 +6243,7 @@
           </a:prstGeom>
           <a:extLst>
             <a:ext uri="{C572A759-6A51-4108-AA02-DFA0A04FC94B}">
-              <ma14:wrappingTextBoxFlag xmlns:ma14="http://schemas.microsoft.com/office/mac/drawingml/2011/main" xmlns="" val="1"/>
+              <ma14:wrappingTextBoxFlag xmlns:ma14="http://schemas.microsoft.com/office/mac/drawingml/2011/main" val="1"/>
             </a:ext>
           </a:extLst>
         </p:spPr>
@@ -6192,7 +6472,7 @@
   <p:clrMapOvr>
     <a:masterClrMapping/>
   </p:clrMapOvr>
-  <p:transition spd="slow"/>
+  <p:transition xmlns:p14="http://schemas.microsoft.com/office/powerpoint/2010/main" spd="slow"/>
 </p:sld>
 </file>
 
@@ -6232,7 +6512,7 @@
           </a:ln>
           <a:extLst>
             <a:ext uri="{C572A759-6A51-4108-AA02-DFA0A04FC94B}">
-              <ma14:wrappingTextBoxFlag xmlns:ma14="http://schemas.microsoft.com/office/mac/drawingml/2011/main" xmlns="" val="1"/>
+              <ma14:wrappingTextBoxFlag xmlns:ma14="http://schemas.microsoft.com/office/mac/drawingml/2011/main" val="1"/>
             </a:ext>
           </a:extLst>
         </p:spPr>
@@ -6437,7 +6717,7 @@
           </a:prstGeom>
           <a:extLst>
             <a:ext uri="{C572A759-6A51-4108-AA02-DFA0A04FC94B}">
-              <ma14:wrappingTextBoxFlag xmlns:ma14="http://schemas.microsoft.com/office/mac/drawingml/2011/main" xmlns="" val="1"/>
+              <ma14:wrappingTextBoxFlag xmlns:ma14="http://schemas.microsoft.com/office/mac/drawingml/2011/main" val="1"/>
             </a:ext>
           </a:extLst>
         </p:spPr>
@@ -6628,11 +6908,271 @@
   <p:clrMapOvr>
     <a:masterClrMapping/>
   </p:clrMapOvr>
-  <p:transition spd="slow"/>
+  <p:transition xmlns:p14="http://schemas.microsoft.com/office/powerpoint/2010/main" spd="slow"/>
+  <p:timing>
+    <p:tnLst>
+      <p:par>
+        <p:cTn xmlns:p14="http://schemas.microsoft.com/office/powerpoint/2010/main" id="1" dur="indefinite" restart="never" nodeType="tmRoot"/>
+      </p:par>
+    </p:tnLst>
+  </p:timing>
 </p:sld>
 </file>
 
 <file path=ppt/slides/slide4.xml><?xml version="1.0" encoding="utf-8"?>
+<p:sld xmlns:a="http://schemas.openxmlformats.org/drawingml/2006/main" xmlns:r="http://schemas.openxmlformats.org/officeDocument/2006/relationships" xmlns:p="http://schemas.openxmlformats.org/presentationml/2006/main">
+  <p:cSld>
+    <p:spTree>
+      <p:nvGrpSpPr>
+        <p:cNvPr id="1" name=""/>
+        <p:cNvGrpSpPr/>
+        <p:nvPr/>
+      </p:nvGrpSpPr>
+      <p:grpSpPr>
+        <a:xfrm>
+          <a:off x="0" y="0"/>
+          <a:ext cx="0" cy="0"/>
+          <a:chOff x="0" y="0"/>
+          <a:chExt cx="0" cy="0"/>
+        </a:xfrm>
+      </p:grpSpPr>
+      <p:pic>
+        <p:nvPicPr>
+          <p:cNvPr id="8" name="image6.png" descr="Gamecontroller"/>
+          <p:cNvPicPr>
+            <a:picLocks noChangeAspect="1"/>
+          </p:cNvPicPr>
+          <p:nvPr/>
+        </p:nvPicPr>
+        <p:blipFill>
+          <a:blip r:embed="rId2"/>
+          <a:stretch>
+            <a:fillRect/>
+          </a:stretch>
+        </p:blipFill>
+        <p:spPr>
+          <a:xfrm>
+            <a:off x="154513" y="91538"/>
+            <a:ext cx="540000" cy="540000"/>
+          </a:xfrm>
+          <a:prstGeom prst="rect">
+            <a:avLst/>
+          </a:prstGeom>
+          <a:ln w="12700">
+            <a:miter lim="400000"/>
+          </a:ln>
+        </p:spPr>
+      </p:pic>
+      <p:sp>
+        <p:nvSpPr>
+          <p:cNvPr id="181" name="Shape 181"/>
+          <p:cNvSpPr/>
+          <p:nvPr/>
+        </p:nvSpPr>
+        <p:spPr>
+          <a:xfrm>
+            <a:off x="3935999" y="6396609"/>
+            <a:ext cx="4114803" cy="269239"/>
+          </a:xfrm>
+          <a:prstGeom prst="rect">
+            <a:avLst/>
+          </a:prstGeom>
+          <a:ln w="12700">
+            <a:miter lim="400000"/>
+          </a:ln>
+          <a:extLst>
+            <a:ext uri="{C572A759-6A51-4108-AA02-DFA0A04FC94B}">
+              <ma14:wrappingTextBoxFlag xmlns:ma14="http://schemas.microsoft.com/office/mac/drawingml/2011/main" val="1"/>
+            </a:ext>
+          </a:extLst>
+        </p:spPr>
+        <p:txBody>
+          <a:bodyPr lIns="45718" tIns="45718" rIns="45718" bIns="45718" anchor="ctr">
+            <a:spAutoFit/>
+          </a:bodyPr>
+          <a:lstStyle>
+            <a:lvl1pPr algn="ctr">
+              <a:defRPr sz="1200">
+                <a:solidFill>
+                  <a:srgbClr val="888888"/>
+                </a:solidFill>
+              </a:defRPr>
+            </a:lvl1pPr>
+          </a:lstStyle>
+          <a:p>
+            <a:r>
+              <a:t>Mlst.-Präsentation Nr. 1  /  Gruppe 15</a:t>
+            </a:r>
+          </a:p>
+        </p:txBody>
+      </p:sp>
+      <p:sp>
+        <p:nvSpPr>
+          <p:cNvPr id="182" name="Shape 182"/>
+          <p:cNvSpPr>
+            <a:spLocks noGrp="1"/>
+          </p:cNvSpPr>
+          <p:nvPr>
+            <p:ph type="sldNum" sz="quarter" idx="4294967295"/>
+          </p:nvPr>
+        </p:nvSpPr>
+        <p:spPr>
+          <a:xfrm>
+            <a:off x="11169739" y="6404292"/>
+            <a:ext cx="184059" cy="269239"/>
+          </a:xfrm>
+          <a:prstGeom prst="rect">
+            <a:avLst/>
+          </a:prstGeom>
+          <a:extLst>
+            <a:ext uri="{C572A759-6A51-4108-AA02-DFA0A04FC94B}">
+              <ma14:wrappingTextBoxFlag xmlns:ma14="http://schemas.microsoft.com/office/mac/drawingml/2011/main" val="1"/>
+            </a:ext>
+          </a:extLst>
+        </p:spPr>
+        <p:txBody>
+          <a:bodyPr/>
+          <a:lstStyle/>
+          <a:p>
+            <a:fld id="{86CB4B4D-7CA3-9044-876B-883B54F8677D}" type="slidenum">
+              <a:t>4</a:t>
+            </a:fld>
+            <a:endParaRPr/>
+          </a:p>
+        </p:txBody>
+      </p:sp>
+      <p:sp>
+        <p:nvSpPr>
+          <p:cNvPr id="183" name="Shape 183"/>
+          <p:cNvSpPr>
+            <a:spLocks noGrp="1"/>
+          </p:cNvSpPr>
+          <p:nvPr>
+            <p:ph type="title"/>
+          </p:nvPr>
+        </p:nvSpPr>
+        <p:spPr>
+          <a:xfrm>
+            <a:off x="0" y="-2"/>
+            <a:ext cx="10515600" cy="720440"/>
+          </a:xfrm>
+          <a:prstGeom prst="rect">
+            <a:avLst/>
+          </a:prstGeom>
+        </p:spPr>
+        <p:txBody>
+          <a:bodyPr/>
+          <a:lstStyle>
+            <a:lvl1pPr>
+              <a:defRPr sz="2000" b="1">
+                <a:latin typeface="Arial"/>
+                <a:ea typeface="Arial"/>
+                <a:cs typeface="Arial"/>
+                <a:sym typeface="Arial"/>
+              </a:defRPr>
+            </a:lvl1pPr>
+          </a:lstStyle>
+          <a:p>
+            <a:r>
+              <a:rPr dirty="0"/>
+              <a:t>	</a:t>
+            </a:r>
+            <a:r>
+              <a:rPr lang="de-CH" dirty="0" smtClean="0"/>
+              <a:t>Outline / Spieldemonstration</a:t>
+            </a:r>
+            <a:endParaRPr dirty="0"/>
+          </a:p>
+        </p:txBody>
+      </p:sp>
+      <p:sp>
+        <p:nvSpPr>
+          <p:cNvPr id="184" name="Shape 184"/>
+          <p:cNvSpPr/>
+          <p:nvPr/>
+        </p:nvSpPr>
+        <p:spPr>
+          <a:xfrm>
+            <a:off x="-16626" y="720436"/>
+            <a:ext cx="3088628" cy="2"/>
+          </a:xfrm>
+          <a:prstGeom prst="line">
+            <a:avLst/>
+          </a:prstGeom>
+          <a:ln w="28575">
+            <a:solidFill>
+              <a:srgbClr val="000000"/>
+            </a:solidFill>
+            <a:miter/>
+          </a:ln>
+          <a:effectLst>
+            <a:outerShdw blurRad="50800" dist="38100" dir="2700000" rotWithShape="0">
+              <a:srgbClr val="000000">
+                <a:alpha val="40000"/>
+              </a:srgbClr>
+            </a:outerShdw>
+          </a:effectLst>
+        </p:spPr>
+        <p:txBody>
+          <a:bodyPr lIns="45718" tIns="45718" rIns="45718" bIns="45718"/>
+          <a:lstStyle/>
+          <a:p>
+            <a:endParaRPr/>
+          </a:p>
+        </p:txBody>
+      </p:sp>
+      <p:pic>
+        <p:nvPicPr>
+          <p:cNvPr id="2" name="Bild 1" descr="Bildschirmfoto 2020-04-14 um 22.53.31.png"/>
+          <p:cNvPicPr>
+            <a:picLocks noChangeAspect="1"/>
+          </p:cNvPicPr>
+          <p:nvPr/>
+        </p:nvPicPr>
+        <p:blipFill>
+          <a:blip r:embed="rId3">
+            <a:extLst>
+              <a:ext uri="{28A0092B-C50C-407E-A947-70E740481C1C}">
+                <a14:useLocalDpi xmlns:a14="http://schemas.microsoft.com/office/drawing/2010/main" val="0"/>
+              </a:ext>
+            </a:extLst>
+          </a:blip>
+          <a:stretch>
+            <a:fillRect/>
+          </a:stretch>
+        </p:blipFill>
+        <p:spPr>
+          <a:xfrm>
+            <a:off x="2302804" y="920419"/>
+            <a:ext cx="7525652" cy="5231246"/>
+          </a:xfrm>
+          <a:prstGeom prst="rect">
+            <a:avLst/>
+          </a:prstGeom>
+        </p:spPr>
+      </p:pic>
+    </p:spTree>
+    <p:extLst>
+      <p:ext uri="{BB962C8B-B14F-4D97-AF65-F5344CB8AC3E}">
+        <p14:creationId xmlns:p14="http://schemas.microsoft.com/office/powerpoint/2010/main" val="1549585957"/>
+      </p:ext>
+    </p:extLst>
+  </p:cSld>
+  <p:clrMapOvr>
+    <a:masterClrMapping/>
+  </p:clrMapOvr>
+  <p:transition xmlns:p14="http://schemas.microsoft.com/office/powerpoint/2010/main" spd="slow"/>
+  <p:timing>
+    <p:tnLst>
+      <p:par>
+        <p:cTn xmlns:p14="http://schemas.microsoft.com/office/powerpoint/2010/main" id="1" dur="indefinite" restart="never" nodeType="tmRoot"/>
+      </p:par>
+    </p:tnLst>
+  </p:timing>
+</p:sld>
+</file>
+
+<file path=ppt/slides/slide5.xml><?xml version="1.0" encoding="utf-8"?>
 <p:sld xmlns:a="http://schemas.openxmlformats.org/drawingml/2006/main" xmlns:r="http://schemas.openxmlformats.org/officeDocument/2006/relationships" xmlns:p="http://schemas.openxmlformats.org/presentationml/2006/main">
   <p:cSld>
     <p:spTree>
@@ -6668,7 +7208,7 @@
           </a:ln>
           <a:extLst>
             <a:ext uri="{C572A759-6A51-4108-AA02-DFA0A04FC94B}">
-              <ma14:wrappingTextBoxFlag xmlns:ma14="http://schemas.microsoft.com/office/mac/drawingml/2011/main" xmlns="" val="1"/>
+              <ma14:wrappingTextBoxFlag xmlns:ma14="http://schemas.microsoft.com/office/mac/drawingml/2011/main" val="1"/>
             </a:ext>
           </a:extLst>
         </p:spPr>
@@ -6873,7 +7413,7 @@
           </a:prstGeom>
           <a:extLst>
             <a:ext uri="{C572A759-6A51-4108-AA02-DFA0A04FC94B}">
-              <ma14:wrappingTextBoxFlag xmlns:ma14="http://schemas.microsoft.com/office/mac/drawingml/2011/main" xmlns="" val="1"/>
+              <ma14:wrappingTextBoxFlag xmlns:ma14="http://schemas.microsoft.com/office/mac/drawingml/2011/main" val="1"/>
             </a:ext>
           </a:extLst>
         </p:spPr>
@@ -6882,7 +7422,7 @@
           <a:lstStyle/>
           <a:p>
             <a:fld id="{86CB4B4D-7CA3-9044-876B-883B54F8677D}" type="slidenum">
-              <a:t>4</a:t>
+              <a:t>5</a:t>
             </a:fld>
             <a:endParaRPr/>
           </a:p>
@@ -7064,11 +7604,18 @@
   <p:clrMapOvr>
     <a:masterClrMapping/>
   </p:clrMapOvr>
-  <p:transition spd="slow"/>
+  <p:transition xmlns:p14="http://schemas.microsoft.com/office/powerpoint/2010/main" spd="slow"/>
+  <p:timing>
+    <p:tnLst>
+      <p:par>
+        <p:cTn xmlns:p14="http://schemas.microsoft.com/office/powerpoint/2010/main" id="1" dur="indefinite" restart="never" nodeType="tmRoot"/>
+      </p:par>
+    </p:tnLst>
+  </p:timing>
 </p:sld>
 </file>
 
-<file path=ppt/slides/slide5.xml><?xml version="1.0" encoding="utf-8"?>
+<file path=ppt/slides/slide6.xml><?xml version="1.0" encoding="utf-8"?>
 <p:sld xmlns:a="http://schemas.openxmlformats.org/drawingml/2006/main" xmlns:r="http://schemas.openxmlformats.org/officeDocument/2006/relationships" xmlns:p="http://schemas.openxmlformats.org/presentationml/2006/main">
   <p:cSld>
     <p:spTree>
@@ -7104,7 +7651,7 @@
           </a:ln>
           <a:extLst>
             <a:ext uri="{C572A759-6A51-4108-AA02-DFA0A04FC94B}">
-              <ma14:wrappingTextBoxFlag xmlns:ma14="http://schemas.microsoft.com/office/mac/drawingml/2011/main" xmlns="" val="1"/>
+              <ma14:wrappingTextBoxFlag xmlns:ma14="http://schemas.microsoft.com/office/mac/drawingml/2011/main" val="1"/>
             </a:ext>
           </a:extLst>
         </p:spPr>
@@ -7169,7 +7716,7 @@
           </a:prstGeom>
           <a:extLst>
             <a:ext uri="{C572A759-6A51-4108-AA02-DFA0A04FC94B}">
-              <ma14:wrappingTextBoxFlag xmlns:ma14="http://schemas.microsoft.com/office/mac/drawingml/2011/main" xmlns="" val="1"/>
+              <ma14:wrappingTextBoxFlag xmlns:ma14="http://schemas.microsoft.com/office/mac/drawingml/2011/main" val="1"/>
             </a:ext>
           </a:extLst>
         </p:spPr>
@@ -7178,7 +7725,7 @@
           <a:lstStyle/>
           <a:p>
             <a:fld id="{86CB4B4D-7CA3-9044-876B-883B54F8677D}" type="slidenum">
-              <a:t>5</a:t>
+              <a:t>6</a:t>
             </a:fld>
             <a:endParaRPr/>
           </a:p>
@@ -7304,7 +7851,7 @@
           </a:ln>
           <a:extLst>
             <a:ext uri="{C572A759-6A51-4108-AA02-DFA0A04FC94B}">
-              <ma14:wrappingTextBoxFlag xmlns:ma14="http://schemas.microsoft.com/office/mac/drawingml/2011/main" xmlns="" val="1"/>
+              <ma14:wrappingTextBoxFlag xmlns:ma14="http://schemas.microsoft.com/office/mac/drawingml/2011/main" val="1"/>
             </a:ext>
           </a:extLst>
         </p:spPr>
@@ -7552,11 +8099,11 @@
   <p:clrMapOvr>
     <a:masterClrMapping/>
   </p:clrMapOvr>
-  <p:transition spd="slow"/>
+  <p:transition xmlns:p14="http://schemas.microsoft.com/office/powerpoint/2010/main" spd="slow"/>
 </p:sld>
 </file>
 
-<file path=ppt/slides/slide6.xml><?xml version="1.0" encoding="utf-8"?>
+<file path=ppt/slides/slide7.xml><?xml version="1.0" encoding="utf-8"?>
 <p:sld xmlns:a="http://schemas.openxmlformats.org/drawingml/2006/main" xmlns:r="http://schemas.openxmlformats.org/officeDocument/2006/relationships" xmlns:p="http://schemas.openxmlformats.org/presentationml/2006/main">
   <p:cSld>
     <p:spTree>
@@ -7592,7 +8139,7 @@
           </a:ln>
           <a:extLst>
             <a:ext uri="{C572A759-6A51-4108-AA02-DFA0A04FC94B}">
-              <ma14:wrappingTextBoxFlag xmlns:ma14="http://schemas.microsoft.com/office/mac/drawingml/2011/main" xmlns="" val="1"/>
+              <ma14:wrappingTextBoxFlag xmlns:ma14="http://schemas.microsoft.com/office/mac/drawingml/2011/main" val="1"/>
             </a:ext>
           </a:extLst>
         </p:spPr>
@@ -7636,7 +8183,7 @@
           </a:prstGeom>
           <a:extLst>
             <a:ext uri="{C572A759-6A51-4108-AA02-DFA0A04FC94B}">
-              <ma14:wrappingTextBoxFlag xmlns:ma14="http://schemas.microsoft.com/office/mac/drawingml/2011/main" xmlns="" val="1"/>
+              <ma14:wrappingTextBoxFlag xmlns:ma14="http://schemas.microsoft.com/office/mac/drawingml/2011/main" val="1"/>
             </a:ext>
           </a:extLst>
         </p:spPr>
@@ -7645,7 +8192,7 @@
           <a:lstStyle/>
           <a:p>
             <a:fld id="{86CB4B4D-7CA3-9044-876B-883B54F8677D}" type="slidenum">
-              <a:t>6</a:t>
+              <a:t>7</a:t>
             </a:fld>
             <a:endParaRPr/>
           </a:p>
@@ -7784,11 +8331,11 @@
   <p:clrMapOvr>
     <a:masterClrMapping/>
   </p:clrMapOvr>
-  <p:transition spd="slow"/>
+  <p:transition xmlns:p14="http://schemas.microsoft.com/office/powerpoint/2010/main" spd="slow"/>
 </p:sld>
 </file>
 
-<file path=ppt/slides/slide7.xml><?xml version="1.0" encoding="utf-8"?>
+<file path=ppt/slides/slide8.xml><?xml version="1.0" encoding="utf-8"?>
 <p:sld xmlns:a="http://schemas.openxmlformats.org/drawingml/2006/main" xmlns:r="http://schemas.openxmlformats.org/officeDocument/2006/relationships" xmlns:p="http://schemas.openxmlformats.org/presentationml/2006/main">
   <p:cSld>
     <p:spTree>
@@ -7824,7 +8371,7 @@
           </a:ln>
           <a:extLst>
             <a:ext uri="{C572A759-6A51-4108-AA02-DFA0A04FC94B}">
-              <ma14:wrappingTextBoxFlag xmlns:ma14="http://schemas.microsoft.com/office/mac/drawingml/2011/main" xmlns="" val="1"/>
+              <ma14:wrappingTextBoxFlag xmlns:ma14="http://schemas.microsoft.com/office/mac/drawingml/2011/main" val="1"/>
             </a:ext>
           </a:extLst>
         </p:spPr>
@@ -8029,7 +8576,7 @@
           </a:prstGeom>
           <a:extLst>
             <a:ext uri="{C572A759-6A51-4108-AA02-DFA0A04FC94B}">
-              <ma14:wrappingTextBoxFlag xmlns:ma14="http://schemas.microsoft.com/office/mac/drawingml/2011/main" xmlns="" val="1"/>
+              <ma14:wrappingTextBoxFlag xmlns:ma14="http://schemas.microsoft.com/office/mac/drawingml/2011/main" val="1"/>
             </a:ext>
           </a:extLst>
         </p:spPr>
@@ -8038,7 +8585,7 @@
           <a:lstStyle/>
           <a:p>
             <a:fld id="{86CB4B4D-7CA3-9044-876B-883B54F8677D}" type="slidenum">
-              <a:t>7</a:t>
+              <a:t>8</a:t>
             </a:fld>
             <a:endParaRPr/>
           </a:p>
@@ -8220,11 +8767,11 @@
   <p:clrMapOvr>
     <a:masterClrMapping/>
   </p:clrMapOvr>
-  <p:transition spd="slow"/>
+  <p:transition xmlns:p14="http://schemas.microsoft.com/office/powerpoint/2010/main" spd="slow"/>
 </p:sld>
 </file>
 
-<file path=ppt/slides/slide8.xml><?xml version="1.0" encoding="utf-8"?>
+<file path=ppt/slides/slide9.xml><?xml version="1.0" encoding="utf-8"?>
 <p:sld xmlns:a="http://schemas.openxmlformats.org/drawingml/2006/main" xmlns:r="http://schemas.openxmlformats.org/officeDocument/2006/relationships" xmlns:p="http://schemas.openxmlformats.org/presentationml/2006/main">
   <p:cSld>
     <p:spTree>
@@ -8260,7 +8807,7 @@
           </a:ln>
           <a:extLst>
             <a:ext uri="{C572A759-6A51-4108-AA02-DFA0A04FC94B}">
-              <ma14:wrappingTextBoxFlag xmlns:ma14="http://schemas.microsoft.com/office/mac/drawingml/2011/main" xmlns="" val="1"/>
+              <ma14:wrappingTextBoxFlag xmlns:ma14="http://schemas.microsoft.com/office/mac/drawingml/2011/main" val="1"/>
             </a:ext>
           </a:extLst>
         </p:spPr>
@@ -8342,7 +8889,7 @@
           </a:prstGeom>
           <a:extLst>
             <a:ext uri="{C572A759-6A51-4108-AA02-DFA0A04FC94B}">
-              <ma14:wrappingTextBoxFlag xmlns:ma14="http://schemas.microsoft.com/office/mac/drawingml/2011/main" xmlns="" val="1"/>
+              <ma14:wrappingTextBoxFlag xmlns:ma14="http://schemas.microsoft.com/office/mac/drawingml/2011/main" val="1"/>
             </a:ext>
           </a:extLst>
         </p:spPr>
@@ -8351,7 +8898,7 @@
           <a:lstStyle/>
           <a:p>
             <a:fld id="{86CB4B4D-7CA3-9044-876B-883B54F8677D}" type="slidenum">
-              <a:t>8</a:t>
+              <a:t>9</a:t>
             </a:fld>
             <a:endParaRPr/>
           </a:p>
@@ -8439,7 +8986,7 @@
           </a:ln>
           <a:extLst>
             <a:ext uri="{C572A759-6A51-4108-AA02-DFA0A04FC94B}">
-              <ma14:wrappingTextBoxFlag xmlns:ma14="http://schemas.microsoft.com/office/mac/drawingml/2011/main" xmlns="" val="1"/>
+              <ma14:wrappingTextBoxFlag xmlns:ma14="http://schemas.microsoft.com/office/mac/drawingml/2011/main" val="1"/>
             </a:ext>
           </a:extLst>
         </p:spPr>
@@ -8635,281 +9182,7 @@
   <p:clrMapOvr>
     <a:masterClrMapping/>
   </p:clrMapOvr>
-  <p:transition spd="slow"/>
-</p:sld>
-</file>
-
-<file path=ppt/slides/slide9.xml><?xml version="1.0" encoding="utf-8"?>
-<p:sld xmlns:a="http://schemas.openxmlformats.org/drawingml/2006/main" xmlns:r="http://schemas.openxmlformats.org/officeDocument/2006/relationships" xmlns:p="http://schemas.openxmlformats.org/presentationml/2006/main">
-  <p:cSld>
-    <p:spTree>
-      <p:nvGrpSpPr>
-        <p:cNvPr id="1" name=""/>
-        <p:cNvGrpSpPr/>
-        <p:nvPr/>
-      </p:nvGrpSpPr>
-      <p:grpSpPr>
-        <a:xfrm>
-          <a:off x="0" y="0"/>
-          <a:ext cx="0" cy="0"/>
-          <a:chOff x="0" y="0"/>
-          <a:chExt cx="0" cy="0"/>
-        </a:xfrm>
-      </p:grpSpPr>
-      <p:sp>
-        <p:nvSpPr>
-          <p:cNvPr id="206" name="Shape 206"/>
-          <p:cNvSpPr/>
-          <p:nvPr/>
-        </p:nvSpPr>
-        <p:spPr>
-          <a:xfrm>
-            <a:off x="4038600" y="6404292"/>
-            <a:ext cx="4114800" cy="269239"/>
-          </a:xfrm>
-          <a:prstGeom prst="rect">
-            <a:avLst/>
-          </a:prstGeom>
-          <a:ln w="12700">
-            <a:miter lim="400000"/>
-          </a:ln>
-          <a:extLst>
-            <a:ext uri="{C572A759-6A51-4108-AA02-DFA0A04FC94B}">
-              <ma14:wrappingTextBoxFlag xmlns:ma14="http://schemas.microsoft.com/office/mac/drawingml/2011/main" xmlns="" val="1"/>
-            </a:ext>
-          </a:extLst>
-        </p:spPr>
-        <p:txBody>
-          <a:bodyPr lIns="45718" tIns="45718" rIns="45718" bIns="45718" anchor="ctr">
-            <a:spAutoFit/>
-          </a:bodyPr>
-          <a:lstStyle>
-            <a:lvl1pPr algn="ctr">
-              <a:defRPr sz="1200">
-                <a:solidFill>
-                  <a:srgbClr val="888888"/>
-                </a:solidFill>
-              </a:defRPr>
-            </a:lvl1pPr>
-          </a:lstStyle>
-          <a:p>
-            <a:r>
-              <a:t>Mlst.-Präsentation Nr. 1  /  Gruppe 15</a:t>
-            </a:r>
-          </a:p>
-        </p:txBody>
-      </p:sp>
-      <p:sp>
-        <p:nvSpPr>
-          <p:cNvPr id="207" name="Shape 207"/>
-          <p:cNvSpPr>
-            <a:spLocks noGrp="1"/>
-          </p:cNvSpPr>
-          <p:nvPr>
-            <p:ph type="title"/>
-          </p:nvPr>
-        </p:nvSpPr>
-        <p:spPr>
-          <a:xfrm>
-            <a:off x="0" y="-2"/>
-            <a:ext cx="10515600" cy="720440"/>
-          </a:xfrm>
-          <a:prstGeom prst="rect">
-            <a:avLst/>
-          </a:prstGeom>
-        </p:spPr>
-        <p:txBody>
-          <a:bodyPr/>
-          <a:lstStyle>
-            <a:lvl1pPr>
-              <a:defRPr sz="2000" b="1">
-                <a:latin typeface="Arial"/>
-                <a:ea typeface="Arial"/>
-                <a:cs typeface="Arial"/>
-                <a:sym typeface="Arial"/>
-              </a:defRPr>
-            </a:lvl1pPr>
-          </a:lstStyle>
-          <a:p>
-            <a:r>
-              <a:t>	Technische Eigenheiten</a:t>
-            </a:r>
-          </a:p>
-        </p:txBody>
-      </p:sp>
-      <p:sp>
-        <p:nvSpPr>
-          <p:cNvPr id="208" name="Shape 208"/>
-          <p:cNvSpPr>
-            <a:spLocks noGrp="1"/>
-          </p:cNvSpPr>
-          <p:nvPr>
-            <p:ph type="sldNum" sz="quarter" idx="4294967295"/>
-          </p:nvPr>
-        </p:nvSpPr>
-        <p:spPr>
-          <a:xfrm>
-            <a:off x="11169739" y="6404292"/>
-            <a:ext cx="184059" cy="269239"/>
-          </a:xfrm>
-          <a:prstGeom prst="rect">
-            <a:avLst/>
-          </a:prstGeom>
-          <a:extLst>
-            <a:ext uri="{C572A759-6A51-4108-AA02-DFA0A04FC94B}">
-              <ma14:wrappingTextBoxFlag xmlns:ma14="http://schemas.microsoft.com/office/mac/drawingml/2011/main" xmlns="" val="1"/>
-            </a:ext>
-          </a:extLst>
-        </p:spPr>
-        <p:txBody>
-          <a:bodyPr/>
-          <a:lstStyle/>
-          <a:p>
-            <a:fld id="{86CB4B4D-7CA3-9044-876B-883B54F8677D}" type="slidenum">
-              <a:t>9</a:t>
-            </a:fld>
-            <a:endParaRPr/>
-          </a:p>
-        </p:txBody>
-      </p:sp>
-      <p:sp>
-        <p:nvSpPr>
-          <p:cNvPr id="209" name="Shape 209"/>
-          <p:cNvSpPr/>
-          <p:nvPr/>
-        </p:nvSpPr>
-        <p:spPr>
-          <a:xfrm>
-            <a:off x="-11084" y="720436"/>
-            <a:ext cx="4584003" cy="2"/>
-          </a:xfrm>
-          <a:prstGeom prst="line">
-            <a:avLst/>
-          </a:prstGeom>
-          <a:ln w="28575">
-            <a:solidFill>
-              <a:srgbClr val="000000"/>
-            </a:solidFill>
-            <a:miter/>
-          </a:ln>
-          <a:effectLst>
-            <a:outerShdw blurRad="50800" dist="38100" dir="2700000" rotWithShape="0">
-              <a:srgbClr val="000000">
-                <a:alpha val="40000"/>
-              </a:srgbClr>
-            </a:outerShdw>
-          </a:effectLst>
-        </p:spPr>
-        <p:txBody>
-          <a:bodyPr lIns="45718" tIns="45718" rIns="45718" bIns="45718"/>
-          <a:lstStyle/>
-          <a:p>
-            <a:endParaRPr/>
-          </a:p>
-        </p:txBody>
-      </p:sp>
-      <p:pic>
-        <p:nvPicPr>
-          <p:cNvPr id="210" name="image10.png" descr="Fingerabdruck"/>
-          <p:cNvPicPr>
-            <a:picLocks noChangeAspect="1"/>
-          </p:cNvPicPr>
-          <p:nvPr/>
-        </p:nvPicPr>
-        <p:blipFill>
-          <a:blip r:embed="rId2"/>
-          <a:stretch>
-            <a:fillRect/>
-          </a:stretch>
-        </p:blipFill>
-        <p:spPr>
-          <a:xfrm>
-            <a:off x="263999" y="86303"/>
-            <a:ext cx="547828" cy="547829"/>
-          </a:xfrm>
-          <a:prstGeom prst="rect">
-            <a:avLst/>
-          </a:prstGeom>
-          <a:ln w="12700">
-            <a:miter lim="400000"/>
-          </a:ln>
-        </p:spPr>
-      </p:pic>
-      <p:sp>
-        <p:nvSpPr>
-          <p:cNvPr id="211" name="Shape 211"/>
-          <p:cNvSpPr/>
-          <p:nvPr/>
-        </p:nvSpPr>
-        <p:spPr>
-          <a:xfrm>
-            <a:off x="4401723" y="813884"/>
-            <a:ext cx="3890823" cy="383539"/>
-          </a:xfrm>
-          <a:prstGeom prst="rect">
-            <a:avLst/>
-          </a:prstGeom>
-          <a:ln w="12700">
-            <a:miter lim="400000"/>
-          </a:ln>
-          <a:extLst>
-            <a:ext uri="{C572A759-6A51-4108-AA02-DFA0A04FC94B}">
-              <ma14:wrappingTextBoxFlag xmlns:ma14="http://schemas.microsoft.com/office/mac/drawingml/2011/main" xmlns="" val="1"/>
-            </a:ext>
-          </a:extLst>
-        </p:spPr>
-        <p:txBody>
-          <a:bodyPr wrap="none" lIns="45718" tIns="45718" rIns="45718" bIns="45718">
-            <a:spAutoFit/>
-          </a:bodyPr>
-          <a:lstStyle>
-            <a:lvl1pPr>
-              <a:lnSpc>
-                <a:spcPct val="120000"/>
-              </a:lnSpc>
-              <a:defRPr sz="2000"/>
-            </a:lvl1pPr>
-          </a:lstStyle>
-          <a:p>
-            <a:r>
-              <a:t>log4j2.properties Datei (Beispiel)</a:t>
-            </a:r>
-          </a:p>
-        </p:txBody>
-      </p:sp>
-      <p:pic>
-        <p:nvPicPr>
-          <p:cNvPr id="212" name="image13.png"/>
-          <p:cNvPicPr>
-            <a:picLocks noChangeAspect="1"/>
-          </p:cNvPicPr>
-          <p:nvPr/>
-        </p:nvPicPr>
-        <p:blipFill>
-          <a:blip r:embed="rId3"/>
-          <a:stretch>
-            <a:fillRect/>
-          </a:stretch>
-        </p:blipFill>
-        <p:spPr>
-          <a:xfrm>
-            <a:off x="1485138" y="1289286"/>
-            <a:ext cx="9608037" cy="4963394"/>
-          </a:xfrm>
-          <a:prstGeom prst="rect">
-            <a:avLst/>
-          </a:prstGeom>
-          <a:ln w="12700">
-            <a:miter lim="400000"/>
-          </a:ln>
-        </p:spPr>
-      </p:pic>
-    </p:spTree>
-  </p:cSld>
-  <p:clrMapOvr>
-    <a:masterClrMapping/>
-  </p:clrMapOvr>
-  <p:transition spd="slow"/>
+  <p:transition xmlns:p14="http://schemas.microsoft.com/office/powerpoint/2010/main" spd="slow"/>
 </p:sld>
 </file>
 

</xml_diff>

<commit_message>
Slight changes to game logic slide in Pres
</commit_message>
<xml_diff>
--- a/00_General/Presentation/MS 3/Presentation_Milestone_iii_Master.pptx
+++ b/00_General/Presentation/MS 3/Presentation_Milestone_iii_Master.pptx
@@ -325,7 +325,7 @@
   </p:defaultTextStyle>
   <p:extLst>
     <p:ext uri="{EFAFB233-063F-42B5-8137-9DF3F51BA10A}">
-      <p15:sldGuideLst xmlns:p15="http://schemas.microsoft.com/office/powerpoint/2012/main" xmlns="">
+      <p15:sldGuideLst xmlns:p15="http://schemas.microsoft.com/office/powerpoint/2012/main">
         <p15:guide id="1" orient="horz" pos="2160" userDrawn="1">
           <p15:clr>
             <a:srgbClr val="A4A3A4"/>
@@ -609,7 +609,7 @@
           <a:lstStyle/>
           <a:p>
             <a:fld id="{86CB4B4D-7CA3-9044-876B-883B54F8677D}" type="slidenum">
-              <a:t>‹Nr.›</a:t>
+              <a:t>‹#›</a:t>
             </a:fld>
             <a:endParaRPr/>
           </a:p>
@@ -620,7 +620,7 @@
   <p:clrMapOvr>
     <a:masterClrMapping/>
   </p:clrMapOvr>
-  <p:transition xmlns:p14="http://schemas.microsoft.com/office/powerpoint/2010/main" spd="med"/>
+  <p:transition spd="med"/>
 </p:sldLayout>
 </file>
 
@@ -807,7 +807,7 @@
           <a:lstStyle/>
           <a:p>
             <a:fld id="{86CB4B4D-7CA3-9044-876B-883B54F8677D}" type="slidenum">
-              <a:t>‹Nr.›</a:t>
+              <a:t>‹#›</a:t>
             </a:fld>
             <a:endParaRPr/>
           </a:p>
@@ -818,7 +818,7 @@
   <p:clrMapOvr>
     <a:masterClrMapping/>
   </p:clrMapOvr>
-  <p:transition xmlns:p14="http://schemas.microsoft.com/office/powerpoint/2010/main" spd="med"/>
+  <p:transition spd="med"/>
 </p:sldLayout>
 </file>
 
@@ -933,7 +933,7 @@
           <a:lstStyle/>
           <a:p>
             <a:fld id="{86CB4B4D-7CA3-9044-876B-883B54F8677D}" type="slidenum">
-              <a:t>‹Nr.›</a:t>
+              <a:t>‹#›</a:t>
             </a:fld>
             <a:endParaRPr/>
           </a:p>
@@ -944,7 +944,7 @@
   <p:clrMapOvr>
     <a:masterClrMapping/>
   </p:clrMapOvr>
-  <p:transition xmlns:p14="http://schemas.microsoft.com/office/powerpoint/2010/main" spd="med"/>
+  <p:transition spd="med"/>
 </p:sldLayout>
 </file>
 
@@ -1067,7 +1067,7 @@
           <a:lstStyle/>
           <a:p>
             <a:fld id="{86CB4B4D-7CA3-9044-876B-883B54F8677D}" type="slidenum">
-              <a:t>‹Nr.›</a:t>
+              <a:t>‹#›</a:t>
             </a:fld>
             <a:endParaRPr/>
           </a:p>
@@ -1078,7 +1078,7 @@
   <p:clrMapOvr>
     <a:masterClrMapping/>
   </p:clrMapOvr>
-  <p:transition xmlns:p14="http://schemas.microsoft.com/office/powerpoint/2010/main" spd="med"/>
+  <p:transition spd="med"/>
 </p:sldLayout>
 </file>
 
@@ -1201,7 +1201,7 @@
           <a:lstStyle/>
           <a:p>
             <a:fld id="{86CB4B4D-7CA3-9044-876B-883B54F8677D}" type="slidenum">
-              <a:t>‹Nr.›</a:t>
+              <a:t>‹#›</a:t>
             </a:fld>
             <a:endParaRPr/>
           </a:p>
@@ -1212,7 +1212,7 @@
   <p:clrMapOvr>
     <a:masterClrMapping/>
   </p:clrMapOvr>
-  <p:transition xmlns:p14="http://schemas.microsoft.com/office/powerpoint/2010/main" spd="med"/>
+  <p:transition spd="med"/>
 </p:sldLayout>
 </file>
 
@@ -1327,7 +1327,7 @@
           <a:lstStyle/>
           <a:p>
             <a:fld id="{86CB4B4D-7CA3-9044-876B-883B54F8677D}" type="slidenum">
-              <a:t>‹Nr.›</a:t>
+              <a:t>‹#›</a:t>
             </a:fld>
             <a:endParaRPr/>
           </a:p>
@@ -1338,7 +1338,7 @@
   <p:clrMapOvr>
     <a:masterClrMapping/>
   </p:clrMapOvr>
-  <p:transition xmlns:p14="http://schemas.microsoft.com/office/powerpoint/2010/main" spd="med"/>
+  <p:transition spd="med"/>
 </p:sldLayout>
 </file>
 
@@ -1461,7 +1461,7 @@
           <a:lstStyle/>
           <a:p>
             <a:fld id="{86CB4B4D-7CA3-9044-876B-883B54F8677D}" type="slidenum">
-              <a:t>‹Nr.›</a:t>
+              <a:t>‹#›</a:t>
             </a:fld>
             <a:endParaRPr/>
           </a:p>
@@ -1472,7 +1472,7 @@
   <p:clrMapOvr>
     <a:masterClrMapping/>
   </p:clrMapOvr>
-  <p:transition xmlns:p14="http://schemas.microsoft.com/office/powerpoint/2010/main" spd="med"/>
+  <p:transition spd="med"/>
 </p:sldLayout>
 </file>
 
@@ -1650,7 +1650,7 @@
           <a:lstStyle/>
           <a:p>
             <a:fld id="{86CB4B4D-7CA3-9044-876B-883B54F8677D}" type="slidenum">
-              <a:t>‹Nr.›</a:t>
+              <a:t>‹#›</a:t>
             </a:fld>
             <a:endParaRPr/>
           </a:p>
@@ -1661,7 +1661,7 @@
   <p:clrMapOvr>
     <a:masterClrMapping/>
   </p:clrMapOvr>
-  <p:transition xmlns:p14="http://schemas.microsoft.com/office/powerpoint/2010/main" spd="med"/>
+  <p:transition spd="med"/>
 </p:sldLayout>
 </file>
 
@@ -1780,7 +1780,7 @@
           <a:lstStyle/>
           <a:p>
             <a:fld id="{86CB4B4D-7CA3-9044-876B-883B54F8677D}" type="slidenum">
-              <a:t>‹Nr.›</a:t>
+              <a:t>‹#›</a:t>
             </a:fld>
             <a:endParaRPr/>
           </a:p>
@@ -1791,7 +1791,7 @@
   <p:clrMapOvr>
     <a:masterClrMapping/>
   </p:clrMapOvr>
-  <p:transition xmlns:p14="http://schemas.microsoft.com/office/powerpoint/2010/main" spd="med"/>
+  <p:transition spd="med"/>
 </p:sldLayout>
 </file>
 
@@ -1924,7 +1924,7 @@
           <a:lstStyle/>
           <a:p>
             <a:fld id="{86CB4B4D-7CA3-9044-876B-883B54F8677D}" type="slidenum">
-              <a:t>‹Nr.›</a:t>
+              <a:t>‹#›</a:t>
             </a:fld>
             <a:endParaRPr/>
           </a:p>
@@ -1935,7 +1935,7 @@
   <p:clrMapOvr>
     <a:masterClrMapping/>
   </p:clrMapOvr>
-  <p:transition xmlns:p14="http://schemas.microsoft.com/office/powerpoint/2010/main" spd="med"/>
+  <p:transition spd="med"/>
 </p:sldLayout>
 </file>
 
@@ -2001,7 +2001,7 @@
           <a:lstStyle/>
           <a:p>
             <a:fld id="{86CB4B4D-7CA3-9044-876B-883B54F8677D}" type="slidenum">
-              <a:t>‹Nr.›</a:t>
+              <a:t>‹#›</a:t>
             </a:fld>
             <a:endParaRPr/>
           </a:p>
@@ -2012,7 +2012,7 @@
   <p:clrMapOvr>
     <a:masterClrMapping/>
   </p:clrMapOvr>
-  <p:transition xmlns:p14="http://schemas.microsoft.com/office/powerpoint/2010/main" spd="med"/>
+  <p:transition spd="med"/>
 </p:sldLayout>
 </file>
 
@@ -2053,7 +2053,7 @@
           <a:lstStyle/>
           <a:p>
             <a:fld id="{86CB4B4D-7CA3-9044-876B-883B54F8677D}" type="slidenum">
-              <a:t>‹Nr.›</a:t>
+              <a:t>‹#›</a:t>
             </a:fld>
             <a:endParaRPr/>
           </a:p>
@@ -2064,7 +2064,7 @@
   <p:clrMapOvr>
     <a:masterClrMapping/>
   </p:clrMapOvr>
-  <p:transition xmlns:p14="http://schemas.microsoft.com/office/powerpoint/2010/main" spd="med"/>
+  <p:transition spd="med"/>
 </p:sldLayout>
 </file>
 
@@ -2234,7 +2234,7 @@
           <a:lstStyle/>
           <a:p>
             <a:fld id="{86CB4B4D-7CA3-9044-876B-883B54F8677D}" type="slidenum">
-              <a:t>‹Nr.›</a:t>
+              <a:t>‹#›</a:t>
             </a:fld>
             <a:endParaRPr/>
           </a:p>
@@ -2245,7 +2245,7 @@
   <p:clrMapOvr>
     <a:masterClrMapping/>
   </p:clrMapOvr>
-  <p:transition xmlns:p14="http://schemas.microsoft.com/office/powerpoint/2010/main" spd="med"/>
+  <p:transition spd="med"/>
 </p:sldLayout>
 </file>
 
@@ -2297,7 +2297,7 @@
           </a:ln>
           <a:extLst>
             <a:ext uri="{C572A759-6A51-4108-AA02-DFA0A04FC94B}">
-              <ma14:wrappingTextBoxFlag xmlns:ma14="http://schemas.microsoft.com/office/mac/drawingml/2011/main" val="1"/>
+              <ma14:wrappingTextBoxFlag xmlns:ma14="http://schemas.microsoft.com/office/mac/drawingml/2011/main" xmlns="" val="1"/>
             </a:ext>
           </a:extLst>
         </p:spPr>
@@ -2336,7 +2336,7 @@
           </a:ln>
           <a:extLst>
             <a:ext uri="{C572A759-6A51-4108-AA02-DFA0A04FC94B}">
-              <ma14:wrappingTextBoxFlag xmlns:ma14="http://schemas.microsoft.com/office/mac/drawingml/2011/main" val="1"/>
+              <ma14:wrappingTextBoxFlag xmlns:ma14="http://schemas.microsoft.com/office/mac/drawingml/2011/main" xmlns="" val="1"/>
             </a:ext>
           </a:extLst>
         </p:spPr>
@@ -2413,7 +2413,7 @@
           </a:lstStyle>
           <a:p>
             <a:fld id="{86CB4B4D-7CA3-9044-876B-883B54F8677D}" type="slidenum">
-              <a:t>‹Nr.›</a:t>
+              <a:t>‹#›</a:t>
             </a:fld>
             <a:endParaRPr/>
           </a:p>
@@ -2437,7 +2437,7 @@
     <p:sldLayoutId id="2147483660" r:id="rId12"/>
     <p:sldLayoutId id="2147483661" r:id="rId13"/>
   </p:sldLayoutIdLst>
-  <p:transition xmlns:p14="http://schemas.microsoft.com/office/powerpoint/2010/main" spd="med"/>
+  <p:transition spd="med"/>
   <p:txStyles>
     <p:titleStyle>
       <a:lvl1pPr marL="0" marR="0" indent="0" algn="l" defTabSz="914400" rtl="0" latinLnBrk="0">
@@ -3276,7 +3276,7 @@
           </a:ln>
           <a:extLst>
             <a:ext uri="{C572A759-6A51-4108-AA02-DFA0A04FC94B}">
-              <ma14:wrappingTextBoxFlag xmlns:ma14="http://schemas.microsoft.com/office/mac/drawingml/2011/main" val="1"/>
+              <ma14:wrappingTextBoxFlag xmlns:ma14="http://schemas.microsoft.com/office/mac/drawingml/2011/main" xmlns="" val="1"/>
             </a:ext>
           </a:extLst>
         </p:spPr>
@@ -3610,7 +3610,7 @@
           </a:ln>
           <a:extLst>
             <a:ext uri="{C572A759-6A51-4108-AA02-DFA0A04FC94B}">
-              <ma14:wrappingTextBoxFlag xmlns:ma14="http://schemas.microsoft.com/office/mac/drawingml/2011/main" val="1"/>
+              <ma14:wrappingTextBoxFlag xmlns:ma14="http://schemas.microsoft.com/office/mac/drawingml/2011/main" xmlns="" val="1"/>
             </a:ext>
           </a:extLst>
         </p:spPr>
@@ -3793,7 +3793,7 @@
   <p:clrMapOvr>
     <a:masterClrMapping/>
   </p:clrMapOvr>
-  <p:transition xmlns:p14="http://schemas.microsoft.com/office/powerpoint/2010/main" spd="med"/>
+  <p:transition spd="med"/>
 </p:sld>
 </file>
 
@@ -3833,7 +3833,7 @@
           </a:ln>
           <a:extLst>
             <a:ext uri="{C572A759-6A51-4108-AA02-DFA0A04FC94B}">
-              <ma14:wrappingTextBoxFlag xmlns:ma14="http://schemas.microsoft.com/office/mac/drawingml/2011/main" val="1"/>
+              <ma14:wrappingTextBoxFlag xmlns:ma14="http://schemas.microsoft.com/office/mac/drawingml/2011/main" xmlns="" val="1"/>
             </a:ext>
           </a:extLst>
         </p:spPr>
@@ -3915,7 +3915,7 @@
           </a:prstGeom>
           <a:extLst>
             <a:ext uri="{C572A759-6A51-4108-AA02-DFA0A04FC94B}">
-              <ma14:wrappingTextBoxFlag xmlns:ma14="http://schemas.microsoft.com/office/mac/drawingml/2011/main" val="1"/>
+              <ma14:wrappingTextBoxFlag xmlns:ma14="http://schemas.microsoft.com/office/mac/drawingml/2011/main" xmlns="" val="1"/>
             </a:ext>
           </a:extLst>
         </p:spPr>
@@ -4012,7 +4012,7 @@
           </a:ln>
           <a:extLst>
             <a:ext uri="{C572A759-6A51-4108-AA02-DFA0A04FC94B}">
-              <ma14:wrappingTextBoxFlag xmlns:ma14="http://schemas.microsoft.com/office/mac/drawingml/2011/main" val="1"/>
+              <ma14:wrappingTextBoxFlag xmlns:ma14="http://schemas.microsoft.com/office/mac/drawingml/2011/main" xmlns="" val="1"/>
             </a:ext>
           </a:extLst>
         </p:spPr>
@@ -4067,7 +4067,7 @@
   <p:clrMapOvr>
     <a:masterClrMapping/>
   </p:clrMapOvr>
-  <p:transition xmlns:p14="http://schemas.microsoft.com/office/powerpoint/2010/main" spd="slow"/>
+  <p:transition spd="slow"/>
 </p:sld>
 </file>
 
@@ -4107,7 +4107,7 @@
           </a:ln>
           <a:extLst>
             <a:ext uri="{C572A759-6A51-4108-AA02-DFA0A04FC94B}">
-              <ma14:wrappingTextBoxFlag xmlns:ma14="http://schemas.microsoft.com/office/mac/drawingml/2011/main" val="1"/>
+              <ma14:wrappingTextBoxFlag xmlns:ma14="http://schemas.microsoft.com/office/mac/drawingml/2011/main" xmlns="" val="1"/>
             </a:ext>
           </a:extLst>
         </p:spPr>
@@ -4312,7 +4312,7 @@
           </a:prstGeom>
           <a:extLst>
             <a:ext uri="{C572A759-6A51-4108-AA02-DFA0A04FC94B}">
-              <ma14:wrappingTextBoxFlag xmlns:ma14="http://schemas.microsoft.com/office/mac/drawingml/2011/main" val="1"/>
+              <ma14:wrappingTextBoxFlag xmlns:ma14="http://schemas.microsoft.com/office/mac/drawingml/2011/main" xmlns="" val="1"/>
             </a:ext>
           </a:extLst>
         </p:spPr>
@@ -4503,7 +4503,7 @@
   <p:clrMapOvr>
     <a:masterClrMapping/>
   </p:clrMapOvr>
-  <p:transition xmlns:p14="http://schemas.microsoft.com/office/powerpoint/2010/main" spd="slow"/>
+  <p:transition spd="slow"/>
 </p:sld>
 </file>
 
@@ -4570,7 +4570,7 @@
           </a:ln>
           <a:extLst>
             <a:ext uri="{C572A759-6A51-4108-AA02-DFA0A04FC94B}">
-              <ma14:wrappingTextBoxFlag xmlns:ma14="http://schemas.microsoft.com/office/mac/drawingml/2011/main" val="1"/>
+              <ma14:wrappingTextBoxFlag xmlns:ma14="http://schemas.microsoft.com/office/mac/drawingml/2011/main" xmlns="" val="1"/>
             </a:ext>
           </a:extLst>
         </p:spPr>
@@ -4652,7 +4652,7 @@
           </a:prstGeom>
           <a:extLst>
             <a:ext uri="{C572A759-6A51-4108-AA02-DFA0A04FC94B}">
-              <ma14:wrappingTextBoxFlag xmlns:ma14="http://schemas.microsoft.com/office/mac/drawingml/2011/main" val="1"/>
+              <ma14:wrappingTextBoxFlag xmlns:ma14="http://schemas.microsoft.com/office/mac/drawingml/2011/main" xmlns="" val="1"/>
             </a:ext>
           </a:extLst>
         </p:spPr>
@@ -4749,7 +4749,7 @@
           </a:ln>
           <a:extLst>
             <a:ext uri="{C572A759-6A51-4108-AA02-DFA0A04FC94B}">
-              <ma14:wrappingTextBoxFlag xmlns:ma14="http://schemas.microsoft.com/office/mac/drawingml/2011/main" val="1"/>
+              <ma14:wrappingTextBoxFlag xmlns:ma14="http://schemas.microsoft.com/office/mac/drawingml/2011/main" xmlns="" val="1"/>
             </a:ext>
           </a:extLst>
         </p:spPr>
@@ -5086,7 +5086,7 @@
   <p:clrMapOvr>
     <a:masterClrMapping/>
   </p:clrMapOvr>
-  <p:transition xmlns:p14="http://schemas.microsoft.com/office/powerpoint/2010/main" spd="slow"/>
+  <p:transition spd="slow"/>
 </p:sld>
 </file>
 
@@ -5126,7 +5126,7 @@
           </a:ln>
           <a:extLst>
             <a:ext uri="{C572A759-6A51-4108-AA02-DFA0A04FC94B}">
-              <ma14:wrappingTextBoxFlag xmlns:ma14="http://schemas.microsoft.com/office/mac/drawingml/2011/main" val="1"/>
+              <ma14:wrappingTextBoxFlag xmlns:ma14="http://schemas.microsoft.com/office/mac/drawingml/2011/main" xmlns="" val="1"/>
             </a:ext>
           </a:extLst>
         </p:spPr>
@@ -5208,7 +5208,7 @@
           </a:prstGeom>
           <a:extLst>
             <a:ext uri="{C572A759-6A51-4108-AA02-DFA0A04FC94B}">
-              <ma14:wrappingTextBoxFlag xmlns:ma14="http://schemas.microsoft.com/office/mac/drawingml/2011/main" val="1"/>
+              <ma14:wrappingTextBoxFlag xmlns:ma14="http://schemas.microsoft.com/office/mac/drawingml/2011/main" xmlns="" val="1"/>
             </a:ext>
           </a:extLst>
         </p:spPr>
@@ -5305,7 +5305,7 @@
           </a:ln>
           <a:extLst>
             <a:ext uri="{C572A759-6A51-4108-AA02-DFA0A04FC94B}">
-              <ma14:wrappingTextBoxFlag xmlns:ma14="http://schemas.microsoft.com/office/mac/drawingml/2011/main" val="1"/>
+              <ma14:wrappingTextBoxFlag xmlns:ma14="http://schemas.microsoft.com/office/mac/drawingml/2011/main" xmlns="" val="1"/>
             </a:ext>
           </a:extLst>
         </p:spPr>
@@ -5828,7 +5828,7 @@
   <p:clrMapOvr>
     <a:masterClrMapping/>
   </p:clrMapOvr>
-  <p:transition xmlns:p14="http://schemas.microsoft.com/office/powerpoint/2010/main" spd="slow"/>
+  <p:transition spd="slow"/>
 </p:sld>
 </file>
 
@@ -5868,7 +5868,7 @@
           </a:ln>
           <a:extLst>
             <a:ext uri="{C572A759-6A51-4108-AA02-DFA0A04FC94B}">
-              <ma14:wrappingTextBoxFlag xmlns:ma14="http://schemas.microsoft.com/office/mac/drawingml/2011/main" val="1"/>
+              <ma14:wrappingTextBoxFlag xmlns:ma14="http://schemas.microsoft.com/office/mac/drawingml/2011/main" xmlns="" val="1"/>
             </a:ext>
           </a:extLst>
         </p:spPr>
@@ -5950,7 +5950,7 @@
           </a:prstGeom>
           <a:extLst>
             <a:ext uri="{C572A759-6A51-4108-AA02-DFA0A04FC94B}">
-              <ma14:wrappingTextBoxFlag xmlns:ma14="http://schemas.microsoft.com/office/mac/drawingml/2011/main" val="1"/>
+              <ma14:wrappingTextBoxFlag xmlns:ma14="http://schemas.microsoft.com/office/mac/drawingml/2011/main" xmlns="" val="1"/>
             </a:ext>
           </a:extLst>
         </p:spPr>
@@ -5984,7 +5984,7 @@
           </a:ln>
           <a:extLst>
             <a:ext uri="{C572A759-6A51-4108-AA02-DFA0A04FC94B}">
-              <ma14:wrappingTextBoxFlag xmlns:ma14="http://schemas.microsoft.com/office/mac/drawingml/2011/main" val="1"/>
+              <ma14:wrappingTextBoxFlag xmlns:ma14="http://schemas.microsoft.com/office/mac/drawingml/2011/main" xmlns="" val="1"/>
             </a:ext>
           </a:extLst>
         </p:spPr>
@@ -6036,7 +6036,7 @@
   <p:clrMapOvr>
     <a:masterClrMapping/>
   </p:clrMapOvr>
-  <p:transition xmlns:p14="http://schemas.microsoft.com/office/powerpoint/2010/main" spd="slow"/>
+  <p:transition spd="slow"/>
 </p:sld>
 </file>
 
@@ -6076,7 +6076,7 @@
           </a:ln>
           <a:extLst>
             <a:ext uri="{C572A759-6A51-4108-AA02-DFA0A04FC94B}">
-              <ma14:wrappingTextBoxFlag xmlns:ma14="http://schemas.microsoft.com/office/mac/drawingml/2011/main" val="1"/>
+              <ma14:wrappingTextBoxFlag xmlns:ma14="http://schemas.microsoft.com/office/mac/drawingml/2011/main" xmlns="" val="1"/>
             </a:ext>
           </a:extLst>
         </p:spPr>
@@ -6243,7 +6243,7 @@
           </a:prstGeom>
           <a:extLst>
             <a:ext uri="{C572A759-6A51-4108-AA02-DFA0A04FC94B}">
-              <ma14:wrappingTextBoxFlag xmlns:ma14="http://schemas.microsoft.com/office/mac/drawingml/2011/main" val="1"/>
+              <ma14:wrappingTextBoxFlag xmlns:ma14="http://schemas.microsoft.com/office/mac/drawingml/2011/main" xmlns="" val="1"/>
             </a:ext>
           </a:extLst>
         </p:spPr>
@@ -6472,7 +6472,7 @@
   <p:clrMapOvr>
     <a:masterClrMapping/>
   </p:clrMapOvr>
-  <p:transition xmlns:p14="http://schemas.microsoft.com/office/powerpoint/2010/main" spd="slow"/>
+  <p:transition spd="slow"/>
 </p:sld>
 </file>
 
@@ -6512,7 +6512,7 @@
           </a:ln>
           <a:extLst>
             <a:ext uri="{C572A759-6A51-4108-AA02-DFA0A04FC94B}">
-              <ma14:wrappingTextBoxFlag xmlns:ma14="http://schemas.microsoft.com/office/mac/drawingml/2011/main" val="1"/>
+              <ma14:wrappingTextBoxFlag xmlns:ma14="http://schemas.microsoft.com/office/mac/drawingml/2011/main" xmlns="" val="1"/>
             </a:ext>
           </a:extLst>
         </p:spPr>
@@ -6717,7 +6717,7 @@
           </a:prstGeom>
           <a:extLst>
             <a:ext uri="{C572A759-6A51-4108-AA02-DFA0A04FC94B}">
-              <ma14:wrappingTextBoxFlag xmlns:ma14="http://schemas.microsoft.com/office/mac/drawingml/2011/main" val="1"/>
+              <ma14:wrappingTextBoxFlag xmlns:ma14="http://schemas.microsoft.com/office/mac/drawingml/2011/main" xmlns="" val="1"/>
             </a:ext>
           </a:extLst>
         </p:spPr>
@@ -6908,14 +6908,7 @@
   <p:clrMapOvr>
     <a:masterClrMapping/>
   </p:clrMapOvr>
-  <p:transition xmlns:p14="http://schemas.microsoft.com/office/powerpoint/2010/main" spd="slow"/>
-  <p:timing>
-    <p:tnLst>
-      <p:par>
-        <p:cTn xmlns:p14="http://schemas.microsoft.com/office/powerpoint/2010/main" id="1" dur="indefinite" restart="never" nodeType="tmRoot"/>
-      </p:par>
-    </p:tnLst>
-  </p:timing>
+  <p:transition spd="slow"/>
 </p:sld>
 </file>
 
@@ -6982,7 +6975,7 @@
           </a:ln>
           <a:extLst>
             <a:ext uri="{C572A759-6A51-4108-AA02-DFA0A04FC94B}">
-              <ma14:wrappingTextBoxFlag xmlns:ma14="http://schemas.microsoft.com/office/mac/drawingml/2011/main" val="1"/>
+              <ma14:wrappingTextBoxFlag xmlns:ma14="http://schemas.microsoft.com/office/mac/drawingml/2011/main" xmlns="" val="1"/>
             </a:ext>
           </a:extLst>
         </p:spPr>
@@ -7026,7 +7019,7 @@
           </a:prstGeom>
           <a:extLst>
             <a:ext uri="{C572A759-6A51-4108-AA02-DFA0A04FC94B}">
-              <ma14:wrappingTextBoxFlag xmlns:ma14="http://schemas.microsoft.com/office/mac/drawingml/2011/main" val="1"/>
+              <ma14:wrappingTextBoxFlag xmlns:ma14="http://schemas.microsoft.com/office/mac/drawingml/2011/main" xmlns="" val="1"/>
             </a:ext>
           </a:extLst>
         </p:spPr>
@@ -7078,7 +7071,7 @@
               <a:t>	</a:t>
             </a:r>
             <a:r>
-              <a:rPr lang="de-CH" dirty="0" smtClean="0"/>
+              <a:rPr lang="de-CH" dirty="0"/>
               <a:t>Outline / Spieldemonstration</a:t>
             </a:r>
             <a:endParaRPr dirty="0"/>
@@ -7130,7 +7123,7 @@
           <p:nvPr/>
         </p:nvPicPr>
         <p:blipFill>
-          <a:blip r:embed="rId3">
+          <a:blip r:embed="rId3" cstate="print">
             <a:extLst>
               <a:ext uri="{28A0092B-C50C-407E-A947-70E740481C1C}">
                 <a14:useLocalDpi xmlns:a14="http://schemas.microsoft.com/office/drawing/2010/main" val="0"/>
@@ -7161,14 +7154,7 @@
   <p:clrMapOvr>
     <a:masterClrMapping/>
   </p:clrMapOvr>
-  <p:transition xmlns:p14="http://schemas.microsoft.com/office/powerpoint/2010/main" spd="slow"/>
-  <p:timing>
-    <p:tnLst>
-      <p:par>
-        <p:cTn xmlns:p14="http://schemas.microsoft.com/office/powerpoint/2010/main" id="1" dur="indefinite" restart="never" nodeType="tmRoot"/>
-      </p:par>
-    </p:tnLst>
-  </p:timing>
+  <p:transition spd="slow"/>
 </p:sld>
 </file>
 
@@ -7208,7 +7194,7 @@
           </a:ln>
           <a:extLst>
             <a:ext uri="{C572A759-6A51-4108-AA02-DFA0A04FC94B}">
-              <ma14:wrappingTextBoxFlag xmlns:ma14="http://schemas.microsoft.com/office/mac/drawingml/2011/main" val="1"/>
+              <ma14:wrappingTextBoxFlag xmlns:ma14="http://schemas.microsoft.com/office/mac/drawingml/2011/main" xmlns="" val="1"/>
             </a:ext>
           </a:extLst>
         </p:spPr>
@@ -7413,7 +7399,7 @@
           </a:prstGeom>
           <a:extLst>
             <a:ext uri="{C572A759-6A51-4108-AA02-DFA0A04FC94B}">
-              <ma14:wrappingTextBoxFlag xmlns:ma14="http://schemas.microsoft.com/office/mac/drawingml/2011/main" val="1"/>
+              <ma14:wrappingTextBoxFlag xmlns:ma14="http://schemas.microsoft.com/office/mac/drawingml/2011/main" xmlns="" val="1"/>
             </a:ext>
           </a:extLst>
         </p:spPr>
@@ -7604,14 +7590,7 @@
   <p:clrMapOvr>
     <a:masterClrMapping/>
   </p:clrMapOvr>
-  <p:transition xmlns:p14="http://schemas.microsoft.com/office/powerpoint/2010/main" spd="slow"/>
-  <p:timing>
-    <p:tnLst>
-      <p:par>
-        <p:cTn xmlns:p14="http://schemas.microsoft.com/office/powerpoint/2010/main" id="1" dur="indefinite" restart="never" nodeType="tmRoot"/>
-      </p:par>
-    </p:tnLst>
-  </p:timing>
+  <p:transition spd="slow"/>
 </p:sld>
 </file>
 
@@ -7651,7 +7630,7 @@
           </a:ln>
           <a:extLst>
             <a:ext uri="{C572A759-6A51-4108-AA02-DFA0A04FC94B}">
-              <ma14:wrappingTextBoxFlag xmlns:ma14="http://schemas.microsoft.com/office/mac/drawingml/2011/main" val="1"/>
+              <ma14:wrappingTextBoxFlag xmlns:ma14="http://schemas.microsoft.com/office/mac/drawingml/2011/main" xmlns="" val="1"/>
             </a:ext>
           </a:extLst>
         </p:spPr>
@@ -7716,7 +7695,7 @@
           </a:prstGeom>
           <a:extLst>
             <a:ext uri="{C572A759-6A51-4108-AA02-DFA0A04FC94B}">
-              <ma14:wrappingTextBoxFlag xmlns:ma14="http://schemas.microsoft.com/office/mac/drawingml/2011/main" val="1"/>
+              <ma14:wrappingTextBoxFlag xmlns:ma14="http://schemas.microsoft.com/office/mac/drawingml/2011/main" xmlns="" val="1"/>
             </a:ext>
           </a:extLst>
         </p:spPr>
@@ -7764,8 +7743,14 @@
           </a:lstStyle>
           <a:p>
             <a:r>
-              <a:t>	Spiellogik</a:t>
-            </a:r>
+              <a:rPr dirty="0"/>
+              <a:t>	</a:t>
+            </a:r>
+            <a:r>
+              <a:rPr dirty="0" err="1"/>
+              <a:t>Spiellogik</a:t>
+            </a:r>
+            <a:endParaRPr dirty="0"/>
           </a:p>
         </p:txBody>
       </p:sp>
@@ -7841,7 +7826,7 @@
         <p:spPr>
           <a:xfrm>
             <a:off x="425999" y="1150597"/>
-            <a:ext cx="11434568" cy="6809739"/>
+            <a:ext cx="11434568" cy="6247860"/>
           </a:xfrm>
           <a:prstGeom prst="rect">
             <a:avLst/>
@@ -7851,7 +7836,7 @@
           </a:ln>
           <a:extLst>
             <a:ext uri="{C572A759-6A51-4108-AA02-DFA0A04FC94B}">
-              <ma14:wrappingTextBoxFlag xmlns:ma14="http://schemas.microsoft.com/office/mac/drawingml/2011/main" val="1"/>
+              <ma14:wrappingTextBoxFlag xmlns:ma14="http://schemas.microsoft.com/office/mac/drawingml/2011/main" xmlns="" val="1"/>
             </a:ext>
           </a:extLst>
         </p:spPr>
@@ -7868,7 +7853,28 @@
               <a:defRPr sz="2000"/>
             </a:pPr>
             <a:r>
-              <a:t>Stapel – und Kartenverwaltung zentral </a:t>
+              <a:rPr dirty="0" err="1"/>
+              <a:t>Stapel</a:t>
+            </a:r>
+            <a:r>
+              <a:rPr dirty="0"/>
+              <a:t> – und </a:t>
+            </a:r>
+            <a:r>
+              <a:rPr dirty="0" err="1"/>
+              <a:t>Kartenverwaltung</a:t>
+            </a:r>
+            <a:r>
+              <a:rPr dirty="0"/>
+              <a:t> </a:t>
+            </a:r>
+            <a:r>
+              <a:rPr dirty="0" err="1"/>
+              <a:t>zentral</a:t>
+            </a:r>
+            <a:r>
+              <a:rPr dirty="0"/>
+              <a:t> </a:t>
             </a:r>
           </a:p>
           <a:p>
@@ -7878,7 +7884,7 @@
               <a:buChar char="•"/>
               <a:defRPr sz="2000"/>
             </a:pPr>
-            <a:endParaRPr/>
+            <a:endParaRPr dirty="0"/>
           </a:p>
           <a:p>
             <a:pPr marL="342900" indent="-342900">
@@ -7888,7 +7894,36 @@
               <a:defRPr sz="2000"/>
             </a:pPr>
             <a:r>
-              <a:t>Spieler spezifische Stapeln (discardPile, handCards) </a:t>
+              <a:rPr dirty="0" err="1"/>
+              <a:t>Spielerspezifische</a:t>
+            </a:r>
+            <a:r>
+              <a:rPr dirty="0"/>
+              <a:t> </a:t>
+            </a:r>
+            <a:r>
+              <a:rPr dirty="0" err="1"/>
+              <a:t>Stapeln</a:t>
+            </a:r>
+            <a:r>
+              <a:rPr dirty="0"/>
+              <a:t> (</a:t>
+            </a:r>
+            <a:r>
+              <a:rPr dirty="0" err="1"/>
+              <a:t>discardPile</a:t>
+            </a:r>
+            <a:r>
+              <a:rPr dirty="0"/>
+              <a:t>, </a:t>
+            </a:r>
+            <a:r>
+              <a:rPr dirty="0" err="1"/>
+              <a:t>handCards</a:t>
+            </a:r>
+            <a:r>
+              <a:rPr dirty="0"/>
+              <a:t>) </a:t>
             </a:r>
           </a:p>
           <a:p>
@@ -7898,7 +7933,7 @@
               <a:buChar char="•"/>
               <a:defRPr sz="2000"/>
             </a:pPr>
-            <a:endParaRPr/>
+            <a:endParaRPr dirty="0"/>
           </a:p>
           <a:p>
             <a:pPr marL="342900" indent="-342900">
@@ -7908,8 +7943,152 @@
               <a:defRPr sz="2000"/>
             </a:pPr>
             <a:r>
-              <a:t>ArrayList (Grösse flexibel und nützliche Methoden)</a:t>
-            </a:r>
+              <a:rPr dirty="0" err="1"/>
+              <a:t>ArrayList</a:t>
+            </a:r>
+            <a:r>
+              <a:rPr dirty="0"/>
+              <a:t>(</a:t>
+            </a:r>
+            <a:r>
+              <a:rPr lang="de-CH" dirty="0"/>
+              <a:t>f</a:t>
+            </a:r>
+            <a:r>
+              <a:rPr lang="en-CH" dirty="0"/>
+              <a:t>l</a:t>
+            </a:r>
+            <a:r>
+              <a:rPr lang="de-CH" dirty="0"/>
+              <a:t>e</a:t>
+            </a:r>
+            <a:r>
+              <a:rPr lang="en-CH" dirty="0"/>
+              <a:t>x</a:t>
+            </a:r>
+            <a:r>
+              <a:rPr lang="de-CH" dirty="0"/>
+              <a:t>i</a:t>
+            </a:r>
+            <a:r>
+              <a:rPr lang="en-CH" dirty="0"/>
+              <a:t>b</a:t>
+            </a:r>
+            <a:r>
+              <a:rPr lang="de-CH" dirty="0"/>
+              <a:t>l</a:t>
+            </a:r>
+            <a:r>
+              <a:rPr lang="en-CH" dirty="0"/>
+              <a:t>e </a:t>
+            </a:r>
+            <a:r>
+              <a:rPr lang="de-CH" dirty="0"/>
+              <a:t>G</a:t>
+            </a:r>
+            <a:r>
+              <a:rPr lang="en-CH" dirty="0"/>
+              <a:t>r</a:t>
+            </a:r>
+            <a:r>
+              <a:rPr lang="de-CH" dirty="0"/>
+              <a:t>ö</a:t>
+            </a:r>
+            <a:r>
+              <a:rPr lang="en-CH" dirty="0"/>
+              <a:t>s</a:t>
+            </a:r>
+            <a:r>
+              <a:rPr lang="de-CH" dirty="0"/>
+              <a:t>s</a:t>
+            </a:r>
+            <a:r>
+              <a:rPr lang="en-CH" dirty="0"/>
+              <a:t>e, </a:t>
+            </a:r>
+            <a:r>
+              <a:rPr lang="de-CH" dirty="0"/>
+              <a:t>a</a:t>
+            </a:r>
+            <a:r>
+              <a:rPr lang="en-CH" dirty="0"/>
+              <a:t>d</a:t>
+            </a:r>
+            <a:r>
+              <a:rPr lang="de-CH" dirty="0"/>
+              <a:t>d</a:t>
+            </a:r>
+            <a:r>
+              <a:rPr lang="en-CH" dirty="0"/>
+              <a:t>(), </a:t>
+            </a:r>
+            <a:r>
+              <a:rPr lang="de-CH" dirty="0"/>
+              <a:t>r</a:t>
+            </a:r>
+            <a:r>
+              <a:rPr lang="en-CH" dirty="0"/>
+              <a:t>e</a:t>
+            </a:r>
+            <a:r>
+              <a:rPr lang="de-CH" dirty="0"/>
+              <a:t>m</a:t>
+            </a:r>
+            <a:r>
+              <a:rPr lang="en-CH" dirty="0"/>
+              <a:t>o</a:t>
+            </a:r>
+            <a:r>
+              <a:rPr lang="de-CH" dirty="0"/>
+              <a:t>v</a:t>
+            </a:r>
+            <a:r>
+              <a:rPr lang="en-CH" dirty="0"/>
+              <a:t>e() </a:t>
+            </a:r>
+            <a:r>
+              <a:rPr lang="de-CH" dirty="0"/>
+              <a:t>M</a:t>
+            </a:r>
+            <a:r>
+              <a:rPr lang="en-CH" dirty="0"/>
+              <a:t>e</a:t>
+            </a:r>
+            <a:r>
+              <a:rPr lang="de-CH" dirty="0"/>
+              <a:t>t</a:t>
+            </a:r>
+            <a:r>
+              <a:rPr lang="en-CH" dirty="0"/>
+              <a:t>h</a:t>
+            </a:r>
+            <a:r>
+              <a:rPr lang="de-CH" dirty="0"/>
+              <a:t>o</a:t>
+            </a:r>
+            <a:r>
+              <a:rPr lang="en-CH" dirty="0"/>
+              <a:t>d</a:t>
+            </a:r>
+            <a:r>
+              <a:rPr lang="de-CH" dirty="0"/>
+              <a:t>e</a:t>
+            </a:r>
+            <a:r>
+              <a:rPr lang="en-CH" dirty="0"/>
+              <a:t>n</a:t>
+            </a:r>
+            <a:r>
+              <a:rPr dirty="0"/>
+              <a:t>)</a:t>
+            </a:r>
+          </a:p>
+          <a:p>
+            <a:pPr>
+              <a:buSzPct val="100000"/>
+              <a:defRPr sz="2000"/>
+            </a:pPr>
+            <a:endParaRPr dirty="0"/>
           </a:p>
           <a:p>
             <a:pPr marL="342900" indent="-342900">
@@ -7918,7 +8097,47 @@
               <a:buChar char="•"/>
               <a:defRPr sz="2000"/>
             </a:pPr>
-            <a:endParaRPr/>
+            <a:r>
+              <a:rPr dirty="0"/>
+              <a:t>Pile </a:t>
+            </a:r>
+            <a:r>
+              <a:rPr dirty="0" err="1"/>
+              <a:t>braucht</a:t>
+            </a:r>
+            <a:r>
+              <a:rPr dirty="0"/>
+              <a:t> die </a:t>
+            </a:r>
+            <a:r>
+              <a:rPr dirty="0" err="1"/>
+              <a:t>Klasse</a:t>
+            </a:r>
+            <a:r>
+              <a:rPr dirty="0"/>
+              <a:t> Card, um </a:t>
+            </a:r>
+            <a:r>
+              <a:rPr dirty="0" err="1"/>
+              <a:t>Karten</a:t>
+            </a:r>
+            <a:r>
+              <a:rPr dirty="0"/>
+              <a:t> </a:t>
+            </a:r>
+            <a:r>
+              <a:rPr dirty="0" err="1"/>
+              <a:t>zu</a:t>
+            </a:r>
+            <a:r>
+              <a:rPr dirty="0"/>
+              <a:t> </a:t>
+            </a:r>
+            <a:r>
+              <a:rPr dirty="0" err="1"/>
+              <a:t>erstellen</a:t>
+            </a:r>
+            <a:endParaRPr dirty="0"/>
           </a:p>
           <a:p>
             <a:pPr marL="342900" indent="-342900">
@@ -7927,9 +8146,7 @@
               <a:buChar char="•"/>
               <a:defRPr sz="2000"/>
             </a:pPr>
-            <a:r>
-              <a:t>Game und Player Klassen brauchen Piles</a:t>
-            </a:r>
+            <a:endParaRPr dirty="0"/>
           </a:p>
           <a:p>
             <a:pPr marL="342900" indent="-342900">
@@ -7938,7 +8155,65 @@
               <a:buChar char="•"/>
               <a:defRPr sz="2000"/>
             </a:pPr>
-            <a:endParaRPr/>
+            <a:r>
+              <a:rPr dirty="0"/>
+              <a:t>Game </a:t>
+            </a:r>
+            <a:r>
+              <a:rPr dirty="0" err="1"/>
+              <a:t>beinhaltet</a:t>
+            </a:r>
+            <a:r>
+              <a:rPr dirty="0"/>
+              <a:t> </a:t>
+            </a:r>
+            <a:r>
+              <a:rPr dirty="0" err="1"/>
+              <a:t>Methoden</a:t>
+            </a:r>
+            <a:r>
+              <a:rPr dirty="0"/>
+              <a:t> </a:t>
+            </a:r>
+            <a:r>
+              <a:rPr dirty="0" err="1"/>
+              <a:t>für</a:t>
+            </a:r>
+            <a:r>
+              <a:rPr dirty="0"/>
+              <a:t> </a:t>
+            </a:r>
+            <a:r>
+              <a:rPr dirty="0" err="1"/>
+              <a:t>verschiedene</a:t>
+            </a:r>
+            <a:br>
+              <a:rPr dirty="0"/>
+            </a:br>
+            <a:r>
+              <a:rPr dirty="0" err="1"/>
+              <a:t>Kartenoperation</a:t>
+            </a:r>
+            <a:r>
+              <a:rPr dirty="0"/>
+              <a:t> (</a:t>
+            </a:r>
+            <a:r>
+              <a:rPr dirty="0" err="1"/>
+              <a:t>playToMiddle</a:t>
+            </a:r>
+            <a:r>
+              <a:rPr dirty="0"/>
+              <a:t>, </a:t>
+            </a:r>
+            <a:r>
+              <a:rPr dirty="0" err="1"/>
+              <a:t>playToDiscard</a:t>
+            </a:r>
+            <a:r>
+              <a:rPr dirty="0"/>
+              <a:t>)</a:t>
+            </a:r>
           </a:p>
           <a:p>
             <a:pPr marL="342900" indent="-342900">
@@ -7947,9 +8222,7 @@
               <a:buChar char="•"/>
               <a:defRPr sz="2000"/>
             </a:pPr>
-            <a:r>
-              <a:t>Pile braucht die Klasse Card, um Karten zu erstellen</a:t>
-            </a:r>
+            <a:endParaRPr dirty="0"/>
           </a:p>
           <a:p>
             <a:pPr marL="342900" indent="-342900">
@@ -7958,7 +8231,96 @@
               <a:buChar char="•"/>
               <a:defRPr sz="2000"/>
             </a:pPr>
-            <a:endParaRPr/>
+            <a:r>
+              <a:rPr dirty="0" err="1"/>
+              <a:t>Spielmethoden</a:t>
+            </a:r>
+            <a:r>
+              <a:rPr dirty="0"/>
+              <a:t> </a:t>
+            </a:r>
+            <a:r>
+              <a:rPr dirty="0" err="1"/>
+              <a:t>geben</a:t>
+            </a:r>
+            <a:r>
+              <a:rPr dirty="0"/>
+              <a:t> Boolean </a:t>
+            </a:r>
+            <a:r>
+              <a:rPr dirty="0" err="1"/>
+              <a:t>Werte</a:t>
+            </a:r>
+            <a:r>
+              <a:rPr dirty="0"/>
+              <a:t> </a:t>
+            </a:r>
+            <a:r>
+              <a:rPr dirty="0" err="1"/>
+              <a:t>zurück</a:t>
+            </a:r>
+            <a:r>
+              <a:rPr dirty="0"/>
+              <a:t>: </a:t>
+            </a:r>
+          </a:p>
+          <a:p>
+            <a:pPr lvl="8">
+              <a:defRPr sz="2000"/>
+            </a:pPr>
+            <a:r>
+              <a:rPr dirty="0"/>
+              <a:t>	- true: </a:t>
+            </a:r>
+            <a:r>
+              <a:rPr dirty="0" err="1"/>
+              <a:t>Spielzug</a:t>
+            </a:r>
+            <a:r>
+              <a:rPr dirty="0"/>
+              <a:t> </a:t>
+            </a:r>
+            <a:r>
+              <a:rPr dirty="0" err="1"/>
+              <a:t>gültig</a:t>
+            </a:r>
+            <a:r>
+              <a:rPr dirty="0"/>
+              <a:t>!</a:t>
+            </a:r>
+          </a:p>
+          <a:p>
+            <a:pPr lvl="8">
+              <a:defRPr sz="2000"/>
+            </a:pPr>
+            <a:r>
+              <a:rPr dirty="0"/>
+              <a:t>	- false: </a:t>
+            </a:r>
+            <a:r>
+              <a:rPr dirty="0" err="1"/>
+              <a:t>Spielzug</a:t>
+            </a:r>
+            <a:r>
+              <a:rPr dirty="0"/>
+              <a:t> </a:t>
+            </a:r>
+            <a:r>
+              <a:rPr dirty="0" err="1"/>
+              <a:t>nicht</a:t>
+            </a:r>
+            <a:r>
+              <a:rPr dirty="0"/>
+              <a:t> </a:t>
+            </a:r>
+            <a:r>
+              <a:rPr dirty="0" err="1"/>
+              <a:t>gültig</a:t>
+            </a:r>
+            <a:r>
+              <a:rPr dirty="0"/>
+              <a:t>!</a:t>
+            </a:r>
           </a:p>
           <a:p>
             <a:pPr marL="342900" indent="-342900">
@@ -7967,13 +8329,7 @@
               <a:buChar char="•"/>
               <a:defRPr sz="2000"/>
             </a:pPr>
-            <a:r>
-              <a:t>Game beinhaltet Methoden für verschiedene</a:t>
-            </a:r>
-            <a:br/>
-            <a:r>
-              <a:t>Kartenoperation (playToMiddle, playToDiscard)</a:t>
-            </a:r>
+            <a:endParaRPr dirty="0"/>
           </a:p>
           <a:p>
             <a:pPr marL="342900" indent="-342900">
@@ -7982,7 +8338,7 @@
               <a:buChar char="•"/>
               <a:defRPr sz="2000"/>
             </a:pPr>
-            <a:endParaRPr/>
+            <a:endParaRPr dirty="0"/>
           </a:p>
           <a:p>
             <a:pPr marL="342900" indent="-342900">
@@ -7991,25 +8347,7 @@
               <a:buChar char="•"/>
               <a:defRPr sz="2000"/>
             </a:pPr>
-            <a:r>
-              <a:t>Spielmethoden geben Boolean Werte zurück: </a:t>
-            </a:r>
-          </a:p>
-          <a:p>
-            <a:pPr lvl="8">
-              <a:defRPr sz="2000"/>
-            </a:pPr>
-            <a:r>
-              <a:t>	- true: Spielzug gültig!</a:t>
-            </a:r>
-          </a:p>
-          <a:p>
-            <a:pPr lvl="8">
-              <a:defRPr sz="2000"/>
-            </a:pPr>
-            <a:r>
-              <a:t>	- false: Spielzug nicht gültig!</a:t>
-            </a:r>
+            <a:endParaRPr dirty="0"/>
           </a:p>
           <a:p>
             <a:pPr marL="342900" indent="-342900">
@@ -8018,7 +8356,7 @@
               <a:buChar char="•"/>
               <a:defRPr sz="2000"/>
             </a:pPr>
-            <a:endParaRPr/>
+            <a:endParaRPr dirty="0"/>
           </a:p>
           <a:p>
             <a:pPr marL="342900" indent="-342900">
@@ -8027,7 +8365,7 @@
               <a:buChar char="•"/>
               <a:defRPr sz="2000"/>
             </a:pPr>
-            <a:endParaRPr/>
+            <a:endParaRPr dirty="0"/>
           </a:p>
           <a:p>
             <a:pPr marL="342900" indent="-342900">
@@ -8036,34 +8374,7 @@
               <a:buChar char="•"/>
               <a:defRPr sz="2000"/>
             </a:pPr>
-            <a:endParaRPr/>
-          </a:p>
-          <a:p>
-            <a:pPr marL="342900" indent="-342900">
-              <a:buSzPct val="100000"/>
-              <a:buFont typeface="Arial"/>
-              <a:buChar char="•"/>
-              <a:defRPr sz="2000"/>
-            </a:pPr>
-            <a:endParaRPr/>
-          </a:p>
-          <a:p>
-            <a:pPr marL="342900" indent="-342900">
-              <a:buSzPct val="100000"/>
-              <a:buFont typeface="Arial"/>
-              <a:buChar char="•"/>
-              <a:defRPr sz="2000"/>
-            </a:pPr>
-            <a:endParaRPr/>
-          </a:p>
-          <a:p>
-            <a:pPr marL="342900" indent="-342900">
-              <a:buSzPct val="100000"/>
-              <a:buFont typeface="Arial"/>
-              <a:buChar char="•"/>
-              <a:defRPr sz="2000"/>
-            </a:pPr>
-            <a:endParaRPr/>
+            <a:endParaRPr dirty="0"/>
           </a:p>
         </p:txBody>
       </p:sp>
@@ -8099,7 +8410,7 @@
   <p:clrMapOvr>
     <a:masterClrMapping/>
   </p:clrMapOvr>
-  <p:transition xmlns:p14="http://schemas.microsoft.com/office/powerpoint/2010/main" spd="slow"/>
+  <p:transition spd="slow"/>
 </p:sld>
 </file>
 
@@ -8139,7 +8450,7 @@
           </a:ln>
           <a:extLst>
             <a:ext uri="{C572A759-6A51-4108-AA02-DFA0A04FC94B}">
-              <ma14:wrappingTextBoxFlag xmlns:ma14="http://schemas.microsoft.com/office/mac/drawingml/2011/main" val="1"/>
+              <ma14:wrappingTextBoxFlag xmlns:ma14="http://schemas.microsoft.com/office/mac/drawingml/2011/main" xmlns="" val="1"/>
             </a:ext>
           </a:extLst>
         </p:spPr>
@@ -8183,7 +8494,7 @@
           </a:prstGeom>
           <a:extLst>
             <a:ext uri="{C572A759-6A51-4108-AA02-DFA0A04FC94B}">
-              <ma14:wrappingTextBoxFlag xmlns:ma14="http://schemas.microsoft.com/office/mac/drawingml/2011/main" val="1"/>
+              <ma14:wrappingTextBoxFlag xmlns:ma14="http://schemas.microsoft.com/office/mac/drawingml/2011/main" xmlns="" val="1"/>
             </a:ext>
           </a:extLst>
         </p:spPr>
@@ -8331,7 +8642,7 @@
   <p:clrMapOvr>
     <a:masterClrMapping/>
   </p:clrMapOvr>
-  <p:transition xmlns:p14="http://schemas.microsoft.com/office/powerpoint/2010/main" spd="slow"/>
+  <p:transition spd="slow"/>
 </p:sld>
 </file>
 
@@ -8371,7 +8682,7 @@
           </a:ln>
           <a:extLst>
             <a:ext uri="{C572A759-6A51-4108-AA02-DFA0A04FC94B}">
-              <ma14:wrappingTextBoxFlag xmlns:ma14="http://schemas.microsoft.com/office/mac/drawingml/2011/main" val="1"/>
+              <ma14:wrappingTextBoxFlag xmlns:ma14="http://schemas.microsoft.com/office/mac/drawingml/2011/main" xmlns="" val="1"/>
             </a:ext>
           </a:extLst>
         </p:spPr>
@@ -8576,7 +8887,7 @@
           </a:prstGeom>
           <a:extLst>
             <a:ext uri="{C572A759-6A51-4108-AA02-DFA0A04FC94B}">
-              <ma14:wrappingTextBoxFlag xmlns:ma14="http://schemas.microsoft.com/office/mac/drawingml/2011/main" val="1"/>
+              <ma14:wrappingTextBoxFlag xmlns:ma14="http://schemas.microsoft.com/office/mac/drawingml/2011/main" xmlns="" val="1"/>
             </a:ext>
           </a:extLst>
         </p:spPr>
@@ -8767,7 +9078,7 @@
   <p:clrMapOvr>
     <a:masterClrMapping/>
   </p:clrMapOvr>
-  <p:transition xmlns:p14="http://schemas.microsoft.com/office/powerpoint/2010/main" spd="slow"/>
+  <p:transition spd="slow"/>
 </p:sld>
 </file>
 
@@ -8807,7 +9118,7 @@
           </a:ln>
           <a:extLst>
             <a:ext uri="{C572A759-6A51-4108-AA02-DFA0A04FC94B}">
-              <ma14:wrappingTextBoxFlag xmlns:ma14="http://schemas.microsoft.com/office/mac/drawingml/2011/main" val="1"/>
+              <ma14:wrappingTextBoxFlag xmlns:ma14="http://schemas.microsoft.com/office/mac/drawingml/2011/main" xmlns="" val="1"/>
             </a:ext>
           </a:extLst>
         </p:spPr>
@@ -8889,7 +9200,7 @@
           </a:prstGeom>
           <a:extLst>
             <a:ext uri="{C572A759-6A51-4108-AA02-DFA0A04FC94B}">
-              <ma14:wrappingTextBoxFlag xmlns:ma14="http://schemas.microsoft.com/office/mac/drawingml/2011/main" val="1"/>
+              <ma14:wrappingTextBoxFlag xmlns:ma14="http://schemas.microsoft.com/office/mac/drawingml/2011/main" xmlns="" val="1"/>
             </a:ext>
           </a:extLst>
         </p:spPr>
@@ -8986,7 +9297,7 @@
           </a:ln>
           <a:extLst>
             <a:ext uri="{C572A759-6A51-4108-AA02-DFA0A04FC94B}">
-              <ma14:wrappingTextBoxFlag xmlns:ma14="http://schemas.microsoft.com/office/mac/drawingml/2011/main" val="1"/>
+              <ma14:wrappingTextBoxFlag xmlns:ma14="http://schemas.microsoft.com/office/mac/drawingml/2011/main" xmlns="" val="1"/>
             </a:ext>
           </a:extLst>
         </p:spPr>
@@ -9182,7 +9493,7 @@
   <p:clrMapOvr>
     <a:masterClrMapping/>
   </p:clrMapOvr>
-  <p:transition xmlns:p14="http://schemas.microsoft.com/office/powerpoint/2010/main" spd="slow"/>
+  <p:transition spd="slow"/>
 </p:sld>
 </file>
 

</xml_diff>

<commit_message>
changed title file of Powerpoint
</commit_message>
<xml_diff>
--- a/00_General/Presentation/MS 3/Presentation_Milestone_iii_Master.pptx
+++ b/00_General/Presentation/MS 3/Presentation_Milestone_iii_Master.pptx
@@ -325,7 +325,7 @@
   </p:defaultTextStyle>
   <p:extLst>
     <p:ext uri="{EFAFB233-063F-42B5-8137-9DF3F51BA10A}">
-      <p15:sldGuideLst xmlns:p15="http://schemas.microsoft.com/office/powerpoint/2012/main">
+      <p15:sldGuideLst xmlns:p15="http://schemas.microsoft.com/office/powerpoint/2012/main" xmlns="">
         <p15:guide id="1" orient="horz" pos="2160" userDrawn="1">
           <p15:clr>
             <a:srgbClr val="A4A3A4"/>
@@ -609,7 +609,7 @@
           <a:lstStyle/>
           <a:p>
             <a:fld id="{86CB4B4D-7CA3-9044-876B-883B54F8677D}" type="slidenum">
-              <a:t>‹#›</a:t>
+              <a:t>‹Nr.›</a:t>
             </a:fld>
             <a:endParaRPr/>
           </a:p>
@@ -620,7 +620,7 @@
   <p:clrMapOvr>
     <a:masterClrMapping/>
   </p:clrMapOvr>
-  <p:transition spd="med"/>
+  <p:transition xmlns:p14="http://schemas.microsoft.com/office/powerpoint/2010/main" spd="med"/>
 </p:sldLayout>
 </file>
 
@@ -807,7 +807,7 @@
           <a:lstStyle/>
           <a:p>
             <a:fld id="{86CB4B4D-7CA3-9044-876B-883B54F8677D}" type="slidenum">
-              <a:t>‹#›</a:t>
+              <a:t>‹Nr.›</a:t>
             </a:fld>
             <a:endParaRPr/>
           </a:p>
@@ -818,7 +818,7 @@
   <p:clrMapOvr>
     <a:masterClrMapping/>
   </p:clrMapOvr>
-  <p:transition spd="med"/>
+  <p:transition xmlns:p14="http://schemas.microsoft.com/office/powerpoint/2010/main" spd="med"/>
 </p:sldLayout>
 </file>
 
@@ -933,7 +933,7 @@
           <a:lstStyle/>
           <a:p>
             <a:fld id="{86CB4B4D-7CA3-9044-876B-883B54F8677D}" type="slidenum">
-              <a:t>‹#›</a:t>
+              <a:t>‹Nr.›</a:t>
             </a:fld>
             <a:endParaRPr/>
           </a:p>
@@ -944,7 +944,7 @@
   <p:clrMapOvr>
     <a:masterClrMapping/>
   </p:clrMapOvr>
-  <p:transition spd="med"/>
+  <p:transition xmlns:p14="http://schemas.microsoft.com/office/powerpoint/2010/main" spd="med"/>
 </p:sldLayout>
 </file>
 
@@ -1067,7 +1067,7 @@
           <a:lstStyle/>
           <a:p>
             <a:fld id="{86CB4B4D-7CA3-9044-876B-883B54F8677D}" type="slidenum">
-              <a:t>‹#›</a:t>
+              <a:t>‹Nr.›</a:t>
             </a:fld>
             <a:endParaRPr/>
           </a:p>
@@ -1078,7 +1078,7 @@
   <p:clrMapOvr>
     <a:masterClrMapping/>
   </p:clrMapOvr>
-  <p:transition spd="med"/>
+  <p:transition xmlns:p14="http://schemas.microsoft.com/office/powerpoint/2010/main" spd="med"/>
 </p:sldLayout>
 </file>
 
@@ -1201,7 +1201,7 @@
           <a:lstStyle/>
           <a:p>
             <a:fld id="{86CB4B4D-7CA3-9044-876B-883B54F8677D}" type="slidenum">
-              <a:t>‹#›</a:t>
+              <a:t>‹Nr.›</a:t>
             </a:fld>
             <a:endParaRPr/>
           </a:p>
@@ -1212,7 +1212,7 @@
   <p:clrMapOvr>
     <a:masterClrMapping/>
   </p:clrMapOvr>
-  <p:transition spd="med"/>
+  <p:transition xmlns:p14="http://schemas.microsoft.com/office/powerpoint/2010/main" spd="med"/>
 </p:sldLayout>
 </file>
 
@@ -1327,7 +1327,7 @@
           <a:lstStyle/>
           <a:p>
             <a:fld id="{86CB4B4D-7CA3-9044-876B-883B54F8677D}" type="slidenum">
-              <a:t>‹#›</a:t>
+              <a:t>‹Nr.›</a:t>
             </a:fld>
             <a:endParaRPr/>
           </a:p>
@@ -1338,7 +1338,7 @@
   <p:clrMapOvr>
     <a:masterClrMapping/>
   </p:clrMapOvr>
-  <p:transition spd="med"/>
+  <p:transition xmlns:p14="http://schemas.microsoft.com/office/powerpoint/2010/main" spd="med"/>
 </p:sldLayout>
 </file>
 
@@ -1461,7 +1461,7 @@
           <a:lstStyle/>
           <a:p>
             <a:fld id="{86CB4B4D-7CA3-9044-876B-883B54F8677D}" type="slidenum">
-              <a:t>‹#›</a:t>
+              <a:t>‹Nr.›</a:t>
             </a:fld>
             <a:endParaRPr/>
           </a:p>
@@ -1472,7 +1472,7 @@
   <p:clrMapOvr>
     <a:masterClrMapping/>
   </p:clrMapOvr>
-  <p:transition spd="med"/>
+  <p:transition xmlns:p14="http://schemas.microsoft.com/office/powerpoint/2010/main" spd="med"/>
 </p:sldLayout>
 </file>
 
@@ -1650,7 +1650,7 @@
           <a:lstStyle/>
           <a:p>
             <a:fld id="{86CB4B4D-7CA3-9044-876B-883B54F8677D}" type="slidenum">
-              <a:t>‹#›</a:t>
+              <a:t>‹Nr.›</a:t>
             </a:fld>
             <a:endParaRPr/>
           </a:p>
@@ -1661,7 +1661,7 @@
   <p:clrMapOvr>
     <a:masterClrMapping/>
   </p:clrMapOvr>
-  <p:transition spd="med"/>
+  <p:transition xmlns:p14="http://schemas.microsoft.com/office/powerpoint/2010/main" spd="med"/>
 </p:sldLayout>
 </file>
 
@@ -1780,7 +1780,7 @@
           <a:lstStyle/>
           <a:p>
             <a:fld id="{86CB4B4D-7CA3-9044-876B-883B54F8677D}" type="slidenum">
-              <a:t>‹#›</a:t>
+              <a:t>‹Nr.›</a:t>
             </a:fld>
             <a:endParaRPr/>
           </a:p>
@@ -1791,7 +1791,7 @@
   <p:clrMapOvr>
     <a:masterClrMapping/>
   </p:clrMapOvr>
-  <p:transition spd="med"/>
+  <p:transition xmlns:p14="http://schemas.microsoft.com/office/powerpoint/2010/main" spd="med"/>
 </p:sldLayout>
 </file>
 
@@ -1924,7 +1924,7 @@
           <a:lstStyle/>
           <a:p>
             <a:fld id="{86CB4B4D-7CA3-9044-876B-883B54F8677D}" type="slidenum">
-              <a:t>‹#›</a:t>
+              <a:t>‹Nr.›</a:t>
             </a:fld>
             <a:endParaRPr/>
           </a:p>
@@ -1935,7 +1935,7 @@
   <p:clrMapOvr>
     <a:masterClrMapping/>
   </p:clrMapOvr>
-  <p:transition spd="med"/>
+  <p:transition xmlns:p14="http://schemas.microsoft.com/office/powerpoint/2010/main" spd="med"/>
 </p:sldLayout>
 </file>
 
@@ -2001,7 +2001,7 @@
           <a:lstStyle/>
           <a:p>
             <a:fld id="{86CB4B4D-7CA3-9044-876B-883B54F8677D}" type="slidenum">
-              <a:t>‹#›</a:t>
+              <a:t>‹Nr.›</a:t>
             </a:fld>
             <a:endParaRPr/>
           </a:p>
@@ -2012,7 +2012,7 @@
   <p:clrMapOvr>
     <a:masterClrMapping/>
   </p:clrMapOvr>
-  <p:transition spd="med"/>
+  <p:transition xmlns:p14="http://schemas.microsoft.com/office/powerpoint/2010/main" spd="med"/>
 </p:sldLayout>
 </file>
 
@@ -2053,7 +2053,7 @@
           <a:lstStyle/>
           <a:p>
             <a:fld id="{86CB4B4D-7CA3-9044-876B-883B54F8677D}" type="slidenum">
-              <a:t>‹#›</a:t>
+              <a:t>‹Nr.›</a:t>
             </a:fld>
             <a:endParaRPr/>
           </a:p>
@@ -2064,7 +2064,7 @@
   <p:clrMapOvr>
     <a:masterClrMapping/>
   </p:clrMapOvr>
-  <p:transition spd="med"/>
+  <p:transition xmlns:p14="http://schemas.microsoft.com/office/powerpoint/2010/main" spd="med"/>
 </p:sldLayout>
 </file>
 
@@ -2234,7 +2234,7 @@
           <a:lstStyle/>
           <a:p>
             <a:fld id="{86CB4B4D-7CA3-9044-876B-883B54F8677D}" type="slidenum">
-              <a:t>‹#›</a:t>
+              <a:t>‹Nr.›</a:t>
             </a:fld>
             <a:endParaRPr/>
           </a:p>
@@ -2245,7 +2245,7 @@
   <p:clrMapOvr>
     <a:masterClrMapping/>
   </p:clrMapOvr>
-  <p:transition spd="med"/>
+  <p:transition xmlns:p14="http://schemas.microsoft.com/office/powerpoint/2010/main" spd="med"/>
 </p:sldLayout>
 </file>
 
@@ -2297,7 +2297,7 @@
           </a:ln>
           <a:extLst>
             <a:ext uri="{C572A759-6A51-4108-AA02-DFA0A04FC94B}">
-              <ma14:wrappingTextBoxFlag xmlns:ma14="http://schemas.microsoft.com/office/mac/drawingml/2011/main" xmlns="" val="1"/>
+              <ma14:wrappingTextBoxFlag xmlns:ma14="http://schemas.microsoft.com/office/mac/drawingml/2011/main" val="1"/>
             </a:ext>
           </a:extLst>
         </p:spPr>
@@ -2336,7 +2336,7 @@
           </a:ln>
           <a:extLst>
             <a:ext uri="{C572A759-6A51-4108-AA02-DFA0A04FC94B}">
-              <ma14:wrappingTextBoxFlag xmlns:ma14="http://schemas.microsoft.com/office/mac/drawingml/2011/main" xmlns="" val="1"/>
+              <ma14:wrappingTextBoxFlag xmlns:ma14="http://schemas.microsoft.com/office/mac/drawingml/2011/main" val="1"/>
             </a:ext>
           </a:extLst>
         </p:spPr>
@@ -2413,7 +2413,7 @@
           </a:lstStyle>
           <a:p>
             <a:fld id="{86CB4B4D-7CA3-9044-876B-883B54F8677D}" type="slidenum">
-              <a:t>‹#›</a:t>
+              <a:t>‹Nr.›</a:t>
             </a:fld>
             <a:endParaRPr/>
           </a:p>
@@ -2437,7 +2437,7 @@
     <p:sldLayoutId id="2147483660" r:id="rId12"/>
     <p:sldLayoutId id="2147483661" r:id="rId13"/>
   </p:sldLayoutIdLst>
-  <p:transition spd="med"/>
+  <p:transition xmlns:p14="http://schemas.microsoft.com/office/powerpoint/2010/main" spd="med"/>
   <p:txStyles>
     <p:titleStyle>
       <a:lvl1pPr marL="0" marR="0" indent="0" algn="l" defTabSz="914400" rtl="0" latinLnBrk="0">
@@ -3266,7 +3266,7 @@
         <p:spPr>
           <a:xfrm>
             <a:off x="611423" y="473696"/>
-            <a:ext cx="6348578" cy="5311490"/>
+            <a:ext cx="6348578" cy="5524841"/>
           </a:xfrm>
           <a:prstGeom prst="rect">
             <a:avLst/>
@@ -3276,7 +3276,7 @@
           </a:ln>
           <a:extLst>
             <a:ext uri="{C572A759-6A51-4108-AA02-DFA0A04FC94B}">
-              <ma14:wrappingTextBoxFlag xmlns:ma14="http://schemas.microsoft.com/office/mac/drawingml/2011/main" xmlns="" val="1"/>
+              <ma14:wrappingTextBoxFlag xmlns:ma14="http://schemas.microsoft.com/office/mac/drawingml/2011/main" val="1"/>
             </a:ext>
           </a:extLst>
         </p:spPr>
@@ -3301,8 +3301,18 @@
               </a:defRPr>
             </a:pPr>
             <a:r>
-              <a:t>Meilensteinpräsentation II</a:t>
-            </a:r>
+              <a:rPr dirty="0"/>
+              <a:t>Meilensteinpräsentation </a:t>
+            </a:r>
+            <a:r>
+              <a:rPr lang="de-CH" dirty="0"/>
+              <a:t>I</a:t>
+            </a:r>
+            <a:r>
+              <a:rPr dirty="0" smtClean="0"/>
+              <a:t>II</a:t>
+            </a:r>
+            <a:endParaRPr dirty="0"/>
           </a:p>
           <a:p>
             <a:pPr>
@@ -3319,7 +3329,7 @@
                 <a:sym typeface="Arial"/>
               </a:defRPr>
             </a:pPr>
-            <a:endParaRPr/>
+            <a:endParaRPr dirty="0"/>
           </a:p>
           <a:p>
             <a:pPr>
@@ -3337,6 +3347,7 @@
               </a:defRPr>
             </a:pPr>
             <a:r>
+              <a:rPr dirty="0"/>
               <a:t>Programmierprojekt 2020 </a:t>
             </a:r>
           </a:p>
@@ -3356,10 +3367,11 @@
               </a:defRPr>
             </a:pPr>
             <a:r>
+              <a:rPr dirty="0"/>
               <a:t>Implementierung von </a:t>
             </a:r>
             <a:r>
-              <a:rPr b="1"/>
+              <a:rPr b="1" dirty="0"/>
               <a:t>Skip-Bo ©</a:t>
             </a:r>
           </a:p>
@@ -3378,7 +3390,7 @@
                 <a:sym typeface="Arial"/>
               </a:defRPr>
             </a:pPr>
-            <a:endParaRPr b="1"/>
+            <a:endParaRPr b="1" dirty="0"/>
           </a:p>
           <a:p>
             <a:pPr>
@@ -3396,6 +3408,7 @@
               </a:defRPr>
             </a:pPr>
             <a:r>
+              <a:rPr dirty="0"/>
               <a:t>Gruppe:</a:t>
             </a:r>
           </a:p>
@@ -3414,7 +3427,7 @@
                 <a:sym typeface="Arial"/>
               </a:defRPr>
             </a:pPr>
-            <a:endParaRPr/>
+            <a:endParaRPr dirty="0"/>
           </a:p>
           <a:p>
             <a:pPr>
@@ -3432,6 +3445,7 @@
               </a:defRPr>
             </a:pPr>
             <a:r>
+              <a:rPr dirty="0"/>
               <a:t> 	</a:t>
             </a:r>
           </a:p>
@@ -3451,6 +3465,7 @@
               </a:defRPr>
             </a:pPr>
             <a:r>
+              <a:rPr dirty="0"/>
               <a:t>	Manuela Wildi</a:t>
             </a:r>
           </a:p>
@@ -3469,7 +3484,7 @@
                 <a:sym typeface="Arial"/>
               </a:defRPr>
             </a:pPr>
-            <a:endParaRPr/>
+            <a:endParaRPr dirty="0"/>
           </a:p>
           <a:p>
             <a:pPr>
@@ -3487,6 +3502,7 @@
               </a:defRPr>
             </a:pPr>
             <a:r>
+              <a:rPr dirty="0"/>
               <a:t> 	Rao Rohan Girish</a:t>
             </a:r>
           </a:p>
@@ -3505,7 +3521,7 @@
                 <a:sym typeface="Arial"/>
               </a:defRPr>
             </a:pPr>
-            <a:endParaRPr/>
+            <a:endParaRPr dirty="0"/>
           </a:p>
           <a:p>
             <a:pPr>
@@ -3523,6 +3539,7 @@
               </a:defRPr>
             </a:pPr>
             <a:r>
+              <a:rPr dirty="0"/>
               <a:t> 	Guillaume Joyet</a:t>
             </a:r>
           </a:p>
@@ -3541,7 +3558,7 @@
                 <a:sym typeface="Arial"/>
               </a:defRPr>
             </a:pPr>
-            <a:endParaRPr/>
+            <a:endParaRPr dirty="0"/>
           </a:p>
           <a:p>
             <a:pPr>
@@ -3559,6 +3576,7 @@
               </a:defRPr>
             </a:pPr>
             <a:r>
+              <a:rPr dirty="0"/>
               <a:t> 	Janni Batsilas</a:t>
             </a:r>
           </a:p>
@@ -3610,7 +3628,7 @@
           </a:ln>
           <a:extLst>
             <a:ext uri="{C572A759-6A51-4108-AA02-DFA0A04FC94B}">
-              <ma14:wrappingTextBoxFlag xmlns:ma14="http://schemas.microsoft.com/office/mac/drawingml/2011/main" xmlns="" val="1"/>
+              <ma14:wrappingTextBoxFlag xmlns:ma14="http://schemas.microsoft.com/office/mac/drawingml/2011/main" val="1"/>
             </a:ext>
           </a:extLst>
         </p:spPr>
@@ -3793,7 +3811,14 @@
   <p:clrMapOvr>
     <a:masterClrMapping/>
   </p:clrMapOvr>
-  <p:transition spd="med"/>
+  <p:transition xmlns:p14="http://schemas.microsoft.com/office/powerpoint/2010/main" spd="med"/>
+  <p:timing>
+    <p:tnLst>
+      <p:par>
+        <p:cTn xmlns:p14="http://schemas.microsoft.com/office/powerpoint/2010/main" id="1" dur="indefinite" restart="never" nodeType="tmRoot"/>
+      </p:par>
+    </p:tnLst>
+  </p:timing>
 </p:sld>
 </file>
 
@@ -3833,7 +3858,7 @@
           </a:ln>
           <a:extLst>
             <a:ext uri="{C572A759-6A51-4108-AA02-DFA0A04FC94B}">
-              <ma14:wrappingTextBoxFlag xmlns:ma14="http://schemas.microsoft.com/office/mac/drawingml/2011/main" xmlns="" val="1"/>
+              <ma14:wrappingTextBoxFlag xmlns:ma14="http://schemas.microsoft.com/office/mac/drawingml/2011/main" val="1"/>
             </a:ext>
           </a:extLst>
         </p:spPr>
@@ -3915,7 +3940,7 @@
           </a:prstGeom>
           <a:extLst>
             <a:ext uri="{C572A759-6A51-4108-AA02-DFA0A04FC94B}">
-              <ma14:wrappingTextBoxFlag xmlns:ma14="http://schemas.microsoft.com/office/mac/drawingml/2011/main" xmlns="" val="1"/>
+              <ma14:wrappingTextBoxFlag xmlns:ma14="http://schemas.microsoft.com/office/mac/drawingml/2011/main" val="1"/>
             </a:ext>
           </a:extLst>
         </p:spPr>
@@ -4012,7 +4037,7 @@
           </a:ln>
           <a:extLst>
             <a:ext uri="{C572A759-6A51-4108-AA02-DFA0A04FC94B}">
-              <ma14:wrappingTextBoxFlag xmlns:ma14="http://schemas.microsoft.com/office/mac/drawingml/2011/main" xmlns="" val="1"/>
+              <ma14:wrappingTextBoxFlag xmlns:ma14="http://schemas.microsoft.com/office/mac/drawingml/2011/main" val="1"/>
             </a:ext>
           </a:extLst>
         </p:spPr>
@@ -4067,7 +4092,14 @@
   <p:clrMapOvr>
     <a:masterClrMapping/>
   </p:clrMapOvr>
-  <p:transition spd="slow"/>
+  <p:transition xmlns:p14="http://schemas.microsoft.com/office/powerpoint/2010/main" spd="slow"/>
+  <p:timing>
+    <p:tnLst>
+      <p:par>
+        <p:cTn xmlns:p14="http://schemas.microsoft.com/office/powerpoint/2010/main" id="1" dur="indefinite" restart="never" nodeType="tmRoot"/>
+      </p:par>
+    </p:tnLst>
+  </p:timing>
 </p:sld>
 </file>
 
@@ -4107,7 +4139,7 @@
           </a:ln>
           <a:extLst>
             <a:ext uri="{C572A759-6A51-4108-AA02-DFA0A04FC94B}">
-              <ma14:wrappingTextBoxFlag xmlns:ma14="http://schemas.microsoft.com/office/mac/drawingml/2011/main" xmlns="" val="1"/>
+              <ma14:wrappingTextBoxFlag xmlns:ma14="http://schemas.microsoft.com/office/mac/drawingml/2011/main" val="1"/>
             </a:ext>
           </a:extLst>
         </p:spPr>
@@ -4312,7 +4344,7 @@
           </a:prstGeom>
           <a:extLst>
             <a:ext uri="{C572A759-6A51-4108-AA02-DFA0A04FC94B}">
-              <ma14:wrappingTextBoxFlag xmlns:ma14="http://schemas.microsoft.com/office/mac/drawingml/2011/main" xmlns="" val="1"/>
+              <ma14:wrappingTextBoxFlag xmlns:ma14="http://schemas.microsoft.com/office/mac/drawingml/2011/main" val="1"/>
             </a:ext>
           </a:extLst>
         </p:spPr>
@@ -4503,7 +4535,14 @@
   <p:clrMapOvr>
     <a:masterClrMapping/>
   </p:clrMapOvr>
-  <p:transition spd="slow"/>
+  <p:transition xmlns:p14="http://schemas.microsoft.com/office/powerpoint/2010/main" spd="slow"/>
+  <p:timing>
+    <p:tnLst>
+      <p:par>
+        <p:cTn xmlns:p14="http://schemas.microsoft.com/office/powerpoint/2010/main" id="1" dur="indefinite" restart="never" nodeType="tmRoot"/>
+      </p:par>
+    </p:tnLst>
+  </p:timing>
 </p:sld>
 </file>
 
@@ -4570,7 +4609,7 @@
           </a:ln>
           <a:extLst>
             <a:ext uri="{C572A759-6A51-4108-AA02-DFA0A04FC94B}">
-              <ma14:wrappingTextBoxFlag xmlns:ma14="http://schemas.microsoft.com/office/mac/drawingml/2011/main" xmlns="" val="1"/>
+              <ma14:wrappingTextBoxFlag xmlns:ma14="http://schemas.microsoft.com/office/mac/drawingml/2011/main" val="1"/>
             </a:ext>
           </a:extLst>
         </p:spPr>
@@ -4652,7 +4691,7 @@
           </a:prstGeom>
           <a:extLst>
             <a:ext uri="{C572A759-6A51-4108-AA02-DFA0A04FC94B}">
-              <ma14:wrappingTextBoxFlag xmlns:ma14="http://schemas.microsoft.com/office/mac/drawingml/2011/main" xmlns="" val="1"/>
+              <ma14:wrappingTextBoxFlag xmlns:ma14="http://schemas.microsoft.com/office/mac/drawingml/2011/main" val="1"/>
             </a:ext>
           </a:extLst>
         </p:spPr>
@@ -4749,7 +4788,7 @@
           </a:ln>
           <a:extLst>
             <a:ext uri="{C572A759-6A51-4108-AA02-DFA0A04FC94B}">
-              <ma14:wrappingTextBoxFlag xmlns:ma14="http://schemas.microsoft.com/office/mac/drawingml/2011/main" xmlns="" val="1"/>
+              <ma14:wrappingTextBoxFlag xmlns:ma14="http://schemas.microsoft.com/office/mac/drawingml/2011/main" val="1"/>
             </a:ext>
           </a:extLst>
         </p:spPr>
@@ -5086,7 +5125,14 @@
   <p:clrMapOvr>
     <a:masterClrMapping/>
   </p:clrMapOvr>
-  <p:transition spd="slow"/>
+  <p:transition xmlns:p14="http://schemas.microsoft.com/office/powerpoint/2010/main" spd="slow"/>
+  <p:timing>
+    <p:tnLst>
+      <p:par>
+        <p:cTn xmlns:p14="http://schemas.microsoft.com/office/powerpoint/2010/main" id="1" dur="indefinite" restart="never" nodeType="tmRoot"/>
+      </p:par>
+    </p:tnLst>
+  </p:timing>
 </p:sld>
 </file>
 
@@ -5126,7 +5172,7 @@
           </a:ln>
           <a:extLst>
             <a:ext uri="{C572A759-6A51-4108-AA02-DFA0A04FC94B}">
-              <ma14:wrappingTextBoxFlag xmlns:ma14="http://schemas.microsoft.com/office/mac/drawingml/2011/main" xmlns="" val="1"/>
+              <ma14:wrappingTextBoxFlag xmlns:ma14="http://schemas.microsoft.com/office/mac/drawingml/2011/main" val="1"/>
             </a:ext>
           </a:extLst>
         </p:spPr>
@@ -5208,7 +5254,7 @@
           </a:prstGeom>
           <a:extLst>
             <a:ext uri="{C572A759-6A51-4108-AA02-DFA0A04FC94B}">
-              <ma14:wrappingTextBoxFlag xmlns:ma14="http://schemas.microsoft.com/office/mac/drawingml/2011/main" xmlns="" val="1"/>
+              <ma14:wrappingTextBoxFlag xmlns:ma14="http://schemas.microsoft.com/office/mac/drawingml/2011/main" val="1"/>
             </a:ext>
           </a:extLst>
         </p:spPr>
@@ -5305,7 +5351,7 @@
           </a:ln>
           <a:extLst>
             <a:ext uri="{C572A759-6A51-4108-AA02-DFA0A04FC94B}">
-              <ma14:wrappingTextBoxFlag xmlns:ma14="http://schemas.microsoft.com/office/mac/drawingml/2011/main" xmlns="" val="1"/>
+              <ma14:wrappingTextBoxFlag xmlns:ma14="http://schemas.microsoft.com/office/mac/drawingml/2011/main" val="1"/>
             </a:ext>
           </a:extLst>
         </p:spPr>
@@ -5828,7 +5874,14 @@
   <p:clrMapOvr>
     <a:masterClrMapping/>
   </p:clrMapOvr>
-  <p:transition spd="slow"/>
+  <p:transition xmlns:p14="http://schemas.microsoft.com/office/powerpoint/2010/main" spd="slow"/>
+  <p:timing>
+    <p:tnLst>
+      <p:par>
+        <p:cTn xmlns:p14="http://schemas.microsoft.com/office/powerpoint/2010/main" id="1" dur="indefinite" restart="never" nodeType="tmRoot"/>
+      </p:par>
+    </p:tnLst>
+  </p:timing>
 </p:sld>
 </file>
 
@@ -5868,7 +5921,7 @@
           </a:ln>
           <a:extLst>
             <a:ext uri="{C572A759-6A51-4108-AA02-DFA0A04FC94B}">
-              <ma14:wrappingTextBoxFlag xmlns:ma14="http://schemas.microsoft.com/office/mac/drawingml/2011/main" xmlns="" val="1"/>
+              <ma14:wrappingTextBoxFlag xmlns:ma14="http://schemas.microsoft.com/office/mac/drawingml/2011/main" val="1"/>
             </a:ext>
           </a:extLst>
         </p:spPr>
@@ -5950,7 +6003,7 @@
           </a:prstGeom>
           <a:extLst>
             <a:ext uri="{C572A759-6A51-4108-AA02-DFA0A04FC94B}">
-              <ma14:wrappingTextBoxFlag xmlns:ma14="http://schemas.microsoft.com/office/mac/drawingml/2011/main" xmlns="" val="1"/>
+              <ma14:wrappingTextBoxFlag xmlns:ma14="http://schemas.microsoft.com/office/mac/drawingml/2011/main" val="1"/>
             </a:ext>
           </a:extLst>
         </p:spPr>
@@ -5984,7 +6037,7 @@
           </a:ln>
           <a:extLst>
             <a:ext uri="{C572A759-6A51-4108-AA02-DFA0A04FC94B}">
-              <ma14:wrappingTextBoxFlag xmlns:ma14="http://schemas.microsoft.com/office/mac/drawingml/2011/main" xmlns="" val="1"/>
+              <ma14:wrappingTextBoxFlag xmlns:ma14="http://schemas.microsoft.com/office/mac/drawingml/2011/main" val="1"/>
             </a:ext>
           </a:extLst>
         </p:spPr>
@@ -6036,7 +6089,14 @@
   <p:clrMapOvr>
     <a:masterClrMapping/>
   </p:clrMapOvr>
-  <p:transition spd="slow"/>
+  <p:transition xmlns:p14="http://schemas.microsoft.com/office/powerpoint/2010/main" spd="slow"/>
+  <p:timing>
+    <p:tnLst>
+      <p:par>
+        <p:cTn xmlns:p14="http://schemas.microsoft.com/office/powerpoint/2010/main" id="1" dur="indefinite" restart="never" nodeType="tmRoot"/>
+      </p:par>
+    </p:tnLst>
+  </p:timing>
 </p:sld>
 </file>
 
@@ -6076,7 +6136,7 @@
           </a:ln>
           <a:extLst>
             <a:ext uri="{C572A759-6A51-4108-AA02-DFA0A04FC94B}">
-              <ma14:wrappingTextBoxFlag xmlns:ma14="http://schemas.microsoft.com/office/mac/drawingml/2011/main" xmlns="" val="1"/>
+              <ma14:wrappingTextBoxFlag xmlns:ma14="http://schemas.microsoft.com/office/mac/drawingml/2011/main" val="1"/>
             </a:ext>
           </a:extLst>
         </p:spPr>
@@ -6243,7 +6303,7 @@
           </a:prstGeom>
           <a:extLst>
             <a:ext uri="{C572A759-6A51-4108-AA02-DFA0A04FC94B}">
-              <ma14:wrappingTextBoxFlag xmlns:ma14="http://schemas.microsoft.com/office/mac/drawingml/2011/main" xmlns="" val="1"/>
+              <ma14:wrappingTextBoxFlag xmlns:ma14="http://schemas.microsoft.com/office/mac/drawingml/2011/main" val="1"/>
             </a:ext>
           </a:extLst>
         </p:spPr>
@@ -6472,7 +6532,14 @@
   <p:clrMapOvr>
     <a:masterClrMapping/>
   </p:clrMapOvr>
-  <p:transition spd="slow"/>
+  <p:transition xmlns:p14="http://schemas.microsoft.com/office/powerpoint/2010/main" spd="slow"/>
+  <p:timing>
+    <p:tnLst>
+      <p:par>
+        <p:cTn xmlns:p14="http://schemas.microsoft.com/office/powerpoint/2010/main" id="1" dur="indefinite" restart="never" nodeType="tmRoot"/>
+      </p:par>
+    </p:tnLst>
+  </p:timing>
 </p:sld>
 </file>
 
@@ -6512,7 +6579,7 @@
           </a:ln>
           <a:extLst>
             <a:ext uri="{C572A759-6A51-4108-AA02-DFA0A04FC94B}">
-              <ma14:wrappingTextBoxFlag xmlns:ma14="http://schemas.microsoft.com/office/mac/drawingml/2011/main" xmlns="" val="1"/>
+              <ma14:wrappingTextBoxFlag xmlns:ma14="http://schemas.microsoft.com/office/mac/drawingml/2011/main" val="1"/>
             </a:ext>
           </a:extLst>
         </p:spPr>
@@ -6717,7 +6784,7 @@
           </a:prstGeom>
           <a:extLst>
             <a:ext uri="{C572A759-6A51-4108-AA02-DFA0A04FC94B}">
-              <ma14:wrappingTextBoxFlag xmlns:ma14="http://schemas.microsoft.com/office/mac/drawingml/2011/main" xmlns="" val="1"/>
+              <ma14:wrappingTextBoxFlag xmlns:ma14="http://schemas.microsoft.com/office/mac/drawingml/2011/main" val="1"/>
             </a:ext>
           </a:extLst>
         </p:spPr>
@@ -6908,7 +6975,14 @@
   <p:clrMapOvr>
     <a:masterClrMapping/>
   </p:clrMapOvr>
-  <p:transition spd="slow"/>
+  <p:transition xmlns:p14="http://schemas.microsoft.com/office/powerpoint/2010/main" spd="slow"/>
+  <p:timing>
+    <p:tnLst>
+      <p:par>
+        <p:cTn xmlns:p14="http://schemas.microsoft.com/office/powerpoint/2010/main" id="1" dur="indefinite" restart="never" nodeType="tmRoot"/>
+      </p:par>
+    </p:tnLst>
+  </p:timing>
 </p:sld>
 </file>
 
@@ -6975,7 +7049,7 @@
           </a:ln>
           <a:extLst>
             <a:ext uri="{C572A759-6A51-4108-AA02-DFA0A04FC94B}">
-              <ma14:wrappingTextBoxFlag xmlns:ma14="http://schemas.microsoft.com/office/mac/drawingml/2011/main" xmlns="" val="1"/>
+              <ma14:wrappingTextBoxFlag xmlns:ma14="http://schemas.microsoft.com/office/mac/drawingml/2011/main" val="1"/>
             </a:ext>
           </a:extLst>
         </p:spPr>
@@ -7019,7 +7093,7 @@
           </a:prstGeom>
           <a:extLst>
             <a:ext uri="{C572A759-6A51-4108-AA02-DFA0A04FC94B}">
-              <ma14:wrappingTextBoxFlag xmlns:ma14="http://schemas.microsoft.com/office/mac/drawingml/2011/main" xmlns="" val="1"/>
+              <ma14:wrappingTextBoxFlag xmlns:ma14="http://schemas.microsoft.com/office/mac/drawingml/2011/main" val="1"/>
             </a:ext>
           </a:extLst>
         </p:spPr>
@@ -7154,7 +7228,14 @@
   <p:clrMapOvr>
     <a:masterClrMapping/>
   </p:clrMapOvr>
-  <p:transition spd="slow"/>
+  <p:transition xmlns:p14="http://schemas.microsoft.com/office/powerpoint/2010/main" spd="slow"/>
+  <p:timing>
+    <p:tnLst>
+      <p:par>
+        <p:cTn xmlns:p14="http://schemas.microsoft.com/office/powerpoint/2010/main" id="1" dur="indefinite" restart="never" nodeType="tmRoot"/>
+      </p:par>
+    </p:tnLst>
+  </p:timing>
 </p:sld>
 </file>
 
@@ -7194,7 +7275,7 @@
           </a:ln>
           <a:extLst>
             <a:ext uri="{C572A759-6A51-4108-AA02-DFA0A04FC94B}">
-              <ma14:wrappingTextBoxFlag xmlns:ma14="http://schemas.microsoft.com/office/mac/drawingml/2011/main" xmlns="" val="1"/>
+              <ma14:wrappingTextBoxFlag xmlns:ma14="http://schemas.microsoft.com/office/mac/drawingml/2011/main" val="1"/>
             </a:ext>
           </a:extLst>
         </p:spPr>
@@ -7399,7 +7480,7 @@
           </a:prstGeom>
           <a:extLst>
             <a:ext uri="{C572A759-6A51-4108-AA02-DFA0A04FC94B}">
-              <ma14:wrappingTextBoxFlag xmlns:ma14="http://schemas.microsoft.com/office/mac/drawingml/2011/main" xmlns="" val="1"/>
+              <ma14:wrappingTextBoxFlag xmlns:ma14="http://schemas.microsoft.com/office/mac/drawingml/2011/main" val="1"/>
             </a:ext>
           </a:extLst>
         </p:spPr>
@@ -7590,7 +7671,14 @@
   <p:clrMapOvr>
     <a:masterClrMapping/>
   </p:clrMapOvr>
-  <p:transition spd="slow"/>
+  <p:transition xmlns:p14="http://schemas.microsoft.com/office/powerpoint/2010/main" spd="slow"/>
+  <p:timing>
+    <p:tnLst>
+      <p:par>
+        <p:cTn xmlns:p14="http://schemas.microsoft.com/office/powerpoint/2010/main" id="1" dur="indefinite" restart="never" nodeType="tmRoot"/>
+      </p:par>
+    </p:tnLst>
+  </p:timing>
 </p:sld>
 </file>
 
@@ -7630,7 +7718,7 @@
           </a:ln>
           <a:extLst>
             <a:ext uri="{C572A759-6A51-4108-AA02-DFA0A04FC94B}">
-              <ma14:wrappingTextBoxFlag xmlns:ma14="http://schemas.microsoft.com/office/mac/drawingml/2011/main" xmlns="" val="1"/>
+              <ma14:wrappingTextBoxFlag xmlns:ma14="http://schemas.microsoft.com/office/mac/drawingml/2011/main" val="1"/>
             </a:ext>
           </a:extLst>
         </p:spPr>
@@ -7695,7 +7783,7 @@
           </a:prstGeom>
           <a:extLst>
             <a:ext uri="{C572A759-6A51-4108-AA02-DFA0A04FC94B}">
-              <ma14:wrappingTextBoxFlag xmlns:ma14="http://schemas.microsoft.com/office/mac/drawingml/2011/main" xmlns="" val="1"/>
+              <ma14:wrappingTextBoxFlag xmlns:ma14="http://schemas.microsoft.com/office/mac/drawingml/2011/main" val="1"/>
             </a:ext>
           </a:extLst>
         </p:spPr>
@@ -7836,7 +7924,7 @@
           </a:ln>
           <a:extLst>
             <a:ext uri="{C572A759-6A51-4108-AA02-DFA0A04FC94B}">
-              <ma14:wrappingTextBoxFlag xmlns:ma14="http://schemas.microsoft.com/office/mac/drawingml/2011/main" xmlns="" val="1"/>
+              <ma14:wrappingTextBoxFlag xmlns:ma14="http://schemas.microsoft.com/office/mac/drawingml/2011/main" val="1"/>
             </a:ext>
           </a:extLst>
         </p:spPr>
@@ -7955,7 +8043,7 @@
               <a:t>f</a:t>
             </a:r>
             <a:r>
-              <a:rPr lang="en-CH" dirty="0"/>
+              <a:rPr lang="x-none" dirty="0"/>
               <a:t>l</a:t>
             </a:r>
             <a:r>
@@ -7963,7 +8051,7 @@
               <a:t>e</a:t>
             </a:r>
             <a:r>
-              <a:rPr lang="en-CH" dirty="0"/>
+              <a:rPr lang="x-none" dirty="0"/>
               <a:t>x</a:t>
             </a:r>
             <a:r>
@@ -7971,7 +8059,7 @@
               <a:t>i</a:t>
             </a:r>
             <a:r>
-              <a:rPr lang="en-CH" dirty="0"/>
+              <a:rPr lang="x-none" dirty="0"/>
               <a:t>b</a:t>
             </a:r>
             <a:r>
@@ -7979,7 +8067,7 @@
               <a:t>l</a:t>
             </a:r>
             <a:r>
-              <a:rPr lang="en-CH" dirty="0"/>
+              <a:rPr lang="x-none" dirty="0"/>
               <a:t>e </a:t>
             </a:r>
             <a:r>
@@ -7987,7 +8075,7 @@
               <a:t>G</a:t>
             </a:r>
             <a:r>
-              <a:rPr lang="en-CH" dirty="0"/>
+              <a:rPr lang="x-none" dirty="0"/>
               <a:t>r</a:t>
             </a:r>
             <a:r>
@@ -7995,7 +8083,7 @@
               <a:t>ö</a:t>
             </a:r>
             <a:r>
-              <a:rPr lang="en-CH" dirty="0"/>
+              <a:rPr lang="x-none" dirty="0"/>
               <a:t>s</a:t>
             </a:r>
             <a:r>
@@ -8003,7 +8091,7 @@
               <a:t>s</a:t>
             </a:r>
             <a:r>
-              <a:rPr lang="en-CH" dirty="0"/>
+              <a:rPr lang="x-none" dirty="0"/>
               <a:t>e, </a:t>
             </a:r>
             <a:r>
@@ -8011,7 +8099,7 @@
               <a:t>a</a:t>
             </a:r>
             <a:r>
-              <a:rPr lang="en-CH" dirty="0"/>
+              <a:rPr lang="x-none" dirty="0"/>
               <a:t>d</a:t>
             </a:r>
             <a:r>
@@ -8019,7 +8107,7 @@
               <a:t>d</a:t>
             </a:r>
             <a:r>
-              <a:rPr lang="en-CH" dirty="0"/>
+              <a:rPr lang="x-none" dirty="0"/>
               <a:t>(), </a:t>
             </a:r>
             <a:r>
@@ -8027,7 +8115,7 @@
               <a:t>r</a:t>
             </a:r>
             <a:r>
-              <a:rPr lang="en-CH" dirty="0"/>
+              <a:rPr lang="x-none" dirty="0"/>
               <a:t>e</a:t>
             </a:r>
             <a:r>
@@ -8035,7 +8123,7 @@
               <a:t>m</a:t>
             </a:r>
             <a:r>
-              <a:rPr lang="en-CH" dirty="0"/>
+              <a:rPr lang="x-none" dirty="0"/>
               <a:t>o</a:t>
             </a:r>
             <a:r>
@@ -8043,7 +8131,7 @@
               <a:t>v</a:t>
             </a:r>
             <a:r>
-              <a:rPr lang="en-CH" dirty="0"/>
+              <a:rPr lang="x-none" dirty="0"/>
               <a:t>e() </a:t>
             </a:r>
             <a:r>
@@ -8051,7 +8139,7 @@
               <a:t>M</a:t>
             </a:r>
             <a:r>
-              <a:rPr lang="en-CH" dirty="0"/>
+              <a:rPr lang="x-none" dirty="0"/>
               <a:t>e</a:t>
             </a:r>
             <a:r>
@@ -8059,7 +8147,7 @@
               <a:t>t</a:t>
             </a:r>
             <a:r>
-              <a:rPr lang="en-CH" dirty="0"/>
+              <a:rPr lang="x-none" dirty="0"/>
               <a:t>h</a:t>
             </a:r>
             <a:r>
@@ -8067,7 +8155,7 @@
               <a:t>o</a:t>
             </a:r>
             <a:r>
-              <a:rPr lang="en-CH" dirty="0"/>
+              <a:rPr lang="x-none" dirty="0"/>
               <a:t>d</a:t>
             </a:r>
             <a:r>
@@ -8075,7 +8163,7 @@
               <a:t>e</a:t>
             </a:r>
             <a:r>
-              <a:rPr lang="en-CH" dirty="0"/>
+              <a:rPr lang="x-none" dirty="0"/>
               <a:t>n</a:t>
             </a:r>
             <a:r>
@@ -8186,6 +8274,10 @@
             <a:r>
               <a:rPr dirty="0" err="1"/>
               <a:t>verschiedene</a:t>
+            </a:r>
+            <a:r>
+              <a:rPr dirty="0"/>
+              <a:t/>
             </a:r>
             <a:br>
               <a:rPr dirty="0"/>
@@ -8410,7 +8502,14 @@
   <p:clrMapOvr>
     <a:masterClrMapping/>
   </p:clrMapOvr>
-  <p:transition spd="slow"/>
+  <p:transition xmlns:p14="http://schemas.microsoft.com/office/powerpoint/2010/main" spd="slow"/>
+  <p:timing>
+    <p:tnLst>
+      <p:par>
+        <p:cTn xmlns:p14="http://schemas.microsoft.com/office/powerpoint/2010/main" id="1" dur="indefinite" restart="never" nodeType="tmRoot"/>
+      </p:par>
+    </p:tnLst>
+  </p:timing>
 </p:sld>
 </file>
 
@@ -8450,7 +8549,7 @@
           </a:ln>
           <a:extLst>
             <a:ext uri="{C572A759-6A51-4108-AA02-DFA0A04FC94B}">
-              <ma14:wrappingTextBoxFlag xmlns:ma14="http://schemas.microsoft.com/office/mac/drawingml/2011/main" xmlns="" val="1"/>
+              <ma14:wrappingTextBoxFlag xmlns:ma14="http://schemas.microsoft.com/office/mac/drawingml/2011/main" val="1"/>
             </a:ext>
           </a:extLst>
         </p:spPr>
@@ -8494,7 +8593,7 @@
           </a:prstGeom>
           <a:extLst>
             <a:ext uri="{C572A759-6A51-4108-AA02-DFA0A04FC94B}">
-              <ma14:wrappingTextBoxFlag xmlns:ma14="http://schemas.microsoft.com/office/mac/drawingml/2011/main" xmlns="" val="1"/>
+              <ma14:wrappingTextBoxFlag xmlns:ma14="http://schemas.microsoft.com/office/mac/drawingml/2011/main" val="1"/>
             </a:ext>
           </a:extLst>
         </p:spPr>
@@ -8642,7 +8741,14 @@
   <p:clrMapOvr>
     <a:masterClrMapping/>
   </p:clrMapOvr>
-  <p:transition spd="slow"/>
+  <p:transition xmlns:p14="http://schemas.microsoft.com/office/powerpoint/2010/main" spd="slow"/>
+  <p:timing>
+    <p:tnLst>
+      <p:par>
+        <p:cTn xmlns:p14="http://schemas.microsoft.com/office/powerpoint/2010/main" id="1" dur="indefinite" restart="never" nodeType="tmRoot"/>
+      </p:par>
+    </p:tnLst>
+  </p:timing>
 </p:sld>
 </file>
 
@@ -8682,7 +8788,7 @@
           </a:ln>
           <a:extLst>
             <a:ext uri="{C572A759-6A51-4108-AA02-DFA0A04FC94B}">
-              <ma14:wrappingTextBoxFlag xmlns:ma14="http://schemas.microsoft.com/office/mac/drawingml/2011/main" xmlns="" val="1"/>
+              <ma14:wrappingTextBoxFlag xmlns:ma14="http://schemas.microsoft.com/office/mac/drawingml/2011/main" val="1"/>
             </a:ext>
           </a:extLst>
         </p:spPr>
@@ -8887,7 +8993,7 @@
           </a:prstGeom>
           <a:extLst>
             <a:ext uri="{C572A759-6A51-4108-AA02-DFA0A04FC94B}">
-              <ma14:wrappingTextBoxFlag xmlns:ma14="http://schemas.microsoft.com/office/mac/drawingml/2011/main" xmlns="" val="1"/>
+              <ma14:wrappingTextBoxFlag xmlns:ma14="http://schemas.microsoft.com/office/mac/drawingml/2011/main" val="1"/>
             </a:ext>
           </a:extLst>
         </p:spPr>
@@ -9078,7 +9184,14 @@
   <p:clrMapOvr>
     <a:masterClrMapping/>
   </p:clrMapOvr>
-  <p:transition spd="slow"/>
+  <p:transition xmlns:p14="http://schemas.microsoft.com/office/powerpoint/2010/main" spd="slow"/>
+  <p:timing>
+    <p:tnLst>
+      <p:par>
+        <p:cTn xmlns:p14="http://schemas.microsoft.com/office/powerpoint/2010/main" id="1" dur="indefinite" restart="never" nodeType="tmRoot"/>
+      </p:par>
+    </p:tnLst>
+  </p:timing>
 </p:sld>
 </file>
 
@@ -9118,7 +9231,7 @@
           </a:ln>
           <a:extLst>
             <a:ext uri="{C572A759-6A51-4108-AA02-DFA0A04FC94B}">
-              <ma14:wrappingTextBoxFlag xmlns:ma14="http://schemas.microsoft.com/office/mac/drawingml/2011/main" xmlns="" val="1"/>
+              <ma14:wrappingTextBoxFlag xmlns:ma14="http://schemas.microsoft.com/office/mac/drawingml/2011/main" val="1"/>
             </a:ext>
           </a:extLst>
         </p:spPr>
@@ -9200,7 +9313,7 @@
           </a:prstGeom>
           <a:extLst>
             <a:ext uri="{C572A759-6A51-4108-AA02-DFA0A04FC94B}">
-              <ma14:wrappingTextBoxFlag xmlns:ma14="http://schemas.microsoft.com/office/mac/drawingml/2011/main" xmlns="" val="1"/>
+              <ma14:wrappingTextBoxFlag xmlns:ma14="http://schemas.microsoft.com/office/mac/drawingml/2011/main" val="1"/>
             </a:ext>
           </a:extLst>
         </p:spPr>
@@ -9297,7 +9410,7 @@
           </a:ln>
           <a:extLst>
             <a:ext uri="{C572A759-6A51-4108-AA02-DFA0A04FC94B}">
-              <ma14:wrappingTextBoxFlag xmlns:ma14="http://schemas.microsoft.com/office/mac/drawingml/2011/main" xmlns="" val="1"/>
+              <ma14:wrappingTextBoxFlag xmlns:ma14="http://schemas.microsoft.com/office/mac/drawingml/2011/main" val="1"/>
             </a:ext>
           </a:extLst>
         </p:spPr>
@@ -9493,7 +9606,14 @@
   <p:clrMapOvr>
     <a:masterClrMapping/>
   </p:clrMapOvr>
-  <p:transition spd="slow"/>
+  <p:transition xmlns:p14="http://schemas.microsoft.com/office/powerpoint/2010/main" spd="slow"/>
+  <p:timing>
+    <p:tnLst>
+      <p:par>
+        <p:cTn xmlns:p14="http://schemas.microsoft.com/office/powerpoint/2010/main" id="1" dur="indefinite" restart="never" nodeType="tmRoot"/>
+      </p:par>
+    </p:tnLst>
+  </p:timing>
 </p:sld>
 </file>
 

</xml_diff>

<commit_message>
Editet PPP MS III
</commit_message>
<xml_diff>
--- a/00_General/Presentation/MS 3/Presentation_Milestone_iii_Master.pptx
+++ b/00_General/Presentation/MS 3/Presentation_Milestone_iii_Master.pptx
@@ -325,7 +325,7 @@
   </p:defaultTextStyle>
   <p:extLst>
     <p:ext uri="{EFAFB233-063F-42B5-8137-9DF3F51BA10A}">
-      <p15:sldGuideLst xmlns:p15="http://schemas.microsoft.com/office/powerpoint/2012/main" xmlns="">
+      <p15:sldGuideLst xmlns:p15="http://schemas.microsoft.com/office/powerpoint/2012/main">
         <p15:guide id="1" orient="horz" pos="2160" userDrawn="1">
           <p15:clr>
             <a:srgbClr val="A4A3A4"/>
@@ -620,7 +620,7 @@
   <p:clrMapOvr>
     <a:masterClrMapping/>
   </p:clrMapOvr>
-  <p:transition xmlns:p14="http://schemas.microsoft.com/office/powerpoint/2010/main" spd="med"/>
+  <p:transition spd="med"/>
 </p:sldLayout>
 </file>
 
@@ -818,7 +818,7 @@
   <p:clrMapOvr>
     <a:masterClrMapping/>
   </p:clrMapOvr>
-  <p:transition xmlns:p14="http://schemas.microsoft.com/office/powerpoint/2010/main" spd="med"/>
+  <p:transition spd="med"/>
 </p:sldLayout>
 </file>
 
@@ -944,7 +944,7 @@
   <p:clrMapOvr>
     <a:masterClrMapping/>
   </p:clrMapOvr>
-  <p:transition xmlns:p14="http://schemas.microsoft.com/office/powerpoint/2010/main" spd="med"/>
+  <p:transition spd="med"/>
 </p:sldLayout>
 </file>
 
@@ -1078,7 +1078,7 @@
   <p:clrMapOvr>
     <a:masterClrMapping/>
   </p:clrMapOvr>
-  <p:transition xmlns:p14="http://schemas.microsoft.com/office/powerpoint/2010/main" spd="med"/>
+  <p:transition spd="med"/>
 </p:sldLayout>
 </file>
 
@@ -1212,7 +1212,7 @@
   <p:clrMapOvr>
     <a:masterClrMapping/>
   </p:clrMapOvr>
-  <p:transition xmlns:p14="http://schemas.microsoft.com/office/powerpoint/2010/main" spd="med"/>
+  <p:transition spd="med"/>
 </p:sldLayout>
 </file>
 
@@ -1338,7 +1338,7 @@
   <p:clrMapOvr>
     <a:masterClrMapping/>
   </p:clrMapOvr>
-  <p:transition xmlns:p14="http://schemas.microsoft.com/office/powerpoint/2010/main" spd="med"/>
+  <p:transition spd="med"/>
 </p:sldLayout>
 </file>
 
@@ -1472,7 +1472,7 @@
   <p:clrMapOvr>
     <a:masterClrMapping/>
   </p:clrMapOvr>
-  <p:transition xmlns:p14="http://schemas.microsoft.com/office/powerpoint/2010/main" spd="med"/>
+  <p:transition spd="med"/>
 </p:sldLayout>
 </file>
 
@@ -1661,7 +1661,7 @@
   <p:clrMapOvr>
     <a:masterClrMapping/>
   </p:clrMapOvr>
-  <p:transition xmlns:p14="http://schemas.microsoft.com/office/powerpoint/2010/main" spd="med"/>
+  <p:transition spd="med"/>
 </p:sldLayout>
 </file>
 
@@ -1791,7 +1791,7 @@
   <p:clrMapOvr>
     <a:masterClrMapping/>
   </p:clrMapOvr>
-  <p:transition xmlns:p14="http://schemas.microsoft.com/office/powerpoint/2010/main" spd="med"/>
+  <p:transition spd="med"/>
 </p:sldLayout>
 </file>
 
@@ -1935,7 +1935,7 @@
   <p:clrMapOvr>
     <a:masterClrMapping/>
   </p:clrMapOvr>
-  <p:transition xmlns:p14="http://schemas.microsoft.com/office/powerpoint/2010/main" spd="med"/>
+  <p:transition spd="med"/>
 </p:sldLayout>
 </file>
 
@@ -2012,7 +2012,7 @@
   <p:clrMapOvr>
     <a:masterClrMapping/>
   </p:clrMapOvr>
-  <p:transition xmlns:p14="http://schemas.microsoft.com/office/powerpoint/2010/main" spd="med"/>
+  <p:transition spd="med"/>
 </p:sldLayout>
 </file>
 
@@ -2064,7 +2064,7 @@
   <p:clrMapOvr>
     <a:masterClrMapping/>
   </p:clrMapOvr>
-  <p:transition xmlns:p14="http://schemas.microsoft.com/office/powerpoint/2010/main" spd="med"/>
+  <p:transition spd="med"/>
 </p:sldLayout>
 </file>
 
@@ -2245,7 +2245,7 @@
   <p:clrMapOvr>
     <a:masterClrMapping/>
   </p:clrMapOvr>
-  <p:transition xmlns:p14="http://schemas.microsoft.com/office/powerpoint/2010/main" spd="med"/>
+  <p:transition spd="med"/>
 </p:sldLayout>
 </file>
 
@@ -2297,7 +2297,7 @@
           </a:ln>
           <a:extLst>
             <a:ext uri="{C572A759-6A51-4108-AA02-DFA0A04FC94B}">
-              <ma14:wrappingTextBoxFlag xmlns:ma14="http://schemas.microsoft.com/office/mac/drawingml/2011/main" val="1"/>
+              <ma14:wrappingTextBoxFlag xmlns:ma14="http://schemas.microsoft.com/office/mac/drawingml/2011/main" xmlns="" val="1"/>
             </a:ext>
           </a:extLst>
         </p:spPr>
@@ -2336,7 +2336,7 @@
           </a:ln>
           <a:extLst>
             <a:ext uri="{C572A759-6A51-4108-AA02-DFA0A04FC94B}">
-              <ma14:wrappingTextBoxFlag xmlns:ma14="http://schemas.microsoft.com/office/mac/drawingml/2011/main" val="1"/>
+              <ma14:wrappingTextBoxFlag xmlns:ma14="http://schemas.microsoft.com/office/mac/drawingml/2011/main" xmlns="" val="1"/>
             </a:ext>
           </a:extLst>
         </p:spPr>
@@ -2437,7 +2437,7 @@
     <p:sldLayoutId id="2147483660" r:id="rId12"/>
     <p:sldLayoutId id="2147483661" r:id="rId13"/>
   </p:sldLayoutIdLst>
-  <p:transition xmlns:p14="http://schemas.microsoft.com/office/powerpoint/2010/main" spd="med"/>
+  <p:transition spd="med"/>
   <p:txStyles>
     <p:titleStyle>
       <a:lvl1pPr marL="0" marR="0" indent="0" algn="l" defTabSz="914400" rtl="0" latinLnBrk="0">
@@ -3276,7 +3276,7 @@
           </a:ln>
           <a:extLst>
             <a:ext uri="{C572A759-6A51-4108-AA02-DFA0A04FC94B}">
-              <ma14:wrappingTextBoxFlag xmlns:ma14="http://schemas.microsoft.com/office/mac/drawingml/2011/main" val="1"/>
+              <ma14:wrappingTextBoxFlag xmlns:ma14="http://schemas.microsoft.com/office/mac/drawingml/2011/main" xmlns="" val="1"/>
             </a:ext>
           </a:extLst>
         </p:spPr>
@@ -3309,10 +3309,9 @@
               <a:t>I</a:t>
             </a:r>
             <a:r>
-              <a:rPr dirty="0" smtClean="0"/>
+              <a:rPr dirty="0"/>
               <a:t>II</a:t>
             </a:r>
-            <a:endParaRPr dirty="0"/>
           </a:p>
           <a:p>
             <a:pPr>
@@ -3628,7 +3627,7 @@
           </a:ln>
           <a:extLst>
             <a:ext uri="{C572A759-6A51-4108-AA02-DFA0A04FC94B}">
-              <ma14:wrappingTextBoxFlag xmlns:ma14="http://schemas.microsoft.com/office/mac/drawingml/2011/main" val="1"/>
+              <ma14:wrappingTextBoxFlag xmlns:ma14="http://schemas.microsoft.com/office/mac/drawingml/2011/main" xmlns="" val="1"/>
             </a:ext>
           </a:extLst>
         </p:spPr>
@@ -3811,14 +3810,7 @@
   <p:clrMapOvr>
     <a:masterClrMapping/>
   </p:clrMapOvr>
-  <p:transition xmlns:p14="http://schemas.microsoft.com/office/powerpoint/2010/main" spd="med"/>
-  <p:timing>
-    <p:tnLst>
-      <p:par>
-        <p:cTn xmlns:p14="http://schemas.microsoft.com/office/powerpoint/2010/main" id="1" dur="indefinite" restart="never" nodeType="tmRoot"/>
-      </p:par>
-    </p:tnLst>
-  </p:timing>
+  <p:transition spd="med"/>
 </p:sld>
 </file>
 
@@ -3847,8 +3839,8 @@
         </p:nvSpPr>
         <p:spPr>
           <a:xfrm>
-            <a:off x="4038600" y="6404292"/>
-            <a:ext cx="4114800" cy="269239"/>
+            <a:off x="4038600" y="6400414"/>
+            <a:ext cx="4114800" cy="276995"/>
           </a:xfrm>
           <a:prstGeom prst="rect">
             <a:avLst/>
@@ -3858,7 +3850,7 @@
           </a:ln>
           <a:extLst>
             <a:ext uri="{C572A759-6A51-4108-AA02-DFA0A04FC94B}">
-              <ma14:wrappingTextBoxFlag xmlns:ma14="http://schemas.microsoft.com/office/mac/drawingml/2011/main" val="1"/>
+              <ma14:wrappingTextBoxFlag xmlns:ma14="http://schemas.microsoft.com/office/mac/drawingml/2011/main" xmlns="" val="1"/>
             </a:ext>
           </a:extLst>
         </p:spPr>
@@ -3877,7 +3869,12 @@
           </a:lstStyle>
           <a:p>
             <a:r>
-              <a:t>Mlst.-Präsentation Nr. 1  /  Gruppe 15</a:t>
+              <a:rPr lang="de-CH" dirty="0" err="1"/>
+              <a:t>Mlst</a:t>
+            </a:r>
+            <a:r>
+              <a:rPr lang="de-CH" dirty="0"/>
+              <a:t>.-Präsentation Nr. III  /  Gruppe 15</a:t>
             </a:r>
           </a:p>
         </p:txBody>
@@ -3940,7 +3937,7 @@
           </a:prstGeom>
           <a:extLst>
             <a:ext uri="{C572A759-6A51-4108-AA02-DFA0A04FC94B}">
-              <ma14:wrappingTextBoxFlag xmlns:ma14="http://schemas.microsoft.com/office/mac/drawingml/2011/main" val="1"/>
+              <ma14:wrappingTextBoxFlag xmlns:ma14="http://schemas.microsoft.com/office/mac/drawingml/2011/main" xmlns="" val="1"/>
             </a:ext>
           </a:extLst>
         </p:spPr>
@@ -4037,7 +4034,7 @@
           </a:ln>
           <a:extLst>
             <a:ext uri="{C572A759-6A51-4108-AA02-DFA0A04FC94B}">
-              <ma14:wrappingTextBoxFlag xmlns:ma14="http://schemas.microsoft.com/office/mac/drawingml/2011/main" val="1"/>
+              <ma14:wrappingTextBoxFlag xmlns:ma14="http://schemas.microsoft.com/office/mac/drawingml/2011/main" xmlns="" val="1"/>
             </a:ext>
           </a:extLst>
         </p:spPr>
@@ -4092,14 +4089,7 @@
   <p:clrMapOvr>
     <a:masterClrMapping/>
   </p:clrMapOvr>
-  <p:transition xmlns:p14="http://schemas.microsoft.com/office/powerpoint/2010/main" spd="slow"/>
-  <p:timing>
-    <p:tnLst>
-      <p:par>
-        <p:cTn xmlns:p14="http://schemas.microsoft.com/office/powerpoint/2010/main" id="1" dur="indefinite" restart="never" nodeType="tmRoot"/>
-      </p:par>
-    </p:tnLst>
-  </p:timing>
+  <p:transition spd="slow"/>
 </p:sld>
 </file>
 
@@ -4128,8 +4118,8 @@
         </p:nvSpPr>
         <p:spPr>
           <a:xfrm>
-            <a:off x="4038600" y="6404292"/>
-            <a:ext cx="4114800" cy="269239"/>
+            <a:off x="4038600" y="6400414"/>
+            <a:ext cx="4114800" cy="276995"/>
           </a:xfrm>
           <a:prstGeom prst="rect">
             <a:avLst/>
@@ -4139,7 +4129,7 @@
           </a:ln>
           <a:extLst>
             <a:ext uri="{C572A759-6A51-4108-AA02-DFA0A04FC94B}">
-              <ma14:wrappingTextBoxFlag xmlns:ma14="http://schemas.microsoft.com/office/mac/drawingml/2011/main" val="1"/>
+              <ma14:wrappingTextBoxFlag xmlns:ma14="http://schemas.microsoft.com/office/mac/drawingml/2011/main" xmlns="" val="1"/>
             </a:ext>
           </a:extLst>
         </p:spPr>
@@ -4158,7 +4148,12 @@
           </a:lstStyle>
           <a:p>
             <a:r>
-              <a:t>Mlst.-Präsentation Nr. 1  /  Gruppe 15</a:t>
+              <a:rPr lang="de-CH" dirty="0" err="1"/>
+              <a:t>Mlst</a:t>
+            </a:r>
+            <a:r>
+              <a:rPr lang="de-CH" dirty="0"/>
+              <a:t>.-Präsentation Nr. III  /  Gruppe 15</a:t>
             </a:r>
           </a:p>
         </p:txBody>
@@ -4344,7 +4339,7 @@
           </a:prstGeom>
           <a:extLst>
             <a:ext uri="{C572A759-6A51-4108-AA02-DFA0A04FC94B}">
-              <ma14:wrappingTextBoxFlag xmlns:ma14="http://schemas.microsoft.com/office/mac/drawingml/2011/main" val="1"/>
+              <ma14:wrappingTextBoxFlag xmlns:ma14="http://schemas.microsoft.com/office/mac/drawingml/2011/main" xmlns="" val="1"/>
             </a:ext>
           </a:extLst>
         </p:spPr>
@@ -4535,14 +4530,7 @@
   <p:clrMapOvr>
     <a:masterClrMapping/>
   </p:clrMapOvr>
-  <p:transition xmlns:p14="http://schemas.microsoft.com/office/powerpoint/2010/main" spd="slow"/>
-  <p:timing>
-    <p:tnLst>
-      <p:par>
-        <p:cTn xmlns:p14="http://schemas.microsoft.com/office/powerpoint/2010/main" id="1" dur="indefinite" restart="never" nodeType="tmRoot"/>
-      </p:par>
-    </p:tnLst>
-  </p:timing>
+  <p:transition spd="slow"/>
 </p:sld>
 </file>
 
@@ -4598,8 +4586,8 @@
         </p:nvSpPr>
         <p:spPr>
           <a:xfrm>
-            <a:off x="4038600" y="6404292"/>
-            <a:ext cx="4114800" cy="269239"/>
+            <a:off x="4038600" y="6400414"/>
+            <a:ext cx="4114800" cy="276995"/>
           </a:xfrm>
           <a:prstGeom prst="rect">
             <a:avLst/>
@@ -4609,7 +4597,7 @@
           </a:ln>
           <a:extLst>
             <a:ext uri="{C572A759-6A51-4108-AA02-DFA0A04FC94B}">
-              <ma14:wrappingTextBoxFlag xmlns:ma14="http://schemas.microsoft.com/office/mac/drawingml/2011/main" val="1"/>
+              <ma14:wrappingTextBoxFlag xmlns:ma14="http://schemas.microsoft.com/office/mac/drawingml/2011/main" xmlns="" val="1"/>
             </a:ext>
           </a:extLst>
         </p:spPr>
@@ -4628,7 +4616,28 @@
           </a:lstStyle>
           <a:p>
             <a:r>
-              <a:t>Mlst.-Präsentation Nr. 1  /  Gruppe 15</a:t>
+              <a:rPr dirty="0" err="1"/>
+              <a:t>Mlst</a:t>
+            </a:r>
+            <a:r>
+              <a:rPr dirty="0"/>
+              <a:t>.-</a:t>
+            </a:r>
+            <a:r>
+              <a:rPr dirty="0" err="1"/>
+              <a:t>Präsentation</a:t>
+            </a:r>
+            <a:r>
+              <a:rPr dirty="0"/>
+              <a:t> Nr. </a:t>
+            </a:r>
+            <a:r>
+              <a:rPr lang="de-CH" dirty="0"/>
+              <a:t>III</a:t>
+            </a:r>
+            <a:r>
+              <a:rPr dirty="0"/>
+              <a:t>  /  Gruppe 15</a:t>
             </a:r>
           </a:p>
         </p:txBody>
@@ -4691,7 +4700,7 @@
           </a:prstGeom>
           <a:extLst>
             <a:ext uri="{C572A759-6A51-4108-AA02-DFA0A04FC94B}">
-              <ma14:wrappingTextBoxFlag xmlns:ma14="http://schemas.microsoft.com/office/mac/drawingml/2011/main" val="1"/>
+              <ma14:wrappingTextBoxFlag xmlns:ma14="http://schemas.microsoft.com/office/mac/drawingml/2011/main" xmlns="" val="1"/>
             </a:ext>
           </a:extLst>
         </p:spPr>
@@ -4788,7 +4797,7 @@
           </a:ln>
           <a:extLst>
             <a:ext uri="{C572A759-6A51-4108-AA02-DFA0A04FC94B}">
-              <ma14:wrappingTextBoxFlag xmlns:ma14="http://schemas.microsoft.com/office/mac/drawingml/2011/main" val="1"/>
+              <ma14:wrappingTextBoxFlag xmlns:ma14="http://schemas.microsoft.com/office/mac/drawingml/2011/main" xmlns="" val="1"/>
             </a:ext>
           </a:extLst>
         </p:spPr>
@@ -5115,6 +5124,10 @@
             <a:r>
               <a:rPr dirty="0" err="1"/>
               <a:t>haben</a:t>
+            </a:r>
+            <a:r>
+              <a:rPr lang="de-CH" dirty="0"/>
+              <a:t>.</a:t>
             </a:r>
             <a:endParaRPr dirty="0"/>
           </a:p>
@@ -5125,14 +5138,7 @@
   <p:clrMapOvr>
     <a:masterClrMapping/>
   </p:clrMapOvr>
-  <p:transition xmlns:p14="http://schemas.microsoft.com/office/powerpoint/2010/main" spd="slow"/>
-  <p:timing>
-    <p:tnLst>
-      <p:par>
-        <p:cTn xmlns:p14="http://schemas.microsoft.com/office/powerpoint/2010/main" id="1" dur="indefinite" restart="never" nodeType="tmRoot"/>
-      </p:par>
-    </p:tnLst>
-  </p:timing>
+  <p:transition spd="slow"/>
 </p:sld>
 </file>
 
@@ -5161,8 +5167,8 @@
         </p:nvSpPr>
         <p:spPr>
           <a:xfrm>
-            <a:off x="4038600" y="6404292"/>
-            <a:ext cx="4114800" cy="269239"/>
+            <a:off x="4038600" y="6400414"/>
+            <a:ext cx="4114800" cy="276995"/>
           </a:xfrm>
           <a:prstGeom prst="rect">
             <a:avLst/>
@@ -5172,7 +5178,7 @@
           </a:ln>
           <a:extLst>
             <a:ext uri="{C572A759-6A51-4108-AA02-DFA0A04FC94B}">
-              <ma14:wrappingTextBoxFlag xmlns:ma14="http://schemas.microsoft.com/office/mac/drawingml/2011/main" val="1"/>
+              <ma14:wrappingTextBoxFlag xmlns:ma14="http://schemas.microsoft.com/office/mac/drawingml/2011/main" xmlns="" val="1"/>
             </a:ext>
           </a:extLst>
         </p:spPr>
@@ -5191,7 +5197,12 @@
           </a:lstStyle>
           <a:p>
             <a:r>
-              <a:t>Mlst.-Präsentation Nr. 1  /  Gruppe 15</a:t>
+              <a:rPr lang="de-CH" dirty="0" err="1"/>
+              <a:t>Mlst</a:t>
+            </a:r>
+            <a:r>
+              <a:rPr lang="de-CH" dirty="0"/>
+              <a:t>.-Präsentation Nr. III  /  Gruppe 15</a:t>
             </a:r>
           </a:p>
         </p:txBody>
@@ -5254,7 +5265,7 @@
           </a:prstGeom>
           <a:extLst>
             <a:ext uri="{C572A759-6A51-4108-AA02-DFA0A04FC94B}">
-              <ma14:wrappingTextBoxFlag xmlns:ma14="http://schemas.microsoft.com/office/mac/drawingml/2011/main" val="1"/>
+              <ma14:wrappingTextBoxFlag xmlns:ma14="http://schemas.microsoft.com/office/mac/drawingml/2011/main" xmlns="" val="1"/>
             </a:ext>
           </a:extLst>
         </p:spPr>
@@ -5341,7 +5352,7 @@
         <p:spPr>
           <a:xfrm>
             <a:off x="418555" y="1053000"/>
-            <a:ext cx="9678490" cy="5349239"/>
+            <a:ext cx="9678490" cy="5016754"/>
           </a:xfrm>
           <a:prstGeom prst="rect">
             <a:avLst/>
@@ -5351,7 +5362,7 @@
           </a:ln>
           <a:extLst>
             <a:ext uri="{C572A759-6A51-4108-AA02-DFA0A04FC94B}">
-              <ma14:wrappingTextBoxFlag xmlns:ma14="http://schemas.microsoft.com/office/mac/drawingml/2011/main" val="1"/>
+              <ma14:wrappingTextBoxFlag xmlns:ma14="http://schemas.microsoft.com/office/mac/drawingml/2011/main" xmlns="" val="1"/>
             </a:ext>
           </a:extLst>
         </p:spPr>
@@ -5416,29 +5427,6 @@
             </a:pPr>
             <a:r>
               <a:rPr dirty="0" err="1"/>
-              <a:t>Keiner</a:t>
-            </a:r>
-            <a:r>
-              <a:rPr dirty="0"/>
-              <a:t> </a:t>
-            </a:r>
-            <a:r>
-              <a:rPr dirty="0" err="1"/>
-              <a:t>musste</a:t>
-            </a:r>
-            <a:r>
-              <a:rPr dirty="0"/>
-              <a:t> Chef sein</a:t>
-            </a:r>
-          </a:p>
-          <a:p>
-            <a:pPr marL="800100" lvl="1" indent="-342900">
-              <a:buSzPct val="100000"/>
-              <a:buChar char="-"/>
-              <a:defRPr sz="2000"/>
-            </a:pPr>
-            <a:r>
-              <a:rPr dirty="0" err="1"/>
               <a:t>Wir</a:t>
             </a:r>
             <a:r>
@@ -5539,7 +5527,7 @@
             </a:r>
             <a:r>
               <a:rPr dirty="0"/>
-              <a:t> Server / Client </a:t>
+              <a:t> </a:t>
             </a:r>
             <a:r>
               <a:rPr dirty="0" err="1"/>
@@ -5874,14 +5862,7 @@
   <p:clrMapOvr>
     <a:masterClrMapping/>
   </p:clrMapOvr>
-  <p:transition xmlns:p14="http://schemas.microsoft.com/office/powerpoint/2010/main" spd="slow"/>
-  <p:timing>
-    <p:tnLst>
-      <p:par>
-        <p:cTn xmlns:p14="http://schemas.microsoft.com/office/powerpoint/2010/main" id="1" dur="indefinite" restart="never" nodeType="tmRoot"/>
-      </p:par>
-    </p:tnLst>
-  </p:timing>
+  <p:transition spd="slow"/>
 </p:sld>
 </file>
 
@@ -5910,8 +5891,8 @@
         </p:nvSpPr>
         <p:spPr>
           <a:xfrm>
-            <a:off x="4038600" y="6404292"/>
-            <a:ext cx="4114800" cy="269239"/>
+            <a:off x="4038600" y="6400414"/>
+            <a:ext cx="4114800" cy="276995"/>
           </a:xfrm>
           <a:prstGeom prst="rect">
             <a:avLst/>
@@ -5921,7 +5902,7 @@
           </a:ln>
           <a:extLst>
             <a:ext uri="{C572A759-6A51-4108-AA02-DFA0A04FC94B}">
-              <ma14:wrappingTextBoxFlag xmlns:ma14="http://schemas.microsoft.com/office/mac/drawingml/2011/main" val="1"/>
+              <ma14:wrappingTextBoxFlag xmlns:ma14="http://schemas.microsoft.com/office/mac/drawingml/2011/main" xmlns="" val="1"/>
             </a:ext>
           </a:extLst>
         </p:spPr>
@@ -5940,7 +5921,12 @@
           </a:lstStyle>
           <a:p>
             <a:r>
-              <a:t>Mlst.-Präsentation Nr. 1  /  Gruppe 15</a:t>
+              <a:rPr lang="de-CH" dirty="0" err="1"/>
+              <a:t>Mlst</a:t>
+            </a:r>
+            <a:r>
+              <a:rPr lang="de-CH" dirty="0"/>
+              <a:t>.-Präsentation Nr. III  /  Gruppe 15</a:t>
             </a:r>
           </a:p>
         </p:txBody>
@@ -6003,7 +5989,7 @@
           </a:prstGeom>
           <a:extLst>
             <a:ext uri="{C572A759-6A51-4108-AA02-DFA0A04FC94B}">
-              <ma14:wrappingTextBoxFlag xmlns:ma14="http://schemas.microsoft.com/office/mac/drawingml/2011/main" val="1"/>
+              <ma14:wrappingTextBoxFlag xmlns:ma14="http://schemas.microsoft.com/office/mac/drawingml/2011/main" xmlns="" val="1"/>
             </a:ext>
           </a:extLst>
         </p:spPr>
@@ -6037,7 +6023,7 @@
           </a:ln>
           <a:extLst>
             <a:ext uri="{C572A759-6A51-4108-AA02-DFA0A04FC94B}">
-              <ma14:wrappingTextBoxFlag xmlns:ma14="http://schemas.microsoft.com/office/mac/drawingml/2011/main" val="1"/>
+              <ma14:wrappingTextBoxFlag xmlns:ma14="http://schemas.microsoft.com/office/mac/drawingml/2011/main" xmlns="" val="1"/>
             </a:ext>
           </a:extLst>
         </p:spPr>
@@ -6089,14 +6075,7 @@
   <p:clrMapOvr>
     <a:masterClrMapping/>
   </p:clrMapOvr>
-  <p:transition xmlns:p14="http://schemas.microsoft.com/office/powerpoint/2010/main" spd="slow"/>
-  <p:timing>
-    <p:tnLst>
-      <p:par>
-        <p:cTn xmlns:p14="http://schemas.microsoft.com/office/powerpoint/2010/main" id="1" dur="indefinite" restart="never" nodeType="tmRoot"/>
-      </p:par>
-    </p:tnLst>
-  </p:timing>
+  <p:transition spd="slow"/>
 </p:sld>
 </file>
 
@@ -6125,8 +6104,8 @@
         </p:nvSpPr>
         <p:spPr>
           <a:xfrm>
-            <a:off x="4038600" y="6404292"/>
-            <a:ext cx="4114800" cy="269239"/>
+            <a:off x="4038600" y="6400414"/>
+            <a:ext cx="4114800" cy="276995"/>
           </a:xfrm>
           <a:prstGeom prst="rect">
             <a:avLst/>
@@ -6136,7 +6115,7 @@
           </a:ln>
           <a:extLst>
             <a:ext uri="{C572A759-6A51-4108-AA02-DFA0A04FC94B}">
-              <ma14:wrappingTextBoxFlag xmlns:ma14="http://schemas.microsoft.com/office/mac/drawingml/2011/main" val="1"/>
+              <ma14:wrappingTextBoxFlag xmlns:ma14="http://schemas.microsoft.com/office/mac/drawingml/2011/main" xmlns="" val="1"/>
             </a:ext>
           </a:extLst>
         </p:spPr>
@@ -6155,7 +6134,28 @@
           </a:lstStyle>
           <a:p>
             <a:r>
-              <a:t>Mlst.-Präsentation Nr. 1  /  Gruppe 15</a:t>
+              <a:rPr dirty="0" err="1"/>
+              <a:t>Mlst</a:t>
+            </a:r>
+            <a:r>
+              <a:rPr dirty="0"/>
+              <a:t>.-</a:t>
+            </a:r>
+            <a:r>
+              <a:rPr dirty="0" err="1"/>
+              <a:t>Präsentation</a:t>
+            </a:r>
+            <a:r>
+              <a:rPr dirty="0"/>
+              <a:t> Nr. </a:t>
+            </a:r>
+            <a:r>
+              <a:rPr lang="de-CH" dirty="0"/>
+              <a:t>III</a:t>
+            </a:r>
+            <a:r>
+              <a:rPr dirty="0"/>
+              <a:t>  /  Gruppe 15</a:t>
             </a:r>
           </a:p>
         </p:txBody>
@@ -6303,7 +6303,7 @@
           </a:prstGeom>
           <a:extLst>
             <a:ext uri="{C572A759-6A51-4108-AA02-DFA0A04FC94B}">
-              <ma14:wrappingTextBoxFlag xmlns:ma14="http://schemas.microsoft.com/office/mac/drawingml/2011/main" val="1"/>
+              <ma14:wrappingTextBoxFlag xmlns:ma14="http://schemas.microsoft.com/office/mac/drawingml/2011/main" xmlns="" val="1"/>
             </a:ext>
           </a:extLst>
         </p:spPr>
@@ -6532,14 +6532,7 @@
   <p:clrMapOvr>
     <a:masterClrMapping/>
   </p:clrMapOvr>
-  <p:transition xmlns:p14="http://schemas.microsoft.com/office/powerpoint/2010/main" spd="slow"/>
-  <p:timing>
-    <p:tnLst>
-      <p:par>
-        <p:cTn xmlns:p14="http://schemas.microsoft.com/office/powerpoint/2010/main" id="1" dur="indefinite" restart="never" nodeType="tmRoot"/>
-      </p:par>
-    </p:tnLst>
-  </p:timing>
+  <p:transition spd="slow"/>
 </p:sld>
 </file>
 
@@ -6568,8 +6561,8 @@
         </p:nvSpPr>
         <p:spPr>
           <a:xfrm>
-            <a:off x="4038600" y="6404292"/>
-            <a:ext cx="4114800" cy="269239"/>
+            <a:off x="4038600" y="6400414"/>
+            <a:ext cx="4114800" cy="276995"/>
           </a:xfrm>
           <a:prstGeom prst="rect">
             <a:avLst/>
@@ -6579,7 +6572,7 @@
           </a:ln>
           <a:extLst>
             <a:ext uri="{C572A759-6A51-4108-AA02-DFA0A04FC94B}">
-              <ma14:wrappingTextBoxFlag xmlns:ma14="http://schemas.microsoft.com/office/mac/drawingml/2011/main" val="1"/>
+              <ma14:wrappingTextBoxFlag xmlns:ma14="http://schemas.microsoft.com/office/mac/drawingml/2011/main" xmlns="" val="1"/>
             </a:ext>
           </a:extLst>
         </p:spPr>
@@ -6598,7 +6591,12 @@
           </a:lstStyle>
           <a:p>
             <a:r>
-              <a:t>Mlst.-Präsentation Nr. 1  /  Gruppe 15</a:t>
+              <a:rPr lang="de-CH" dirty="0" err="1"/>
+              <a:t>Mlst</a:t>
+            </a:r>
+            <a:r>
+              <a:rPr lang="de-CH" dirty="0"/>
+              <a:t>.-Präsentation Nr. III  /  Gruppe 15</a:t>
             </a:r>
           </a:p>
         </p:txBody>
@@ -6784,7 +6782,7 @@
           </a:prstGeom>
           <a:extLst>
             <a:ext uri="{C572A759-6A51-4108-AA02-DFA0A04FC94B}">
-              <ma14:wrappingTextBoxFlag xmlns:ma14="http://schemas.microsoft.com/office/mac/drawingml/2011/main" val="1"/>
+              <ma14:wrappingTextBoxFlag xmlns:ma14="http://schemas.microsoft.com/office/mac/drawingml/2011/main" xmlns="" val="1"/>
             </a:ext>
           </a:extLst>
         </p:spPr>
@@ -6975,14 +6973,7 @@
   <p:clrMapOvr>
     <a:masterClrMapping/>
   </p:clrMapOvr>
-  <p:transition xmlns:p14="http://schemas.microsoft.com/office/powerpoint/2010/main" spd="slow"/>
-  <p:timing>
-    <p:tnLst>
-      <p:par>
-        <p:cTn xmlns:p14="http://schemas.microsoft.com/office/powerpoint/2010/main" id="1" dur="indefinite" restart="never" nodeType="tmRoot"/>
-      </p:par>
-    </p:tnLst>
-  </p:timing>
+  <p:transition spd="slow"/>
 </p:sld>
 </file>
 
@@ -7038,8 +7029,8 @@
         </p:nvSpPr>
         <p:spPr>
           <a:xfrm>
-            <a:off x="3935999" y="6396609"/>
-            <a:ext cx="4114803" cy="269239"/>
+            <a:off x="3935999" y="6392731"/>
+            <a:ext cx="4114803" cy="276995"/>
           </a:xfrm>
           <a:prstGeom prst="rect">
             <a:avLst/>
@@ -7049,7 +7040,7 @@
           </a:ln>
           <a:extLst>
             <a:ext uri="{C572A759-6A51-4108-AA02-DFA0A04FC94B}">
-              <ma14:wrappingTextBoxFlag xmlns:ma14="http://schemas.microsoft.com/office/mac/drawingml/2011/main" val="1"/>
+              <ma14:wrappingTextBoxFlag xmlns:ma14="http://schemas.microsoft.com/office/mac/drawingml/2011/main" xmlns="" val="1"/>
             </a:ext>
           </a:extLst>
         </p:spPr>
@@ -7068,7 +7059,12 @@
           </a:lstStyle>
           <a:p>
             <a:r>
-              <a:t>Mlst.-Präsentation Nr. 1  /  Gruppe 15</a:t>
+              <a:rPr lang="de-CH" dirty="0" err="1"/>
+              <a:t>Mlst</a:t>
+            </a:r>
+            <a:r>
+              <a:rPr lang="de-CH" dirty="0"/>
+              <a:t>.-Präsentation Nr. III  /  Gruppe 15</a:t>
             </a:r>
           </a:p>
         </p:txBody>
@@ -7093,7 +7089,7 @@
           </a:prstGeom>
           <a:extLst>
             <a:ext uri="{C572A759-6A51-4108-AA02-DFA0A04FC94B}">
-              <ma14:wrappingTextBoxFlag xmlns:ma14="http://schemas.microsoft.com/office/mac/drawingml/2011/main" val="1"/>
+              <ma14:wrappingTextBoxFlag xmlns:ma14="http://schemas.microsoft.com/office/mac/drawingml/2011/main" xmlns="" val="1"/>
             </a:ext>
           </a:extLst>
         </p:spPr>
@@ -7228,14 +7224,7 @@
   <p:clrMapOvr>
     <a:masterClrMapping/>
   </p:clrMapOvr>
-  <p:transition xmlns:p14="http://schemas.microsoft.com/office/powerpoint/2010/main" spd="slow"/>
-  <p:timing>
-    <p:tnLst>
-      <p:par>
-        <p:cTn xmlns:p14="http://schemas.microsoft.com/office/powerpoint/2010/main" id="1" dur="indefinite" restart="never" nodeType="tmRoot"/>
-      </p:par>
-    </p:tnLst>
-  </p:timing>
+  <p:transition spd="slow"/>
 </p:sld>
 </file>
 
@@ -7264,8 +7253,8 @@
         </p:nvSpPr>
         <p:spPr>
           <a:xfrm>
-            <a:off x="4038600" y="6404292"/>
-            <a:ext cx="4114800" cy="269239"/>
+            <a:off x="4038600" y="6400414"/>
+            <a:ext cx="4114800" cy="276995"/>
           </a:xfrm>
           <a:prstGeom prst="rect">
             <a:avLst/>
@@ -7275,7 +7264,7 @@
           </a:ln>
           <a:extLst>
             <a:ext uri="{C572A759-6A51-4108-AA02-DFA0A04FC94B}">
-              <ma14:wrappingTextBoxFlag xmlns:ma14="http://schemas.microsoft.com/office/mac/drawingml/2011/main" val="1"/>
+              <ma14:wrappingTextBoxFlag xmlns:ma14="http://schemas.microsoft.com/office/mac/drawingml/2011/main" xmlns="" val="1"/>
             </a:ext>
           </a:extLst>
         </p:spPr>
@@ -7294,7 +7283,12 @@
           </a:lstStyle>
           <a:p>
             <a:r>
-              <a:t>Mlst.-Präsentation Nr. 1  /  Gruppe 15</a:t>
+              <a:rPr lang="de-CH" dirty="0" err="1"/>
+              <a:t>Mlst</a:t>
+            </a:r>
+            <a:r>
+              <a:rPr lang="de-CH" dirty="0"/>
+              <a:t>.-Präsentation Nr. III  /  Gruppe 15</a:t>
             </a:r>
           </a:p>
         </p:txBody>
@@ -7480,7 +7474,7 @@
           </a:prstGeom>
           <a:extLst>
             <a:ext uri="{C572A759-6A51-4108-AA02-DFA0A04FC94B}">
-              <ma14:wrappingTextBoxFlag xmlns:ma14="http://schemas.microsoft.com/office/mac/drawingml/2011/main" val="1"/>
+              <ma14:wrappingTextBoxFlag xmlns:ma14="http://schemas.microsoft.com/office/mac/drawingml/2011/main" xmlns="" val="1"/>
             </a:ext>
           </a:extLst>
         </p:spPr>
@@ -7671,14 +7665,7 @@
   <p:clrMapOvr>
     <a:masterClrMapping/>
   </p:clrMapOvr>
-  <p:transition xmlns:p14="http://schemas.microsoft.com/office/powerpoint/2010/main" spd="slow"/>
-  <p:timing>
-    <p:tnLst>
-      <p:par>
-        <p:cTn xmlns:p14="http://schemas.microsoft.com/office/powerpoint/2010/main" id="1" dur="indefinite" restart="never" nodeType="tmRoot"/>
-      </p:par>
-    </p:tnLst>
-  </p:timing>
+  <p:transition spd="slow"/>
 </p:sld>
 </file>
 
@@ -7718,7 +7705,7 @@
           </a:ln>
           <a:extLst>
             <a:ext uri="{C572A759-6A51-4108-AA02-DFA0A04FC94B}">
-              <ma14:wrappingTextBoxFlag xmlns:ma14="http://schemas.microsoft.com/office/mac/drawingml/2011/main" val="1"/>
+              <ma14:wrappingTextBoxFlag xmlns:ma14="http://schemas.microsoft.com/office/mac/drawingml/2011/main" xmlns="" val="1"/>
             </a:ext>
           </a:extLst>
         </p:spPr>
@@ -7783,7 +7770,7 @@
           </a:prstGeom>
           <a:extLst>
             <a:ext uri="{C572A759-6A51-4108-AA02-DFA0A04FC94B}">
-              <ma14:wrappingTextBoxFlag xmlns:ma14="http://schemas.microsoft.com/office/mac/drawingml/2011/main" val="1"/>
+              <ma14:wrappingTextBoxFlag xmlns:ma14="http://schemas.microsoft.com/office/mac/drawingml/2011/main" xmlns="" val="1"/>
             </a:ext>
           </a:extLst>
         </p:spPr>
@@ -7924,7 +7911,7 @@
           </a:ln>
           <a:extLst>
             <a:ext uri="{C572A759-6A51-4108-AA02-DFA0A04FC94B}">
-              <ma14:wrappingTextBoxFlag xmlns:ma14="http://schemas.microsoft.com/office/mac/drawingml/2011/main" val="1"/>
+              <ma14:wrappingTextBoxFlag xmlns:ma14="http://schemas.microsoft.com/office/mac/drawingml/2011/main" xmlns="" val="1"/>
             </a:ext>
           </a:extLst>
         </p:spPr>
@@ -8274,10 +8261,6 @@
             <a:r>
               <a:rPr dirty="0" err="1"/>
               <a:t>verschiedene</a:t>
-            </a:r>
-            <a:r>
-              <a:rPr dirty="0"/>
-              <a:t/>
             </a:r>
             <a:br>
               <a:rPr dirty="0"/>
@@ -8502,14 +8485,7 @@
   <p:clrMapOvr>
     <a:masterClrMapping/>
   </p:clrMapOvr>
-  <p:transition xmlns:p14="http://schemas.microsoft.com/office/powerpoint/2010/main" spd="slow"/>
-  <p:timing>
-    <p:tnLst>
-      <p:par>
-        <p:cTn xmlns:p14="http://schemas.microsoft.com/office/powerpoint/2010/main" id="1" dur="indefinite" restart="never" nodeType="tmRoot"/>
-      </p:par>
-    </p:tnLst>
-  </p:timing>
+  <p:transition spd="slow"/>
 </p:sld>
 </file>
 
@@ -8538,8 +8514,8 @@
         </p:nvSpPr>
         <p:spPr>
           <a:xfrm>
-            <a:off x="3935999" y="6396609"/>
-            <a:ext cx="4114803" cy="269239"/>
+            <a:off x="3935999" y="6392731"/>
+            <a:ext cx="4114803" cy="276995"/>
           </a:xfrm>
           <a:prstGeom prst="rect">
             <a:avLst/>
@@ -8549,7 +8525,7 @@
           </a:ln>
           <a:extLst>
             <a:ext uri="{C572A759-6A51-4108-AA02-DFA0A04FC94B}">
-              <ma14:wrappingTextBoxFlag xmlns:ma14="http://schemas.microsoft.com/office/mac/drawingml/2011/main" val="1"/>
+              <ma14:wrappingTextBoxFlag xmlns:ma14="http://schemas.microsoft.com/office/mac/drawingml/2011/main" xmlns="" val="1"/>
             </a:ext>
           </a:extLst>
         </p:spPr>
@@ -8568,7 +8544,12 @@
           </a:lstStyle>
           <a:p>
             <a:r>
-              <a:t>Mlst.-Präsentation Nr. 1  /  Gruppe 15</a:t>
+              <a:rPr lang="de-CH" dirty="0" err="1"/>
+              <a:t>Mlst</a:t>
+            </a:r>
+            <a:r>
+              <a:rPr lang="de-CH" dirty="0"/>
+              <a:t>.-Präsentation Nr. III  /  Gruppe 15</a:t>
             </a:r>
           </a:p>
         </p:txBody>
@@ -8593,7 +8574,7 @@
           </a:prstGeom>
           <a:extLst>
             <a:ext uri="{C572A759-6A51-4108-AA02-DFA0A04FC94B}">
-              <ma14:wrappingTextBoxFlag xmlns:ma14="http://schemas.microsoft.com/office/mac/drawingml/2011/main" val="1"/>
+              <ma14:wrappingTextBoxFlag xmlns:ma14="http://schemas.microsoft.com/office/mac/drawingml/2011/main" xmlns="" val="1"/>
             </a:ext>
           </a:extLst>
         </p:spPr>
@@ -8741,14 +8722,7 @@
   <p:clrMapOvr>
     <a:masterClrMapping/>
   </p:clrMapOvr>
-  <p:transition xmlns:p14="http://schemas.microsoft.com/office/powerpoint/2010/main" spd="slow"/>
-  <p:timing>
-    <p:tnLst>
-      <p:par>
-        <p:cTn xmlns:p14="http://schemas.microsoft.com/office/powerpoint/2010/main" id="1" dur="indefinite" restart="never" nodeType="tmRoot"/>
-      </p:par>
-    </p:tnLst>
-  </p:timing>
+  <p:transition spd="slow"/>
 </p:sld>
 </file>
 
@@ -8777,8 +8751,8 @@
         </p:nvSpPr>
         <p:spPr>
           <a:xfrm>
-            <a:off x="4038600" y="6404292"/>
-            <a:ext cx="4114800" cy="269239"/>
+            <a:off x="4038600" y="6400414"/>
+            <a:ext cx="4114800" cy="276995"/>
           </a:xfrm>
           <a:prstGeom prst="rect">
             <a:avLst/>
@@ -8788,7 +8762,7 @@
           </a:ln>
           <a:extLst>
             <a:ext uri="{C572A759-6A51-4108-AA02-DFA0A04FC94B}">
-              <ma14:wrappingTextBoxFlag xmlns:ma14="http://schemas.microsoft.com/office/mac/drawingml/2011/main" val="1"/>
+              <ma14:wrappingTextBoxFlag xmlns:ma14="http://schemas.microsoft.com/office/mac/drawingml/2011/main" xmlns="" val="1"/>
             </a:ext>
           </a:extLst>
         </p:spPr>
@@ -8807,7 +8781,12 @@
           </a:lstStyle>
           <a:p>
             <a:r>
-              <a:t>Mlst.-Präsentation Nr. 1  /  Gruppe 15</a:t>
+              <a:rPr lang="de-CH" dirty="0" err="1"/>
+              <a:t>Mlst</a:t>
+            </a:r>
+            <a:r>
+              <a:rPr lang="de-CH" dirty="0"/>
+              <a:t>.-Präsentation Nr. III  /  Gruppe 15</a:t>
             </a:r>
           </a:p>
         </p:txBody>
@@ -8884,8 +8863,14 @@
               </a:defRPr>
             </a:pPr>
             <a:r>
-              <a:t>Outline / Spieldemonstration</a:t>
-            </a:r>
+              <a:rPr dirty="0"/>
+              <a:t>Outline / </a:t>
+            </a:r>
+            <a:r>
+              <a:rPr dirty="0" err="1"/>
+              <a:t>Spieldemonstration</a:t>
+            </a:r>
+            <a:endParaRPr dirty="0"/>
           </a:p>
           <a:p>
             <a:pPr marL="0" indent="0">
@@ -8898,7 +8883,7 @@
                 <a:sym typeface="Arial"/>
               </a:defRPr>
             </a:pPr>
-            <a:endParaRPr/>
+            <a:endParaRPr dirty="0"/>
           </a:p>
           <a:p>
             <a:pPr marL="0" indent="0">
@@ -8912,8 +8897,10 @@
               </a:defRPr>
             </a:pPr>
             <a:r>
+              <a:rPr dirty="0" err="1"/>
               <a:t>Spiellogik</a:t>
             </a:r>
+            <a:endParaRPr dirty="0"/>
           </a:p>
           <a:p>
             <a:pPr marL="0" indent="0">
@@ -8926,7 +8913,7 @@
                 <a:sym typeface="Arial"/>
               </a:defRPr>
             </a:pPr>
-            <a:endParaRPr/>
+            <a:endParaRPr dirty="0"/>
           </a:p>
           <a:p>
             <a:pPr marL="0" indent="0">
@@ -8940,8 +8927,18 @@
               </a:defRPr>
             </a:pPr>
             <a:r>
-              <a:t>Technische Eigenheiten</a:t>
-            </a:r>
+              <a:rPr dirty="0" err="1"/>
+              <a:t>Technische</a:t>
+            </a:r>
+            <a:r>
+              <a:rPr dirty="0"/>
+              <a:t> </a:t>
+            </a:r>
+            <a:r>
+              <a:rPr dirty="0" err="1"/>
+              <a:t>Eigenheiten</a:t>
+            </a:r>
+            <a:endParaRPr dirty="0"/>
           </a:p>
           <a:p>
             <a:pPr marL="0" indent="0">
@@ -8954,7 +8951,7 @@
                 <a:sym typeface="Arial"/>
               </a:defRPr>
             </a:pPr>
-            <a:endParaRPr/>
+            <a:endParaRPr dirty="0"/>
           </a:p>
           <a:p>
             <a:pPr marL="0" indent="0">
@@ -8968,8 +8965,18 @@
               </a:defRPr>
             </a:pPr>
             <a:r>
-              <a:t>Standpunkt / Zwischenresümee</a:t>
-            </a:r>
+              <a:rPr dirty="0" err="1"/>
+              <a:t>Standpunkt</a:t>
+            </a:r>
+            <a:r>
+              <a:rPr dirty="0"/>
+              <a:t> / </a:t>
+            </a:r>
+            <a:r>
+              <a:rPr dirty="0" err="1"/>
+              <a:t>Zwischenresümee</a:t>
+            </a:r>
+            <a:endParaRPr dirty="0"/>
           </a:p>
         </p:txBody>
       </p:sp>
@@ -8993,7 +9000,7 @@
           </a:prstGeom>
           <a:extLst>
             <a:ext uri="{C572A759-6A51-4108-AA02-DFA0A04FC94B}">
-              <ma14:wrappingTextBoxFlag xmlns:ma14="http://schemas.microsoft.com/office/mac/drawingml/2011/main" val="1"/>
+              <ma14:wrappingTextBoxFlag xmlns:ma14="http://schemas.microsoft.com/office/mac/drawingml/2011/main" xmlns="" val="1"/>
             </a:ext>
           </a:extLst>
         </p:spPr>
@@ -9184,14 +9191,7 @@
   <p:clrMapOvr>
     <a:masterClrMapping/>
   </p:clrMapOvr>
-  <p:transition xmlns:p14="http://schemas.microsoft.com/office/powerpoint/2010/main" spd="slow"/>
-  <p:timing>
-    <p:tnLst>
-      <p:par>
-        <p:cTn xmlns:p14="http://schemas.microsoft.com/office/powerpoint/2010/main" id="1" dur="indefinite" restart="never" nodeType="tmRoot"/>
-      </p:par>
-    </p:tnLst>
-  </p:timing>
+  <p:transition spd="slow"/>
 </p:sld>
 </file>
 
@@ -9220,8 +9220,8 @@
         </p:nvSpPr>
         <p:spPr>
           <a:xfrm>
-            <a:off x="4038600" y="6404292"/>
-            <a:ext cx="4114800" cy="269239"/>
+            <a:off x="4038600" y="6400414"/>
+            <a:ext cx="4114800" cy="276995"/>
           </a:xfrm>
           <a:prstGeom prst="rect">
             <a:avLst/>
@@ -9231,7 +9231,7 @@
           </a:ln>
           <a:extLst>
             <a:ext uri="{C572A759-6A51-4108-AA02-DFA0A04FC94B}">
-              <ma14:wrappingTextBoxFlag xmlns:ma14="http://schemas.microsoft.com/office/mac/drawingml/2011/main" val="1"/>
+              <ma14:wrappingTextBoxFlag xmlns:ma14="http://schemas.microsoft.com/office/mac/drawingml/2011/main" xmlns="" val="1"/>
             </a:ext>
           </a:extLst>
         </p:spPr>
@@ -9250,7 +9250,12 @@
           </a:lstStyle>
           <a:p>
             <a:r>
-              <a:t>Mlst.-Präsentation Nr. 1  /  Gruppe 15</a:t>
+              <a:rPr lang="de-CH" dirty="0" err="1"/>
+              <a:t>Mlst</a:t>
+            </a:r>
+            <a:r>
+              <a:rPr lang="de-CH" dirty="0"/>
+              <a:t>.-Präsentation Nr. III  /  Gruppe 15</a:t>
             </a:r>
           </a:p>
         </p:txBody>
@@ -9313,7 +9318,7 @@
           </a:prstGeom>
           <a:extLst>
             <a:ext uri="{C572A759-6A51-4108-AA02-DFA0A04FC94B}">
-              <ma14:wrappingTextBoxFlag xmlns:ma14="http://schemas.microsoft.com/office/mac/drawingml/2011/main" val="1"/>
+              <ma14:wrappingTextBoxFlag xmlns:ma14="http://schemas.microsoft.com/office/mac/drawingml/2011/main" xmlns="" val="1"/>
             </a:ext>
           </a:extLst>
         </p:spPr>
@@ -9410,7 +9415,7 @@
           </a:ln>
           <a:extLst>
             <a:ext uri="{C572A759-6A51-4108-AA02-DFA0A04FC94B}">
-              <ma14:wrappingTextBoxFlag xmlns:ma14="http://schemas.microsoft.com/office/mac/drawingml/2011/main" val="1"/>
+              <ma14:wrappingTextBoxFlag xmlns:ma14="http://schemas.microsoft.com/office/mac/drawingml/2011/main" xmlns="" val="1"/>
             </a:ext>
           </a:extLst>
         </p:spPr>
@@ -9606,14 +9611,7 @@
   <p:clrMapOvr>
     <a:masterClrMapping/>
   </p:clrMapOvr>
-  <p:transition xmlns:p14="http://schemas.microsoft.com/office/powerpoint/2010/main" spd="slow"/>
-  <p:timing>
-    <p:tnLst>
-      <p:par>
-        <p:cTn xmlns:p14="http://schemas.microsoft.com/office/powerpoint/2010/main" id="1" dur="indefinite" restart="never" nodeType="tmRoot"/>
-      </p:par>
-    </p:tnLst>
-  </p:timing>
+  <p:transition spd="slow"/>
 </p:sld>
 </file>
 

</xml_diff>

<commit_message>
Changed logger and GUI techinal stuff around to make more sense in presentation.
</commit_message>
<xml_diff>
--- a/00_General/Presentation/MS 3/Presentation_Milestone_iii_Master.pptx
+++ b/00_General/Presentation/MS 3/Presentation_Milestone_iii_Master.pptx
@@ -609,7 +609,7 @@
           <a:lstStyle/>
           <a:p>
             <a:fld id="{86CB4B4D-7CA3-9044-876B-883B54F8677D}" type="slidenum">
-              <a:t>‹Nr.›</a:t>
+              <a:t>‹#›</a:t>
             </a:fld>
             <a:endParaRPr/>
           </a:p>
@@ -807,7 +807,7 @@
           <a:lstStyle/>
           <a:p>
             <a:fld id="{86CB4B4D-7CA3-9044-876B-883B54F8677D}" type="slidenum">
-              <a:t>‹Nr.›</a:t>
+              <a:t>‹#›</a:t>
             </a:fld>
             <a:endParaRPr/>
           </a:p>
@@ -933,7 +933,7 @@
           <a:lstStyle/>
           <a:p>
             <a:fld id="{86CB4B4D-7CA3-9044-876B-883B54F8677D}" type="slidenum">
-              <a:t>‹Nr.›</a:t>
+              <a:t>‹#›</a:t>
             </a:fld>
             <a:endParaRPr/>
           </a:p>
@@ -1067,7 +1067,7 @@
           <a:lstStyle/>
           <a:p>
             <a:fld id="{86CB4B4D-7CA3-9044-876B-883B54F8677D}" type="slidenum">
-              <a:t>‹Nr.›</a:t>
+              <a:t>‹#›</a:t>
             </a:fld>
             <a:endParaRPr/>
           </a:p>
@@ -1201,7 +1201,7 @@
           <a:lstStyle/>
           <a:p>
             <a:fld id="{86CB4B4D-7CA3-9044-876B-883B54F8677D}" type="slidenum">
-              <a:t>‹Nr.›</a:t>
+              <a:t>‹#›</a:t>
             </a:fld>
             <a:endParaRPr/>
           </a:p>
@@ -1327,7 +1327,7 @@
           <a:lstStyle/>
           <a:p>
             <a:fld id="{86CB4B4D-7CA3-9044-876B-883B54F8677D}" type="slidenum">
-              <a:t>‹Nr.›</a:t>
+              <a:t>‹#›</a:t>
             </a:fld>
             <a:endParaRPr/>
           </a:p>
@@ -1461,7 +1461,7 @@
           <a:lstStyle/>
           <a:p>
             <a:fld id="{86CB4B4D-7CA3-9044-876B-883B54F8677D}" type="slidenum">
-              <a:t>‹Nr.›</a:t>
+              <a:t>‹#›</a:t>
             </a:fld>
             <a:endParaRPr/>
           </a:p>
@@ -1650,7 +1650,7 @@
           <a:lstStyle/>
           <a:p>
             <a:fld id="{86CB4B4D-7CA3-9044-876B-883B54F8677D}" type="slidenum">
-              <a:t>‹Nr.›</a:t>
+              <a:t>‹#›</a:t>
             </a:fld>
             <a:endParaRPr/>
           </a:p>
@@ -1780,7 +1780,7 @@
           <a:lstStyle/>
           <a:p>
             <a:fld id="{86CB4B4D-7CA3-9044-876B-883B54F8677D}" type="slidenum">
-              <a:t>‹Nr.›</a:t>
+              <a:t>‹#›</a:t>
             </a:fld>
             <a:endParaRPr/>
           </a:p>
@@ -1924,7 +1924,7 @@
           <a:lstStyle/>
           <a:p>
             <a:fld id="{86CB4B4D-7CA3-9044-876B-883B54F8677D}" type="slidenum">
-              <a:t>‹Nr.›</a:t>
+              <a:t>‹#›</a:t>
             </a:fld>
             <a:endParaRPr/>
           </a:p>
@@ -2001,7 +2001,7 @@
           <a:lstStyle/>
           <a:p>
             <a:fld id="{86CB4B4D-7CA3-9044-876B-883B54F8677D}" type="slidenum">
-              <a:t>‹Nr.›</a:t>
+              <a:t>‹#›</a:t>
             </a:fld>
             <a:endParaRPr/>
           </a:p>
@@ -2053,7 +2053,7 @@
           <a:lstStyle/>
           <a:p>
             <a:fld id="{86CB4B4D-7CA3-9044-876B-883B54F8677D}" type="slidenum">
-              <a:t>‹Nr.›</a:t>
+              <a:t>‹#›</a:t>
             </a:fld>
             <a:endParaRPr/>
           </a:p>
@@ -2234,7 +2234,7 @@
           <a:lstStyle/>
           <a:p>
             <a:fld id="{86CB4B4D-7CA3-9044-876B-883B54F8677D}" type="slidenum">
-              <a:t>‹Nr.›</a:t>
+              <a:t>‹#›</a:t>
             </a:fld>
             <a:endParaRPr/>
           </a:p>
@@ -2297,7 +2297,7 @@
           </a:ln>
           <a:extLst>
             <a:ext uri="{C572A759-6A51-4108-AA02-DFA0A04FC94B}">
-              <ma14:wrappingTextBoxFlag xmlns="" xmlns:ma14="http://schemas.microsoft.com/office/mac/drawingml/2011/main" val="1"/>
+              <ma14:wrappingTextBoxFlag xmlns:ma14="http://schemas.microsoft.com/office/mac/drawingml/2011/main" xmlns="" val="1"/>
             </a:ext>
           </a:extLst>
         </p:spPr>
@@ -2336,7 +2336,7 @@
           </a:ln>
           <a:extLst>
             <a:ext uri="{C572A759-6A51-4108-AA02-DFA0A04FC94B}">
-              <ma14:wrappingTextBoxFlag xmlns="" xmlns:ma14="http://schemas.microsoft.com/office/mac/drawingml/2011/main" val="1"/>
+              <ma14:wrappingTextBoxFlag xmlns:ma14="http://schemas.microsoft.com/office/mac/drawingml/2011/main" xmlns="" val="1"/>
             </a:ext>
           </a:extLst>
         </p:spPr>
@@ -2413,7 +2413,7 @@
           </a:lstStyle>
           <a:p>
             <a:fld id="{86CB4B4D-7CA3-9044-876B-883B54F8677D}" type="slidenum">
-              <a:t>‹Nr.›</a:t>
+              <a:t>‹#›</a:t>
             </a:fld>
             <a:endParaRPr/>
           </a:p>
@@ -3276,7 +3276,7 @@
           </a:ln>
           <a:extLst>
             <a:ext uri="{C572A759-6A51-4108-AA02-DFA0A04FC94B}">
-              <ma14:wrappingTextBoxFlag xmlns="" xmlns:ma14="http://schemas.microsoft.com/office/mac/drawingml/2011/main" val="1"/>
+              <ma14:wrappingTextBoxFlag xmlns:ma14="http://schemas.microsoft.com/office/mac/drawingml/2011/main" xmlns="" val="1"/>
             </a:ext>
           </a:extLst>
         </p:spPr>
@@ -3627,7 +3627,7 @@
           </a:ln>
           <a:extLst>
             <a:ext uri="{C572A759-6A51-4108-AA02-DFA0A04FC94B}">
-              <ma14:wrappingTextBoxFlag xmlns="" xmlns:ma14="http://schemas.microsoft.com/office/mac/drawingml/2011/main" val="1"/>
+              <ma14:wrappingTextBoxFlag xmlns:ma14="http://schemas.microsoft.com/office/mac/drawingml/2011/main" xmlns="" val="1"/>
             </a:ext>
           </a:extLst>
         </p:spPr>
@@ -3850,7 +3850,7 @@
           </a:ln>
           <a:extLst>
             <a:ext uri="{C572A759-6A51-4108-AA02-DFA0A04FC94B}">
-              <ma14:wrappingTextBoxFlag xmlns="" xmlns:ma14="http://schemas.microsoft.com/office/mac/drawingml/2011/main" val="1"/>
+              <ma14:wrappingTextBoxFlag xmlns:ma14="http://schemas.microsoft.com/office/mac/drawingml/2011/main" xmlns="" val="1"/>
             </a:ext>
           </a:extLst>
         </p:spPr>
@@ -3937,7 +3937,7 @@
           </a:prstGeom>
           <a:extLst>
             <a:ext uri="{C572A759-6A51-4108-AA02-DFA0A04FC94B}">
-              <ma14:wrappingTextBoxFlag xmlns="" xmlns:ma14="http://schemas.microsoft.com/office/mac/drawingml/2011/main" val="1"/>
+              <ma14:wrappingTextBoxFlag xmlns:ma14="http://schemas.microsoft.com/office/mac/drawingml/2011/main" xmlns="" val="1"/>
             </a:ext>
           </a:extLst>
         </p:spPr>
@@ -4034,7 +4034,7 @@
           </a:ln>
           <a:extLst>
             <a:ext uri="{C572A759-6A51-4108-AA02-DFA0A04FC94B}">
-              <ma14:wrappingTextBoxFlag xmlns="" xmlns:ma14="http://schemas.microsoft.com/office/mac/drawingml/2011/main" val="1"/>
+              <ma14:wrappingTextBoxFlag xmlns:ma14="http://schemas.microsoft.com/office/mac/drawingml/2011/main" xmlns="" val="1"/>
             </a:ext>
           </a:extLst>
         </p:spPr>
@@ -4129,7 +4129,7 @@
           </a:ln>
           <a:extLst>
             <a:ext uri="{C572A759-6A51-4108-AA02-DFA0A04FC94B}">
-              <ma14:wrappingTextBoxFlag xmlns="" xmlns:ma14="http://schemas.microsoft.com/office/mac/drawingml/2011/main" val="1"/>
+              <ma14:wrappingTextBoxFlag xmlns:ma14="http://schemas.microsoft.com/office/mac/drawingml/2011/main" xmlns="" val="1"/>
             </a:ext>
           </a:extLst>
         </p:spPr>
@@ -4339,7 +4339,7 @@
           </a:prstGeom>
           <a:extLst>
             <a:ext uri="{C572A759-6A51-4108-AA02-DFA0A04FC94B}">
-              <ma14:wrappingTextBoxFlag xmlns="" xmlns:ma14="http://schemas.microsoft.com/office/mac/drawingml/2011/main" val="1"/>
+              <ma14:wrappingTextBoxFlag xmlns:ma14="http://schemas.microsoft.com/office/mac/drawingml/2011/main" xmlns="" val="1"/>
             </a:ext>
           </a:extLst>
         </p:spPr>
@@ -4597,7 +4597,7 @@
           </a:ln>
           <a:extLst>
             <a:ext uri="{C572A759-6A51-4108-AA02-DFA0A04FC94B}">
-              <ma14:wrappingTextBoxFlag xmlns="" xmlns:ma14="http://schemas.microsoft.com/office/mac/drawingml/2011/main" val="1"/>
+              <ma14:wrappingTextBoxFlag xmlns:ma14="http://schemas.microsoft.com/office/mac/drawingml/2011/main" xmlns="" val="1"/>
             </a:ext>
           </a:extLst>
         </p:spPr>
@@ -4700,7 +4700,7 @@
           </a:prstGeom>
           <a:extLst>
             <a:ext uri="{C572A759-6A51-4108-AA02-DFA0A04FC94B}">
-              <ma14:wrappingTextBoxFlag xmlns="" xmlns:ma14="http://schemas.microsoft.com/office/mac/drawingml/2011/main" val="1"/>
+              <ma14:wrappingTextBoxFlag xmlns:ma14="http://schemas.microsoft.com/office/mac/drawingml/2011/main" xmlns="" val="1"/>
             </a:ext>
           </a:extLst>
         </p:spPr>
@@ -4797,7 +4797,7 @@
           </a:ln>
           <a:extLst>
             <a:ext uri="{C572A759-6A51-4108-AA02-DFA0A04FC94B}">
-              <ma14:wrappingTextBoxFlag xmlns="" xmlns:ma14="http://schemas.microsoft.com/office/mac/drawingml/2011/main" val="1"/>
+              <ma14:wrappingTextBoxFlag xmlns:ma14="http://schemas.microsoft.com/office/mac/drawingml/2011/main" xmlns="" val="1"/>
             </a:ext>
           </a:extLst>
         </p:spPr>
@@ -5190,7 +5190,7 @@
           </a:ln>
           <a:extLst>
             <a:ext uri="{C572A759-6A51-4108-AA02-DFA0A04FC94B}">
-              <ma14:wrappingTextBoxFlag xmlns="" xmlns:ma14="http://schemas.microsoft.com/office/mac/drawingml/2011/main" val="1"/>
+              <ma14:wrappingTextBoxFlag xmlns:ma14="http://schemas.microsoft.com/office/mac/drawingml/2011/main" xmlns="" val="1"/>
             </a:ext>
           </a:extLst>
         </p:spPr>
@@ -5277,7 +5277,7 @@
           </a:prstGeom>
           <a:extLst>
             <a:ext uri="{C572A759-6A51-4108-AA02-DFA0A04FC94B}">
-              <ma14:wrappingTextBoxFlag xmlns="" xmlns:ma14="http://schemas.microsoft.com/office/mac/drawingml/2011/main" val="1"/>
+              <ma14:wrappingTextBoxFlag xmlns:ma14="http://schemas.microsoft.com/office/mac/drawingml/2011/main" xmlns="" val="1"/>
             </a:ext>
           </a:extLst>
         </p:spPr>
@@ -5374,7 +5374,7 @@
           </a:ln>
           <a:extLst>
             <a:ext uri="{C572A759-6A51-4108-AA02-DFA0A04FC94B}">
-              <ma14:wrappingTextBoxFlag xmlns="" xmlns:ma14="http://schemas.microsoft.com/office/mac/drawingml/2011/main" val="1"/>
+              <ma14:wrappingTextBoxFlag xmlns:ma14="http://schemas.microsoft.com/office/mac/drawingml/2011/main" xmlns="" val="1"/>
             </a:ext>
           </a:extLst>
         </p:spPr>
@@ -5914,7 +5914,7 @@
           </a:ln>
           <a:extLst>
             <a:ext uri="{C572A759-6A51-4108-AA02-DFA0A04FC94B}">
-              <ma14:wrappingTextBoxFlag xmlns="" xmlns:ma14="http://schemas.microsoft.com/office/mac/drawingml/2011/main" val="1"/>
+              <ma14:wrappingTextBoxFlag xmlns:ma14="http://schemas.microsoft.com/office/mac/drawingml/2011/main" xmlns="" val="1"/>
             </a:ext>
           </a:extLst>
         </p:spPr>
@@ -6001,7 +6001,7 @@
           </a:prstGeom>
           <a:extLst>
             <a:ext uri="{C572A759-6A51-4108-AA02-DFA0A04FC94B}">
-              <ma14:wrappingTextBoxFlag xmlns="" xmlns:ma14="http://schemas.microsoft.com/office/mac/drawingml/2011/main" val="1"/>
+              <ma14:wrappingTextBoxFlag xmlns:ma14="http://schemas.microsoft.com/office/mac/drawingml/2011/main" xmlns="" val="1"/>
             </a:ext>
           </a:extLst>
         </p:spPr>
@@ -6035,7 +6035,7 @@
           </a:ln>
           <a:extLst>
             <a:ext uri="{C572A759-6A51-4108-AA02-DFA0A04FC94B}">
-              <ma14:wrappingTextBoxFlag xmlns="" xmlns:ma14="http://schemas.microsoft.com/office/mac/drawingml/2011/main" val="1"/>
+              <ma14:wrappingTextBoxFlag xmlns:ma14="http://schemas.microsoft.com/office/mac/drawingml/2011/main" xmlns="" val="1"/>
             </a:ext>
           </a:extLst>
         </p:spPr>
@@ -6127,7 +6127,7 @@
           </a:ln>
           <a:extLst>
             <a:ext uri="{C572A759-6A51-4108-AA02-DFA0A04FC94B}">
-              <ma14:wrappingTextBoxFlag xmlns="" xmlns:ma14="http://schemas.microsoft.com/office/mac/drawingml/2011/main" val="1"/>
+              <ma14:wrappingTextBoxFlag xmlns:ma14="http://schemas.microsoft.com/office/mac/drawingml/2011/main" xmlns="" val="1"/>
             </a:ext>
           </a:extLst>
         </p:spPr>
@@ -6315,7 +6315,7 @@
           </a:prstGeom>
           <a:extLst>
             <a:ext uri="{C572A759-6A51-4108-AA02-DFA0A04FC94B}">
-              <ma14:wrappingTextBoxFlag xmlns="" xmlns:ma14="http://schemas.microsoft.com/office/mac/drawingml/2011/main" val="1"/>
+              <ma14:wrappingTextBoxFlag xmlns:ma14="http://schemas.microsoft.com/office/mac/drawingml/2011/main" xmlns="" val="1"/>
             </a:ext>
           </a:extLst>
         </p:spPr>
@@ -6584,7 +6584,7 @@
           </a:ln>
           <a:extLst>
             <a:ext uri="{C572A759-6A51-4108-AA02-DFA0A04FC94B}">
-              <ma14:wrappingTextBoxFlag xmlns="" xmlns:ma14="http://schemas.microsoft.com/office/mac/drawingml/2011/main" val="1"/>
+              <ma14:wrappingTextBoxFlag xmlns:ma14="http://schemas.microsoft.com/office/mac/drawingml/2011/main" xmlns="" val="1"/>
             </a:ext>
           </a:extLst>
         </p:spPr>
@@ -6794,7 +6794,7 @@
           </a:prstGeom>
           <a:extLst>
             <a:ext uri="{C572A759-6A51-4108-AA02-DFA0A04FC94B}">
-              <ma14:wrappingTextBoxFlag xmlns="" xmlns:ma14="http://schemas.microsoft.com/office/mac/drawingml/2011/main" val="1"/>
+              <ma14:wrappingTextBoxFlag xmlns:ma14="http://schemas.microsoft.com/office/mac/drawingml/2011/main" xmlns="" val="1"/>
             </a:ext>
           </a:extLst>
         </p:spPr>
@@ -7052,7 +7052,7 @@
           </a:ln>
           <a:extLst>
             <a:ext uri="{C572A759-6A51-4108-AA02-DFA0A04FC94B}">
-              <ma14:wrappingTextBoxFlag xmlns="" xmlns:ma14="http://schemas.microsoft.com/office/mac/drawingml/2011/main" val="1"/>
+              <ma14:wrappingTextBoxFlag xmlns:ma14="http://schemas.microsoft.com/office/mac/drawingml/2011/main" xmlns="" val="1"/>
             </a:ext>
           </a:extLst>
         </p:spPr>
@@ -7101,7 +7101,7 @@
           </a:prstGeom>
           <a:extLst>
             <a:ext uri="{C572A759-6A51-4108-AA02-DFA0A04FC94B}">
-              <ma14:wrappingTextBoxFlag xmlns="" xmlns:ma14="http://schemas.microsoft.com/office/mac/drawingml/2011/main" val="1"/>
+              <ma14:wrappingTextBoxFlag xmlns:ma14="http://schemas.microsoft.com/office/mac/drawingml/2011/main" xmlns="" val="1"/>
             </a:ext>
           </a:extLst>
         </p:spPr>
@@ -7276,7 +7276,7 @@
           </a:ln>
           <a:extLst>
             <a:ext uri="{C572A759-6A51-4108-AA02-DFA0A04FC94B}">
-              <ma14:wrappingTextBoxFlag xmlns="" xmlns:ma14="http://schemas.microsoft.com/office/mac/drawingml/2011/main" val="1"/>
+              <ma14:wrappingTextBoxFlag xmlns:ma14="http://schemas.microsoft.com/office/mac/drawingml/2011/main" xmlns="" val="1"/>
             </a:ext>
           </a:extLst>
         </p:spPr>
@@ -7486,7 +7486,7 @@
           </a:prstGeom>
           <a:extLst>
             <a:ext uri="{C572A759-6A51-4108-AA02-DFA0A04FC94B}">
-              <ma14:wrappingTextBoxFlag xmlns="" xmlns:ma14="http://schemas.microsoft.com/office/mac/drawingml/2011/main" val="1"/>
+              <ma14:wrappingTextBoxFlag xmlns:ma14="http://schemas.microsoft.com/office/mac/drawingml/2011/main" xmlns="" val="1"/>
             </a:ext>
           </a:extLst>
         </p:spPr>
@@ -7717,7 +7717,7 @@
           </a:ln>
           <a:extLst>
             <a:ext uri="{C572A759-6A51-4108-AA02-DFA0A04FC94B}">
-              <ma14:wrappingTextBoxFlag xmlns="" xmlns:ma14="http://schemas.microsoft.com/office/mac/drawingml/2011/main" val="1"/>
+              <ma14:wrappingTextBoxFlag xmlns:ma14="http://schemas.microsoft.com/office/mac/drawingml/2011/main" xmlns="" val="1"/>
             </a:ext>
           </a:extLst>
         </p:spPr>
@@ -7782,7 +7782,7 @@
           </a:prstGeom>
           <a:extLst>
             <a:ext uri="{C572A759-6A51-4108-AA02-DFA0A04FC94B}">
-              <ma14:wrappingTextBoxFlag xmlns="" xmlns:ma14="http://schemas.microsoft.com/office/mac/drawingml/2011/main" val="1"/>
+              <ma14:wrappingTextBoxFlag xmlns:ma14="http://schemas.microsoft.com/office/mac/drawingml/2011/main" xmlns="" val="1"/>
             </a:ext>
           </a:extLst>
         </p:spPr>
@@ -7923,7 +7923,7 @@
           </a:ln>
           <a:extLst>
             <a:ext uri="{C572A759-6A51-4108-AA02-DFA0A04FC94B}">
-              <ma14:wrappingTextBoxFlag xmlns="" xmlns:ma14="http://schemas.microsoft.com/office/mac/drawingml/2011/main" val="1"/>
+              <ma14:wrappingTextBoxFlag xmlns:ma14="http://schemas.microsoft.com/office/mac/drawingml/2011/main" xmlns="" val="1"/>
             </a:ext>
           </a:extLst>
         </p:spPr>
@@ -8537,7 +8537,7 @@
           </a:ln>
           <a:extLst>
             <a:ext uri="{C572A759-6A51-4108-AA02-DFA0A04FC94B}">
-              <ma14:wrappingTextBoxFlag xmlns="" xmlns:ma14="http://schemas.microsoft.com/office/mac/drawingml/2011/main" val="1"/>
+              <ma14:wrappingTextBoxFlag xmlns:ma14="http://schemas.microsoft.com/office/mac/drawingml/2011/main" xmlns="" val="1"/>
             </a:ext>
           </a:extLst>
         </p:spPr>
@@ -8586,7 +8586,7 @@
           </a:prstGeom>
           <a:extLst>
             <a:ext uri="{C572A759-6A51-4108-AA02-DFA0A04FC94B}">
-              <ma14:wrappingTextBoxFlag xmlns="" xmlns:ma14="http://schemas.microsoft.com/office/mac/drawingml/2011/main" val="1"/>
+              <ma14:wrappingTextBoxFlag xmlns:ma14="http://schemas.microsoft.com/office/mac/drawingml/2011/main" xmlns="" val="1"/>
             </a:ext>
           </a:extLst>
         </p:spPr>
@@ -8774,7 +8774,7 @@
           </a:ln>
           <a:extLst>
             <a:ext uri="{C572A759-6A51-4108-AA02-DFA0A04FC94B}">
-              <ma14:wrappingTextBoxFlag xmlns="" xmlns:ma14="http://schemas.microsoft.com/office/mac/drawingml/2011/main" val="1"/>
+              <ma14:wrappingTextBoxFlag xmlns:ma14="http://schemas.microsoft.com/office/mac/drawingml/2011/main" xmlns="" val="1"/>
             </a:ext>
           </a:extLst>
         </p:spPr>
@@ -9012,7 +9012,7 @@
           </a:prstGeom>
           <a:extLst>
             <a:ext uri="{C572A759-6A51-4108-AA02-DFA0A04FC94B}">
-              <ma14:wrappingTextBoxFlag xmlns="" xmlns:ma14="http://schemas.microsoft.com/office/mac/drawingml/2011/main" val="1"/>
+              <ma14:wrappingTextBoxFlag xmlns:ma14="http://schemas.microsoft.com/office/mac/drawingml/2011/main" xmlns="" val="1"/>
             </a:ext>
           </a:extLst>
         </p:spPr>
@@ -9243,7 +9243,7 @@
           </a:ln>
           <a:extLst>
             <a:ext uri="{C572A759-6A51-4108-AA02-DFA0A04FC94B}">
-              <ma14:wrappingTextBoxFlag xmlns="" xmlns:ma14="http://schemas.microsoft.com/office/mac/drawingml/2011/main" val="1"/>
+              <ma14:wrappingTextBoxFlag xmlns:ma14="http://schemas.microsoft.com/office/mac/drawingml/2011/main" xmlns="" val="1"/>
             </a:ext>
           </a:extLst>
         </p:spPr>
@@ -9330,7 +9330,7 @@
           </a:prstGeom>
           <a:extLst>
             <a:ext uri="{C572A759-6A51-4108-AA02-DFA0A04FC94B}">
-              <ma14:wrappingTextBoxFlag xmlns="" xmlns:ma14="http://schemas.microsoft.com/office/mac/drawingml/2011/main" val="1"/>
+              <ma14:wrappingTextBoxFlag xmlns:ma14="http://schemas.microsoft.com/office/mac/drawingml/2011/main" xmlns="" val="1"/>
             </a:ext>
           </a:extLst>
         </p:spPr>
@@ -9417,7 +9417,7 @@
         <p:spPr>
           <a:xfrm>
             <a:off x="425998" y="1150597"/>
-            <a:ext cx="4996557" cy="4499689"/>
+            <a:ext cx="4996557" cy="4869021"/>
           </a:xfrm>
           <a:prstGeom prst="rect">
             <a:avLst/>
@@ -9427,7 +9427,7 @@
           </a:ln>
           <a:extLst>
             <a:ext uri="{C572A759-6A51-4108-AA02-DFA0A04FC94B}">
-              <ma14:wrappingTextBoxFlag xmlns="" xmlns:ma14="http://schemas.microsoft.com/office/mac/drawingml/2011/main" val="1"/>
+              <ma14:wrappingTextBoxFlag xmlns:ma14="http://schemas.microsoft.com/office/mac/drawingml/2011/main" xmlns="" val="1"/>
             </a:ext>
           </a:extLst>
         </p:spPr>
@@ -9446,8 +9446,20 @@
               <a:defRPr sz="2000" b="1"/>
             </a:pPr>
             <a:r>
-              <a:rPr dirty="0"/>
-              <a:t>GUI</a:t>
+              <a:rPr dirty="0" err="1"/>
+              <a:t>Genutzte</a:t>
+            </a:r>
+            <a:r>
+              <a:rPr dirty="0"/>
+              <a:t> </a:t>
+            </a:r>
+            <a:r>
+              <a:rPr dirty="0" err="1"/>
+              <a:t>externe</a:t>
+            </a:r>
+            <a:r>
+              <a:rPr dirty="0"/>
+              <a:t> library: Apache Log4j 2</a:t>
             </a:r>
           </a:p>
           <a:p>
@@ -9460,17 +9472,60 @@
               <a:defRPr sz="2000"/>
             </a:pPr>
             <a:r>
-              <a:rPr lang="de-CH" dirty="0"/>
-              <a:t>Einfach gestaltet (</a:t>
-            </a:r>
-            <a:r>
-              <a:rPr lang="de-CH" dirty="0" err="1"/>
-              <a:t>JButton</a:t>
-            </a:r>
-            <a:r>
-              <a:rPr lang="de-CH" dirty="0"/>
-              <a:t>)</a:t>
-            </a:r>
+              <a:rPr dirty="0" err="1"/>
+              <a:t>Vorteile</a:t>
+            </a:r>
+            <a:r>
+              <a:rPr dirty="0"/>
+              <a:t>:</a:t>
+            </a:r>
+          </a:p>
+          <a:p>
+            <a:pPr marL="1343526" lvl="3" indent="-200526">
+              <a:lnSpc>
+                <a:spcPct val="120000"/>
+              </a:lnSpc>
+              <a:buSzPct val="100000"/>
+              <a:buChar char="•"/>
+              <a:defRPr sz="2000"/>
+            </a:pPr>
+            <a:r>
+              <a:rPr dirty="0"/>
+              <a:t>Levels</a:t>
+            </a:r>
+          </a:p>
+          <a:p>
+            <a:pPr marL="1343526" lvl="3" indent="-200526">
+              <a:lnSpc>
+                <a:spcPct val="120000"/>
+              </a:lnSpc>
+              <a:buSzPct val="100000"/>
+              <a:buChar char="•"/>
+              <a:defRPr sz="2000"/>
+            </a:pPr>
+            <a:r>
+              <a:rPr dirty="0"/>
+              <a:t>Timestamps</a:t>
+            </a:r>
+          </a:p>
+          <a:p>
+            <a:pPr marL="1343526" lvl="3" indent="-200526">
+              <a:lnSpc>
+                <a:spcPct val="120000"/>
+              </a:lnSpc>
+              <a:buSzPct val="100000"/>
+              <a:buChar char="•"/>
+              <a:defRPr sz="2000"/>
+            </a:pPr>
+            <a:r>
+              <a:rPr dirty="0"/>
+              <a:t>Log in </a:t>
+            </a:r>
+            <a:r>
+              <a:rPr dirty="0" err="1"/>
+              <a:t>Datei</a:t>
+            </a:r>
+            <a:endParaRPr dirty="0"/>
           </a:p>
           <a:p>
             <a:pPr marL="581525" lvl="1" indent="-200525">
@@ -9482,26 +9537,46 @@
               <a:defRPr sz="2000"/>
             </a:pPr>
             <a:r>
-              <a:rPr lang="de-CH" dirty="0"/>
-              <a:t>Karten (.</a:t>
-            </a:r>
-            <a:r>
-              <a:rPr lang="de-CH" dirty="0" err="1"/>
-              <a:t>png</a:t>
-            </a:r>
-            <a:r>
-              <a:rPr lang="de-CH" dirty="0"/>
-              <a:t>) werden über </a:t>
-            </a:r>
-            <a:r>
-              <a:rPr lang="de-CH" dirty="0" err="1"/>
-              <a:t>Jbutton</a:t>
-            </a:r>
-            <a:r>
-              <a:rPr lang="de-CH" dirty="0"/>
-              <a:t> gelegt</a:t>
-            </a:r>
-            <a:endParaRPr dirty="0"/>
+              <a:rPr dirty="0" err="1"/>
+              <a:t>Konfiguration</a:t>
+            </a:r>
+            <a:r>
+              <a:rPr dirty="0"/>
+              <a:t>:</a:t>
+            </a:r>
+          </a:p>
+          <a:p>
+            <a:pPr marL="1343526" lvl="3" indent="-200526">
+              <a:lnSpc>
+                <a:spcPct val="120000"/>
+              </a:lnSpc>
+              <a:buSzPct val="100000"/>
+              <a:buChar char="•"/>
+              <a:defRPr sz="2000"/>
+            </a:pPr>
+            <a:r>
+              <a:rPr dirty="0"/>
+              <a:t>.properties </a:t>
+            </a:r>
+            <a:r>
+              <a:rPr dirty="0" err="1"/>
+              <a:t>Datei</a:t>
+            </a:r>
+            <a:endParaRPr lang="en-CH" dirty="0"/>
+          </a:p>
+          <a:p>
+            <a:pPr marL="200526" indent="-200526">
+              <a:lnSpc>
+                <a:spcPct val="120000"/>
+              </a:lnSpc>
+              <a:buSzPct val="100000"/>
+              <a:buChar char="•"/>
+              <a:defRPr sz="2000" b="1"/>
+            </a:pPr>
+            <a:r>
+              <a:rPr lang="de-DE" dirty="0"/>
+              <a:t>GUI</a:t>
+            </a:r>
           </a:p>
           <a:p>
             <a:pPr marL="581525" lvl="1" indent="-200525">
@@ -9513,8 +9588,8 @@
               <a:defRPr sz="2000"/>
             </a:pPr>
             <a:r>
-              <a:rPr lang="de-CH" dirty="0"/>
-              <a:t>"Ein Frame" für Chat und Game</a:t>
+              <a:rPr lang="de-DE" dirty="0"/>
+              <a:t>Einfach gestaltet (JButton)</a:t>
             </a:r>
           </a:p>
           <a:p>
@@ -9526,32 +9601,9 @@
               <a:buChar char="•"/>
               <a:defRPr sz="2000"/>
             </a:pPr>
-            <a:endParaRPr dirty="0"/>
-          </a:p>
-          <a:p>
-            <a:pPr marL="200526" indent="-200526">
-              <a:lnSpc>
-                <a:spcPct val="120000"/>
-              </a:lnSpc>
-              <a:buSzPct val="100000"/>
-              <a:buChar char="•"/>
-              <a:defRPr sz="2000" b="1"/>
-            </a:pPr>
-            <a:r>
-              <a:rPr dirty="0" err="1"/>
-              <a:t>Genutzte</a:t>
-            </a:r>
-            <a:r>
-              <a:rPr dirty="0"/>
-              <a:t> </a:t>
-            </a:r>
-            <a:r>
-              <a:rPr dirty="0" err="1"/>
-              <a:t>externe</a:t>
-            </a:r>
-            <a:r>
-              <a:rPr dirty="0"/>
-              <a:t> library: Apache Log4j 2</a:t>
+            <a:r>
+              <a:rPr lang="de-DE" dirty="0"/>
+              <a:t>Karten (.png) werden über Jbutton gelegt</a:t>
             </a:r>
           </a:p>
           <a:p>
@@ -9564,60 +9616,9 @@
               <a:defRPr sz="2000"/>
             </a:pPr>
             <a:r>
-              <a:rPr dirty="0" err="1"/>
-              <a:t>Vorteile</a:t>
-            </a:r>
-            <a:r>
-              <a:rPr dirty="0"/>
-              <a:t>:</a:t>
-            </a:r>
-          </a:p>
-          <a:p>
-            <a:pPr marL="1343526" lvl="3" indent="-200526">
-              <a:lnSpc>
-                <a:spcPct val="120000"/>
-              </a:lnSpc>
-              <a:buSzPct val="100000"/>
-              <a:buChar char="•"/>
-              <a:defRPr sz="2000"/>
-            </a:pPr>
-            <a:r>
-              <a:rPr dirty="0"/>
-              <a:t>Levels</a:t>
-            </a:r>
-          </a:p>
-          <a:p>
-            <a:pPr marL="1343526" lvl="3" indent="-200526">
-              <a:lnSpc>
-                <a:spcPct val="120000"/>
-              </a:lnSpc>
-              <a:buSzPct val="100000"/>
-              <a:buChar char="•"/>
-              <a:defRPr sz="2000"/>
-            </a:pPr>
-            <a:r>
-              <a:rPr dirty="0"/>
-              <a:t>Timestamps</a:t>
-            </a:r>
-          </a:p>
-          <a:p>
-            <a:pPr marL="1343526" lvl="3" indent="-200526">
-              <a:lnSpc>
-                <a:spcPct val="120000"/>
-              </a:lnSpc>
-              <a:buSzPct val="100000"/>
-              <a:buChar char="•"/>
-              <a:defRPr sz="2000"/>
-            </a:pPr>
-            <a:r>
-              <a:rPr dirty="0"/>
-              <a:t>Log in </a:t>
-            </a:r>
-            <a:r>
-              <a:rPr dirty="0" err="1"/>
-              <a:t>Datei</a:t>
-            </a:r>
-            <a:endParaRPr dirty="0"/>
+              <a:rPr lang="de-DE" dirty="0"/>
+              <a:t>"Ein Frame" für Chat und Game</a:t>
+            </a:r>
           </a:p>
           <a:p>
             <a:pPr marL="581525" lvl="1" indent="-200525">
@@ -9628,33 +9629,17 @@
               <a:buChar char="•"/>
               <a:defRPr sz="2000"/>
             </a:pPr>
-            <a:r>
-              <a:rPr dirty="0" err="1"/>
-              <a:t>Konfiguration</a:t>
-            </a:r>
-            <a:r>
-              <a:rPr dirty="0"/>
-              <a:t>:</a:t>
-            </a:r>
-          </a:p>
-          <a:p>
-            <a:pPr marL="1343526" lvl="3" indent="-200526">
+            <a:endParaRPr lang="de-DE" dirty="0"/>
+          </a:p>
+          <a:p>
+            <a:pPr marL="1143000" lvl="1">
               <a:lnSpc>
                 <a:spcPct val="120000"/>
               </a:lnSpc>
               <a:buSzPct val="100000"/>
-              <a:buChar char="•"/>
               <a:defRPr sz="2000"/>
             </a:pPr>
-            <a:r>
-              <a:rPr dirty="0"/>
-              <a:t>.properties </a:t>
-            </a:r>
-            <a:r>
-              <a:rPr dirty="0" err="1"/>
-              <a:t>Datei</a:t>
-            </a:r>
-            <a:endParaRPr dirty="0"/>
+            <a:endParaRPr lang="en-CH" dirty="0"/>
           </a:p>
         </p:txBody>
       </p:sp>

</xml_diff>

<commit_message>
corrected typos in powerpoint
</commit_message>
<xml_diff>
--- a/00_General/Presentation/MS 3/Presentation_Milestone_iii_Master.pptx
+++ b/00_General/Presentation/MS 3/Presentation_Milestone_iii_Master.pptx
@@ -325,7 +325,7 @@
   </p:defaultTextStyle>
   <p:extLst>
     <p:ext uri="{EFAFB233-063F-42B5-8137-9DF3F51BA10A}">
-      <p15:sldGuideLst xmlns:p15="http://schemas.microsoft.com/office/powerpoint/2012/main">
+      <p15:sldGuideLst xmlns:p15="http://schemas.microsoft.com/office/powerpoint/2012/main" xmlns="">
         <p15:guide id="1" orient="horz" pos="2160" userDrawn="1">
           <p15:clr>
             <a:srgbClr val="A4A3A4"/>
@@ -419,6 +419,11 @@
         </p:txBody>
       </p:sp>
     </p:spTree>
+    <p:extLst>
+      <p:ext uri="{BB962C8B-B14F-4D97-AF65-F5344CB8AC3E}">
+        <p14:creationId xmlns:p14="http://schemas.microsoft.com/office/powerpoint/2010/main" val="1997229491"/>
+      </p:ext>
+    </p:extLst>
   </p:cSld>
   <p:clrMap bg1="lt1" tx1="dk1" bg2="lt2" tx2="dk2" accent1="accent1" accent2="accent2" accent3="accent3" accent4="accent4" accent5="accent5" accent6="accent6" hlink="hlink" folHlink="folHlink"/>
   <p:notesStyle>
@@ -615,7 +620,7 @@
   <p:clrMapOvr>
     <a:masterClrMapping/>
   </p:clrMapOvr>
-  <p:transition spd="med"/>
+  <p:transition xmlns:p14="http://schemas.microsoft.com/office/powerpoint/2010/main" spd="med"/>
 </p:sldLayout>
 </file>
 
@@ -813,7 +818,7 @@
   <p:clrMapOvr>
     <a:masterClrMapping/>
   </p:clrMapOvr>
-  <p:transition spd="med"/>
+  <p:transition xmlns:p14="http://schemas.microsoft.com/office/powerpoint/2010/main" spd="med"/>
 </p:sldLayout>
 </file>
 
@@ -939,7 +944,7 @@
   <p:clrMapOvr>
     <a:masterClrMapping/>
   </p:clrMapOvr>
-  <p:transition spd="med"/>
+  <p:transition xmlns:p14="http://schemas.microsoft.com/office/powerpoint/2010/main" spd="med"/>
 </p:sldLayout>
 </file>
 
@@ -1073,7 +1078,7 @@
   <p:clrMapOvr>
     <a:masterClrMapping/>
   </p:clrMapOvr>
-  <p:transition spd="med"/>
+  <p:transition xmlns:p14="http://schemas.microsoft.com/office/powerpoint/2010/main" spd="med"/>
 </p:sldLayout>
 </file>
 
@@ -1207,7 +1212,7 @@
   <p:clrMapOvr>
     <a:masterClrMapping/>
   </p:clrMapOvr>
-  <p:transition spd="med"/>
+  <p:transition xmlns:p14="http://schemas.microsoft.com/office/powerpoint/2010/main" spd="med"/>
 </p:sldLayout>
 </file>
 
@@ -1333,7 +1338,7 @@
   <p:clrMapOvr>
     <a:masterClrMapping/>
   </p:clrMapOvr>
-  <p:transition spd="med"/>
+  <p:transition xmlns:p14="http://schemas.microsoft.com/office/powerpoint/2010/main" spd="med"/>
 </p:sldLayout>
 </file>
 
@@ -1467,7 +1472,7 @@
   <p:clrMapOvr>
     <a:masterClrMapping/>
   </p:clrMapOvr>
-  <p:transition spd="med"/>
+  <p:transition xmlns:p14="http://schemas.microsoft.com/office/powerpoint/2010/main" spd="med"/>
 </p:sldLayout>
 </file>
 
@@ -1656,7 +1661,7 @@
   <p:clrMapOvr>
     <a:masterClrMapping/>
   </p:clrMapOvr>
-  <p:transition spd="med"/>
+  <p:transition xmlns:p14="http://schemas.microsoft.com/office/powerpoint/2010/main" spd="med"/>
 </p:sldLayout>
 </file>
 
@@ -1786,7 +1791,7 @@
   <p:clrMapOvr>
     <a:masterClrMapping/>
   </p:clrMapOvr>
-  <p:transition spd="med"/>
+  <p:transition xmlns:p14="http://schemas.microsoft.com/office/powerpoint/2010/main" spd="med"/>
 </p:sldLayout>
 </file>
 
@@ -1930,7 +1935,7 @@
   <p:clrMapOvr>
     <a:masterClrMapping/>
   </p:clrMapOvr>
-  <p:transition spd="med"/>
+  <p:transition xmlns:p14="http://schemas.microsoft.com/office/powerpoint/2010/main" spd="med"/>
 </p:sldLayout>
 </file>
 
@@ -2007,7 +2012,7 @@
   <p:clrMapOvr>
     <a:masterClrMapping/>
   </p:clrMapOvr>
-  <p:transition spd="med"/>
+  <p:transition xmlns:p14="http://schemas.microsoft.com/office/powerpoint/2010/main" spd="med"/>
 </p:sldLayout>
 </file>
 
@@ -2059,7 +2064,7 @@
   <p:clrMapOvr>
     <a:masterClrMapping/>
   </p:clrMapOvr>
-  <p:transition spd="med"/>
+  <p:transition xmlns:p14="http://schemas.microsoft.com/office/powerpoint/2010/main" spd="med"/>
 </p:sldLayout>
 </file>
 
@@ -2240,7 +2245,7 @@
   <p:clrMapOvr>
     <a:masterClrMapping/>
   </p:clrMapOvr>
-  <p:transition spd="med"/>
+  <p:transition xmlns:p14="http://schemas.microsoft.com/office/powerpoint/2010/main" spd="med"/>
 </p:sldLayout>
 </file>
 
@@ -2292,7 +2297,7 @@
           </a:ln>
           <a:extLst>
             <a:ext uri="{C572A759-6A51-4108-AA02-DFA0A04FC94B}">
-              <ma14:wrappingTextBoxFlag xmlns:ma14="http://schemas.microsoft.com/office/mac/drawingml/2011/main" xmlns="" val="1"/>
+              <ma14:wrappingTextBoxFlag xmlns:ma14="http://schemas.microsoft.com/office/mac/drawingml/2011/main" val="1"/>
             </a:ext>
           </a:extLst>
         </p:spPr>
@@ -2331,7 +2336,7 @@
           </a:ln>
           <a:extLst>
             <a:ext uri="{C572A759-6A51-4108-AA02-DFA0A04FC94B}">
-              <ma14:wrappingTextBoxFlag xmlns:ma14="http://schemas.microsoft.com/office/mac/drawingml/2011/main" xmlns="" val="1"/>
+              <ma14:wrappingTextBoxFlag xmlns:ma14="http://schemas.microsoft.com/office/mac/drawingml/2011/main" val="1"/>
             </a:ext>
           </a:extLst>
         </p:spPr>
@@ -2432,7 +2437,7 @@
     <p:sldLayoutId id="2147483660" r:id="rId12"/>
     <p:sldLayoutId id="2147483661" r:id="rId13"/>
   </p:sldLayoutIdLst>
-  <p:transition spd="med"/>
+  <p:transition xmlns:p14="http://schemas.microsoft.com/office/powerpoint/2010/main" spd="med"/>
   <p:txStyles>
     <p:titleStyle>
       <a:lvl1pPr marL="0" marR="0" indent="0" algn="l" defTabSz="914400" rtl="0" latinLnBrk="0">
@@ -3271,7 +3276,7 @@
           </a:ln>
           <a:extLst>
             <a:ext uri="{C572A759-6A51-4108-AA02-DFA0A04FC94B}">
-              <ma14:wrappingTextBoxFlag xmlns:ma14="http://schemas.microsoft.com/office/mac/drawingml/2011/main" xmlns="" val="1"/>
+              <ma14:wrappingTextBoxFlag xmlns:ma14="http://schemas.microsoft.com/office/mac/drawingml/2011/main" val="1"/>
             </a:ext>
           </a:extLst>
         </p:spPr>
@@ -3605,7 +3610,7 @@
           </a:ln>
           <a:extLst>
             <a:ext uri="{C572A759-6A51-4108-AA02-DFA0A04FC94B}">
-              <ma14:wrappingTextBoxFlag xmlns:ma14="http://schemas.microsoft.com/office/mac/drawingml/2011/main" xmlns="" val="1"/>
+              <ma14:wrappingTextBoxFlag xmlns:ma14="http://schemas.microsoft.com/office/mac/drawingml/2011/main" val="1"/>
             </a:ext>
           </a:extLst>
         </p:spPr>
@@ -3616,6 +3621,7 @@
           <a:lstStyle/>
           <a:p>
             <a:r>
+              <a:rPr dirty="0"/>
               <a:t>Quelle:  mercadolibre.com</a:t>
             </a:r>
           </a:p>
@@ -3788,7 +3794,14 @@
   <p:clrMapOvr>
     <a:masterClrMapping/>
   </p:clrMapOvr>
-  <p:transition spd="med"/>
+  <p:transition xmlns:p14="http://schemas.microsoft.com/office/powerpoint/2010/main" spd="med"/>
+  <p:timing>
+    <p:tnLst>
+      <p:par>
+        <p:cTn xmlns:p14="http://schemas.microsoft.com/office/powerpoint/2010/main" id="1" dur="indefinite" restart="never" nodeType="tmRoot"/>
+      </p:par>
+    </p:tnLst>
+  </p:timing>
 </p:sld>
 </file>
 
@@ -3828,7 +3841,7 @@
           </a:ln>
           <a:extLst>
             <a:ext uri="{C572A759-6A51-4108-AA02-DFA0A04FC94B}">
-              <ma14:wrappingTextBoxFlag xmlns:ma14="http://schemas.microsoft.com/office/mac/drawingml/2011/main" xmlns="" val="1"/>
+              <ma14:wrappingTextBoxFlag xmlns:ma14="http://schemas.microsoft.com/office/mac/drawingml/2011/main" val="1"/>
             </a:ext>
           </a:extLst>
         </p:spPr>
@@ -3910,7 +3923,7 @@
           </a:prstGeom>
           <a:extLst>
             <a:ext uri="{C572A759-6A51-4108-AA02-DFA0A04FC94B}">
-              <ma14:wrappingTextBoxFlag xmlns:ma14="http://schemas.microsoft.com/office/mac/drawingml/2011/main" xmlns="" val="1"/>
+              <ma14:wrappingTextBoxFlag xmlns:ma14="http://schemas.microsoft.com/office/mac/drawingml/2011/main" val="1"/>
             </a:ext>
           </a:extLst>
         </p:spPr>
@@ -4007,7 +4020,7 @@
           </a:ln>
           <a:extLst>
             <a:ext uri="{C572A759-6A51-4108-AA02-DFA0A04FC94B}">
-              <ma14:wrappingTextBoxFlag xmlns:ma14="http://schemas.microsoft.com/office/mac/drawingml/2011/main" xmlns="" val="1"/>
+              <ma14:wrappingTextBoxFlag xmlns:ma14="http://schemas.microsoft.com/office/mac/drawingml/2011/main" val="1"/>
             </a:ext>
           </a:extLst>
         </p:spPr>
@@ -4079,7 +4092,14 @@
   <p:clrMapOvr>
     <a:masterClrMapping/>
   </p:clrMapOvr>
-  <p:transition spd="slow"/>
+  <p:transition xmlns:p14="http://schemas.microsoft.com/office/powerpoint/2010/main" spd="slow"/>
+  <p:timing>
+    <p:tnLst>
+      <p:par>
+        <p:cTn xmlns:p14="http://schemas.microsoft.com/office/powerpoint/2010/main" id="1" dur="indefinite" restart="never" nodeType="tmRoot"/>
+      </p:par>
+    </p:tnLst>
+  </p:timing>
 </p:sld>
 </file>
 
@@ -4119,7 +4139,7 @@
           </a:ln>
           <a:extLst>
             <a:ext uri="{C572A759-6A51-4108-AA02-DFA0A04FC94B}">
-              <ma14:wrappingTextBoxFlag xmlns:ma14="http://schemas.microsoft.com/office/mac/drawingml/2011/main" xmlns="" val="1"/>
+              <ma14:wrappingTextBoxFlag xmlns:ma14="http://schemas.microsoft.com/office/mac/drawingml/2011/main" val="1"/>
             </a:ext>
           </a:extLst>
         </p:spPr>
@@ -4324,7 +4344,7 @@
           </a:prstGeom>
           <a:extLst>
             <a:ext uri="{C572A759-6A51-4108-AA02-DFA0A04FC94B}">
-              <ma14:wrappingTextBoxFlag xmlns:ma14="http://schemas.microsoft.com/office/mac/drawingml/2011/main" xmlns="" val="1"/>
+              <ma14:wrappingTextBoxFlag xmlns:ma14="http://schemas.microsoft.com/office/mac/drawingml/2011/main" val="1"/>
             </a:ext>
           </a:extLst>
         </p:spPr>
@@ -4515,7 +4535,14 @@
   <p:clrMapOvr>
     <a:masterClrMapping/>
   </p:clrMapOvr>
-  <p:transition spd="slow"/>
+  <p:transition xmlns:p14="http://schemas.microsoft.com/office/powerpoint/2010/main" spd="slow"/>
+  <p:timing>
+    <p:tnLst>
+      <p:par>
+        <p:cTn xmlns:p14="http://schemas.microsoft.com/office/powerpoint/2010/main" id="1" dur="indefinite" restart="never" nodeType="tmRoot"/>
+      </p:par>
+    </p:tnLst>
+  </p:timing>
 </p:sld>
 </file>
 
@@ -4582,7 +4609,7 @@
           </a:ln>
           <a:extLst>
             <a:ext uri="{C572A759-6A51-4108-AA02-DFA0A04FC94B}">
-              <ma14:wrappingTextBoxFlag xmlns:ma14="http://schemas.microsoft.com/office/mac/drawingml/2011/main" xmlns="" val="1"/>
+              <ma14:wrappingTextBoxFlag xmlns:ma14="http://schemas.microsoft.com/office/mac/drawingml/2011/main" val="1"/>
             </a:ext>
           </a:extLst>
         </p:spPr>
@@ -4663,7 +4690,7 @@
           </a:prstGeom>
           <a:extLst>
             <a:ext uri="{C572A759-6A51-4108-AA02-DFA0A04FC94B}">
-              <ma14:wrappingTextBoxFlag xmlns:ma14="http://schemas.microsoft.com/office/mac/drawingml/2011/main" xmlns="" val="1"/>
+              <ma14:wrappingTextBoxFlag xmlns:ma14="http://schemas.microsoft.com/office/mac/drawingml/2011/main" val="1"/>
             </a:ext>
           </a:extLst>
         </p:spPr>
@@ -4760,7 +4787,7 @@
           </a:ln>
           <a:extLst>
             <a:ext uri="{C572A759-6A51-4108-AA02-DFA0A04FC94B}">
-              <ma14:wrappingTextBoxFlag xmlns:ma14="http://schemas.microsoft.com/office/mac/drawingml/2011/main" xmlns="" val="1"/>
+              <ma14:wrappingTextBoxFlag xmlns:ma14="http://schemas.microsoft.com/office/mac/drawingml/2011/main" val="1"/>
             </a:ext>
           </a:extLst>
         </p:spPr>
@@ -5100,7 +5127,14 @@
   <p:clrMapOvr>
     <a:masterClrMapping/>
   </p:clrMapOvr>
-  <p:transition spd="slow"/>
+  <p:transition xmlns:p14="http://schemas.microsoft.com/office/powerpoint/2010/main" spd="slow"/>
+  <p:timing>
+    <p:tnLst>
+      <p:par>
+        <p:cTn xmlns:p14="http://schemas.microsoft.com/office/powerpoint/2010/main" id="1" dur="indefinite" restart="never" nodeType="tmRoot"/>
+      </p:par>
+    </p:tnLst>
+  </p:timing>
 </p:sld>
 </file>
 
@@ -5140,7 +5174,7 @@
           </a:ln>
           <a:extLst>
             <a:ext uri="{C572A759-6A51-4108-AA02-DFA0A04FC94B}">
-              <ma14:wrappingTextBoxFlag xmlns:ma14="http://schemas.microsoft.com/office/mac/drawingml/2011/main" xmlns="" val="1"/>
+              <ma14:wrappingTextBoxFlag xmlns:ma14="http://schemas.microsoft.com/office/mac/drawingml/2011/main" val="1"/>
             </a:ext>
           </a:extLst>
         </p:spPr>
@@ -5222,7 +5256,7 @@
           </a:prstGeom>
           <a:extLst>
             <a:ext uri="{C572A759-6A51-4108-AA02-DFA0A04FC94B}">
-              <ma14:wrappingTextBoxFlag xmlns:ma14="http://schemas.microsoft.com/office/mac/drawingml/2011/main" xmlns="" val="1"/>
+              <ma14:wrappingTextBoxFlag xmlns:ma14="http://schemas.microsoft.com/office/mac/drawingml/2011/main" val="1"/>
             </a:ext>
           </a:extLst>
         </p:spPr>
@@ -5319,7 +5353,7 @@
           </a:ln>
           <a:extLst>
             <a:ext uri="{C572A759-6A51-4108-AA02-DFA0A04FC94B}">
-              <ma14:wrappingTextBoxFlag xmlns:ma14="http://schemas.microsoft.com/office/mac/drawingml/2011/main" xmlns="" val="1"/>
+              <ma14:wrappingTextBoxFlag xmlns:ma14="http://schemas.microsoft.com/office/mac/drawingml/2011/main" val="1"/>
             </a:ext>
           </a:extLst>
         </p:spPr>
@@ -5594,40 +5628,28 @@
               <a:defRPr sz="2000"/>
             </a:pPr>
             <a:r>
-              <a:rPr dirty="0" err="1"/>
-              <a:t>Pushen</a:t>
-            </a:r>
-            <a:r>
-              <a:rPr dirty="0"/>
-              <a:t>, </a:t>
-            </a:r>
-            <a:r>
-              <a:rPr dirty="0" err="1"/>
-              <a:t>Mergen</a:t>
-            </a:r>
-            <a:r>
-              <a:rPr dirty="0"/>
-              <a:t> </a:t>
-            </a:r>
-            <a:r>
-              <a:rPr dirty="0" err="1"/>
-              <a:t>mit</a:t>
-            </a:r>
-            <a:r>
-              <a:rPr dirty="0"/>
-              <a:t> Git (</a:t>
-            </a:r>
-            <a:r>
-              <a:rPr dirty="0" err="1"/>
-              <a:t>Knappes</a:t>
-            </a:r>
-            <a:r>
-              <a:rPr dirty="0"/>
-              <a:t> </a:t>
-            </a:r>
-            <a:r>
-              <a:rPr dirty="0" err="1"/>
-              <a:t>Zeitmanagment</a:t>
+              <a:rPr dirty="0"/>
+              <a:t>Pushen, Mergen mit Git </a:t>
+            </a:r>
+            <a:r>
+              <a:rPr dirty="0" smtClean="0"/>
+              <a:t>(</a:t>
+            </a:r>
+            <a:r>
+              <a:rPr lang="de-CH" dirty="0" err="1"/>
+              <a:t>k</a:t>
+            </a:r>
+            <a:r>
+              <a:rPr dirty="0" smtClean="0"/>
+              <a:t>nappes Zeitmanag</a:t>
+            </a:r>
+            <a:r>
+              <a:rPr lang="de-CH" dirty="0" err="1" smtClean="0"/>
+              <a:t>e</a:t>
+            </a:r>
+            <a:r>
+              <a:rPr dirty="0" smtClean="0"/>
+              <a:t>ment</a:t>
             </a:r>
             <a:r>
               <a:rPr dirty="0"/>
@@ -5720,32 +5742,16 @@
               <a:defRPr sz="2000"/>
             </a:pPr>
             <a:r>
-              <a:rPr dirty="0" err="1"/>
-              <a:t>Einen</a:t>
-            </a:r>
-            <a:r>
-              <a:rPr dirty="0"/>
-              <a:t> Tag </a:t>
-            </a:r>
-            <a:r>
-              <a:rPr dirty="0" err="1"/>
-              <a:t>vor</a:t>
-            </a:r>
-            <a:r>
-              <a:rPr dirty="0"/>
-              <a:t> </a:t>
-            </a:r>
-            <a:r>
-              <a:rPr dirty="0" err="1"/>
-              <a:t>Abgabe</a:t>
-            </a:r>
-            <a:r>
-              <a:rPr dirty="0"/>
-              <a:t> </a:t>
-            </a:r>
-            <a:r>
-              <a:rPr dirty="0" err="1"/>
-              <a:t>Fertig</a:t>
+              <a:rPr dirty="0"/>
+              <a:t>Einen Tag vor Abgabe </a:t>
+            </a:r>
+            <a:r>
+              <a:rPr lang="de-CH" dirty="0" err="1"/>
+              <a:t>f</a:t>
+            </a:r>
+            <a:r>
+              <a:rPr dirty="0" smtClean="0"/>
+              <a:t>ertig</a:t>
             </a:r>
             <a:endParaRPr dirty="0"/>
           </a:p>
@@ -5819,7 +5825,14 @@
   <p:clrMapOvr>
     <a:masterClrMapping/>
   </p:clrMapOvr>
-  <p:transition spd="slow"/>
+  <p:transition xmlns:p14="http://schemas.microsoft.com/office/powerpoint/2010/main" spd="slow"/>
+  <p:timing>
+    <p:tnLst>
+      <p:par>
+        <p:cTn xmlns:p14="http://schemas.microsoft.com/office/powerpoint/2010/main" id="1" dur="indefinite" restart="never" nodeType="tmRoot"/>
+      </p:par>
+    </p:tnLst>
+  </p:timing>
 </p:sld>
 </file>
 
@@ -5859,7 +5872,7 @@
           </a:ln>
           <a:extLst>
             <a:ext uri="{C572A759-6A51-4108-AA02-DFA0A04FC94B}">
-              <ma14:wrappingTextBoxFlag xmlns:ma14="http://schemas.microsoft.com/office/mac/drawingml/2011/main" xmlns="" val="1"/>
+              <ma14:wrappingTextBoxFlag xmlns:ma14="http://schemas.microsoft.com/office/mac/drawingml/2011/main" val="1"/>
             </a:ext>
           </a:extLst>
         </p:spPr>
@@ -5941,7 +5954,7 @@
           </a:prstGeom>
           <a:extLst>
             <a:ext uri="{C572A759-6A51-4108-AA02-DFA0A04FC94B}">
-              <ma14:wrappingTextBoxFlag xmlns:ma14="http://schemas.microsoft.com/office/mac/drawingml/2011/main" xmlns="" val="1"/>
+              <ma14:wrappingTextBoxFlag xmlns:ma14="http://schemas.microsoft.com/office/mac/drawingml/2011/main" val="1"/>
             </a:ext>
           </a:extLst>
         </p:spPr>
@@ -5975,7 +5988,7 @@
           </a:ln>
           <a:extLst>
             <a:ext uri="{C572A759-6A51-4108-AA02-DFA0A04FC94B}">
-              <ma14:wrappingTextBoxFlag xmlns:ma14="http://schemas.microsoft.com/office/mac/drawingml/2011/main" xmlns="" val="1"/>
+              <ma14:wrappingTextBoxFlag xmlns:ma14="http://schemas.microsoft.com/office/mac/drawingml/2011/main" val="1"/>
             </a:ext>
           </a:extLst>
         </p:spPr>
@@ -6022,12 +6035,55 @@
           </a:ln>
         </p:spPr>
       </p:pic>
+      <p:sp>
+        <p:nvSpPr>
+          <p:cNvPr id="7" name="Shape 132"/>
+          <p:cNvSpPr/>
+          <p:nvPr/>
+        </p:nvSpPr>
+        <p:spPr>
+          <a:xfrm>
+            <a:off x="1207435" y="5952201"/>
+            <a:ext cx="2031987" cy="307773"/>
+          </a:xfrm>
+          <a:prstGeom prst="rect">
+            <a:avLst/>
+          </a:prstGeom>
+          <a:ln w="12700">
+            <a:miter lim="400000"/>
+          </a:ln>
+          <a:extLst>
+            <a:ext uri="{C572A759-6A51-4108-AA02-DFA0A04FC94B}">
+              <ma14:wrappingTextBoxFlag xmlns:ma14="http://schemas.microsoft.com/office/mac/drawingml/2011/main" val="1"/>
+            </a:ext>
+          </a:extLst>
+        </p:spPr>
+        <p:txBody>
+          <a:bodyPr wrap="none" lIns="45718" tIns="45718" rIns="45718" bIns="45718">
+            <a:spAutoFit/>
+          </a:bodyPr>
+          <a:lstStyle/>
+          <a:p>
+            <a:r>
+              <a:rPr sz="1400" dirty="0"/>
+              <a:t>Quelle:  mercadolibre.com</a:t>
+            </a:r>
+          </a:p>
+        </p:txBody>
+      </p:sp>
     </p:spTree>
   </p:cSld>
   <p:clrMapOvr>
     <a:masterClrMapping/>
   </p:clrMapOvr>
-  <p:transition spd="slow"/>
+  <p:transition xmlns:p14="http://schemas.microsoft.com/office/powerpoint/2010/main" spd="slow"/>
+  <p:timing>
+    <p:tnLst>
+      <p:par>
+        <p:cTn xmlns:p14="http://schemas.microsoft.com/office/powerpoint/2010/main" id="1" dur="indefinite" restart="never" nodeType="tmRoot"/>
+      </p:par>
+    </p:tnLst>
+  </p:timing>
 </p:sld>
 </file>
 
@@ -6067,7 +6123,7 @@
           </a:ln>
           <a:extLst>
             <a:ext uri="{C572A759-6A51-4108-AA02-DFA0A04FC94B}">
-              <ma14:wrappingTextBoxFlag xmlns:ma14="http://schemas.microsoft.com/office/mac/drawingml/2011/main" xmlns="" val="1"/>
+              <ma14:wrappingTextBoxFlag xmlns:ma14="http://schemas.microsoft.com/office/mac/drawingml/2011/main" val="1"/>
             </a:ext>
           </a:extLst>
         </p:spPr>
@@ -6233,7 +6289,7 @@
           </a:prstGeom>
           <a:extLst>
             <a:ext uri="{C572A759-6A51-4108-AA02-DFA0A04FC94B}">
-              <ma14:wrappingTextBoxFlag xmlns:ma14="http://schemas.microsoft.com/office/mac/drawingml/2011/main" xmlns="" val="1"/>
+              <ma14:wrappingTextBoxFlag xmlns:ma14="http://schemas.microsoft.com/office/mac/drawingml/2011/main" val="1"/>
             </a:ext>
           </a:extLst>
         </p:spPr>
@@ -6462,7 +6518,14 @@
   <p:clrMapOvr>
     <a:masterClrMapping/>
   </p:clrMapOvr>
-  <p:transition spd="slow"/>
+  <p:transition xmlns:p14="http://schemas.microsoft.com/office/powerpoint/2010/main" spd="slow"/>
+  <p:timing>
+    <p:tnLst>
+      <p:par>
+        <p:cTn xmlns:p14="http://schemas.microsoft.com/office/powerpoint/2010/main" id="1" dur="indefinite" restart="never" nodeType="tmRoot"/>
+      </p:par>
+    </p:tnLst>
+  </p:timing>
 </p:sld>
 </file>
 
@@ -6502,7 +6565,7 @@
           </a:ln>
           <a:extLst>
             <a:ext uri="{C572A759-6A51-4108-AA02-DFA0A04FC94B}">
-              <ma14:wrappingTextBoxFlag xmlns:ma14="http://schemas.microsoft.com/office/mac/drawingml/2011/main" xmlns="" val="1"/>
+              <ma14:wrappingTextBoxFlag xmlns:ma14="http://schemas.microsoft.com/office/mac/drawingml/2011/main" val="1"/>
             </a:ext>
           </a:extLst>
         </p:spPr>
@@ -6707,7 +6770,7 @@
           </a:prstGeom>
           <a:extLst>
             <a:ext uri="{C572A759-6A51-4108-AA02-DFA0A04FC94B}">
-              <ma14:wrappingTextBoxFlag xmlns:ma14="http://schemas.microsoft.com/office/mac/drawingml/2011/main" xmlns="" val="1"/>
+              <ma14:wrappingTextBoxFlag xmlns:ma14="http://schemas.microsoft.com/office/mac/drawingml/2011/main" val="1"/>
             </a:ext>
           </a:extLst>
         </p:spPr>
@@ -6898,7 +6961,14 @@
   <p:clrMapOvr>
     <a:masterClrMapping/>
   </p:clrMapOvr>
-  <p:transition spd="slow"/>
+  <p:transition xmlns:p14="http://schemas.microsoft.com/office/powerpoint/2010/main" spd="slow"/>
+  <p:timing>
+    <p:tnLst>
+      <p:par>
+        <p:cTn xmlns:p14="http://schemas.microsoft.com/office/powerpoint/2010/main" id="1" dur="indefinite" restart="never" nodeType="tmRoot"/>
+      </p:par>
+    </p:tnLst>
+  </p:timing>
 </p:sld>
 </file>
 
@@ -6965,7 +7035,7 @@
           </a:ln>
           <a:extLst>
             <a:ext uri="{C572A759-6A51-4108-AA02-DFA0A04FC94B}">
-              <ma14:wrappingTextBoxFlag xmlns:ma14="http://schemas.microsoft.com/office/mac/drawingml/2011/main" xmlns="" val="1"/>
+              <ma14:wrappingTextBoxFlag xmlns:ma14="http://schemas.microsoft.com/office/mac/drawingml/2011/main" val="1"/>
             </a:ext>
           </a:extLst>
         </p:spPr>
@@ -7009,7 +7079,7 @@
           </a:prstGeom>
           <a:extLst>
             <a:ext uri="{C572A759-6A51-4108-AA02-DFA0A04FC94B}">
-              <ma14:wrappingTextBoxFlag xmlns:ma14="http://schemas.microsoft.com/office/mac/drawingml/2011/main" xmlns="" val="1"/>
+              <ma14:wrappingTextBoxFlag xmlns:ma14="http://schemas.microsoft.com/office/mac/drawingml/2011/main" val="1"/>
             </a:ext>
           </a:extLst>
         </p:spPr>
@@ -7129,7 +7199,14 @@
   <p:clrMapOvr>
     <a:masterClrMapping/>
   </p:clrMapOvr>
-  <p:transition spd="slow"/>
+  <p:transition xmlns:p14="http://schemas.microsoft.com/office/powerpoint/2010/main" spd="slow"/>
+  <p:timing>
+    <p:tnLst>
+      <p:par>
+        <p:cTn xmlns:p14="http://schemas.microsoft.com/office/powerpoint/2010/main" id="1" dur="indefinite" restart="never" nodeType="tmRoot"/>
+      </p:par>
+    </p:tnLst>
+  </p:timing>
 </p:sld>
 </file>
 
@@ -7169,7 +7246,7 @@
           </a:ln>
           <a:extLst>
             <a:ext uri="{C572A759-6A51-4108-AA02-DFA0A04FC94B}">
-              <ma14:wrappingTextBoxFlag xmlns:ma14="http://schemas.microsoft.com/office/mac/drawingml/2011/main" xmlns="" val="1"/>
+              <ma14:wrappingTextBoxFlag xmlns:ma14="http://schemas.microsoft.com/office/mac/drawingml/2011/main" val="1"/>
             </a:ext>
           </a:extLst>
         </p:spPr>
@@ -7374,7 +7451,7 @@
           </a:prstGeom>
           <a:extLst>
             <a:ext uri="{C572A759-6A51-4108-AA02-DFA0A04FC94B}">
-              <ma14:wrappingTextBoxFlag xmlns:ma14="http://schemas.microsoft.com/office/mac/drawingml/2011/main" xmlns="" val="1"/>
+              <ma14:wrappingTextBoxFlag xmlns:ma14="http://schemas.microsoft.com/office/mac/drawingml/2011/main" val="1"/>
             </a:ext>
           </a:extLst>
         </p:spPr>
@@ -7565,7 +7642,14 @@
   <p:clrMapOvr>
     <a:masterClrMapping/>
   </p:clrMapOvr>
-  <p:transition spd="slow"/>
+  <p:transition xmlns:p14="http://schemas.microsoft.com/office/powerpoint/2010/main" spd="slow"/>
+  <p:timing>
+    <p:tnLst>
+      <p:par>
+        <p:cTn xmlns:p14="http://schemas.microsoft.com/office/powerpoint/2010/main" id="1" dur="indefinite" restart="never" nodeType="tmRoot"/>
+      </p:par>
+    </p:tnLst>
+  </p:timing>
 </p:sld>
 </file>
 
@@ -7605,7 +7689,7 @@
           </a:ln>
           <a:extLst>
             <a:ext uri="{C572A759-6A51-4108-AA02-DFA0A04FC94B}">
-              <ma14:wrappingTextBoxFlag xmlns:ma14="http://schemas.microsoft.com/office/mac/drawingml/2011/main" xmlns="" val="1"/>
+              <ma14:wrappingTextBoxFlag xmlns:ma14="http://schemas.microsoft.com/office/mac/drawingml/2011/main" val="1"/>
             </a:ext>
           </a:extLst>
         </p:spPr>
@@ -7648,7 +7732,7 @@
           </a:prstGeom>
           <a:extLst>
             <a:ext uri="{C572A759-6A51-4108-AA02-DFA0A04FC94B}">
-              <ma14:wrappingTextBoxFlag xmlns:ma14="http://schemas.microsoft.com/office/mac/drawingml/2011/main" xmlns="" val="1"/>
+              <ma14:wrappingTextBoxFlag xmlns:ma14="http://schemas.microsoft.com/office/mac/drawingml/2011/main" val="1"/>
             </a:ext>
           </a:extLst>
         </p:spPr>
@@ -7783,7 +7867,7 @@
           </a:ln>
           <a:extLst>
             <a:ext uri="{C572A759-6A51-4108-AA02-DFA0A04FC94B}">
-              <ma14:wrappingTextBoxFlag xmlns:ma14="http://schemas.microsoft.com/office/mac/drawingml/2011/main" xmlns="" val="1"/>
+              <ma14:wrappingTextBoxFlag xmlns:ma14="http://schemas.microsoft.com/office/mac/drawingml/2011/main" val="1"/>
             </a:ext>
           </a:extLst>
         </p:spPr>
@@ -8016,6 +8100,10 @@
             <a:r>
               <a:rPr dirty="0" err="1"/>
               <a:t>verschiedene</a:t>
+            </a:r>
+            <a:r>
+              <a:rPr dirty="0"/>
+              <a:t/>
             </a:r>
             <a:br>
               <a:rPr dirty="0"/>
@@ -8235,7 +8323,14 @@
   <p:clrMapOvr>
     <a:masterClrMapping/>
   </p:clrMapOvr>
-  <p:transition spd="slow"/>
+  <p:transition xmlns:p14="http://schemas.microsoft.com/office/powerpoint/2010/main" spd="slow"/>
+  <p:timing>
+    <p:tnLst>
+      <p:par>
+        <p:cTn xmlns:p14="http://schemas.microsoft.com/office/powerpoint/2010/main" id="1" dur="indefinite" restart="never" nodeType="tmRoot"/>
+      </p:par>
+    </p:tnLst>
+  </p:timing>
 </p:sld>
 </file>
 
@@ -8275,7 +8370,7 @@
           </a:ln>
           <a:extLst>
             <a:ext uri="{C572A759-6A51-4108-AA02-DFA0A04FC94B}">
-              <ma14:wrappingTextBoxFlag xmlns:ma14="http://schemas.microsoft.com/office/mac/drawingml/2011/main" xmlns="" val="1"/>
+              <ma14:wrappingTextBoxFlag xmlns:ma14="http://schemas.microsoft.com/office/mac/drawingml/2011/main" val="1"/>
             </a:ext>
           </a:extLst>
         </p:spPr>
@@ -8319,7 +8414,7 @@
           </a:prstGeom>
           <a:extLst>
             <a:ext uri="{C572A759-6A51-4108-AA02-DFA0A04FC94B}">
-              <ma14:wrappingTextBoxFlag xmlns:ma14="http://schemas.microsoft.com/office/mac/drawingml/2011/main" xmlns="" val="1"/>
+              <ma14:wrappingTextBoxFlag xmlns:ma14="http://schemas.microsoft.com/office/mac/drawingml/2011/main" val="1"/>
             </a:ext>
           </a:extLst>
         </p:spPr>
@@ -8467,7 +8562,14 @@
   <p:clrMapOvr>
     <a:masterClrMapping/>
   </p:clrMapOvr>
-  <p:transition spd="slow"/>
+  <p:transition xmlns:p14="http://schemas.microsoft.com/office/powerpoint/2010/main" spd="slow"/>
+  <p:timing>
+    <p:tnLst>
+      <p:par>
+        <p:cTn xmlns:p14="http://schemas.microsoft.com/office/powerpoint/2010/main" id="1" dur="indefinite" restart="never" nodeType="tmRoot"/>
+      </p:par>
+    </p:tnLst>
+  </p:timing>
 </p:sld>
 </file>
 
@@ -8507,7 +8609,7 @@
           </a:ln>
           <a:extLst>
             <a:ext uri="{C572A759-6A51-4108-AA02-DFA0A04FC94B}">
-              <ma14:wrappingTextBoxFlag xmlns:ma14="http://schemas.microsoft.com/office/mac/drawingml/2011/main" xmlns="" val="1"/>
+              <ma14:wrappingTextBoxFlag xmlns:ma14="http://schemas.microsoft.com/office/mac/drawingml/2011/main" val="1"/>
             </a:ext>
           </a:extLst>
         </p:spPr>
@@ -8712,7 +8814,7 @@
           </a:prstGeom>
           <a:extLst>
             <a:ext uri="{C572A759-6A51-4108-AA02-DFA0A04FC94B}">
-              <ma14:wrappingTextBoxFlag xmlns:ma14="http://schemas.microsoft.com/office/mac/drawingml/2011/main" xmlns="" val="1"/>
+              <ma14:wrappingTextBoxFlag xmlns:ma14="http://schemas.microsoft.com/office/mac/drawingml/2011/main" val="1"/>
             </a:ext>
           </a:extLst>
         </p:spPr>
@@ -8903,7 +9005,14 @@
   <p:clrMapOvr>
     <a:masterClrMapping/>
   </p:clrMapOvr>
-  <p:transition spd="slow"/>
+  <p:transition xmlns:p14="http://schemas.microsoft.com/office/powerpoint/2010/main" spd="slow"/>
+  <p:timing>
+    <p:tnLst>
+      <p:par>
+        <p:cTn xmlns:p14="http://schemas.microsoft.com/office/powerpoint/2010/main" id="1" dur="indefinite" restart="never" nodeType="tmRoot"/>
+      </p:par>
+    </p:tnLst>
+  </p:timing>
 </p:sld>
 </file>
 
@@ -8943,7 +9052,7 @@
           </a:ln>
           <a:extLst>
             <a:ext uri="{C572A759-6A51-4108-AA02-DFA0A04FC94B}">
-              <ma14:wrappingTextBoxFlag xmlns:ma14="http://schemas.microsoft.com/office/mac/drawingml/2011/main" xmlns="" val="1"/>
+              <ma14:wrappingTextBoxFlag xmlns:ma14="http://schemas.microsoft.com/office/mac/drawingml/2011/main" val="1"/>
             </a:ext>
           </a:extLst>
         </p:spPr>
@@ -9025,7 +9134,7 @@
           </a:prstGeom>
           <a:extLst>
             <a:ext uri="{C572A759-6A51-4108-AA02-DFA0A04FC94B}">
-              <ma14:wrappingTextBoxFlag xmlns:ma14="http://schemas.microsoft.com/office/mac/drawingml/2011/main" xmlns="" val="1"/>
+              <ma14:wrappingTextBoxFlag xmlns:ma14="http://schemas.microsoft.com/office/mac/drawingml/2011/main" val="1"/>
             </a:ext>
           </a:extLst>
         </p:spPr>
@@ -9122,7 +9231,7 @@
           </a:ln>
           <a:extLst>
             <a:ext uri="{C572A759-6A51-4108-AA02-DFA0A04FC94B}">
-              <ma14:wrappingTextBoxFlag xmlns:ma14="http://schemas.microsoft.com/office/mac/drawingml/2011/main" xmlns="" val="1"/>
+              <ma14:wrappingTextBoxFlag xmlns:ma14="http://schemas.microsoft.com/office/mac/drawingml/2011/main" val="1"/>
             </a:ext>
           </a:extLst>
         </p:spPr>
@@ -9436,7 +9545,14 @@
   <p:clrMapOvr>
     <a:masterClrMapping/>
   </p:clrMapOvr>
-  <p:transition spd="slow"/>
+  <p:transition xmlns:p14="http://schemas.microsoft.com/office/powerpoint/2010/main" spd="slow"/>
+  <p:timing>
+    <p:tnLst>
+      <p:par>
+        <p:cTn xmlns:p14="http://schemas.microsoft.com/office/powerpoint/2010/main" id="1" dur="indefinite" restart="never" nodeType="tmRoot"/>
+      </p:par>
+    </p:tnLst>
+  </p:timing>
 </p:sld>
 </file>
 

</xml_diff>